<commit_message>
Touchups to the ADL and RDDL tutorials.
</commit_message>
<xml_diff>
--- a/exercises/cisc-813/adl/slides.pptx
+++ b/exercises/cisc-813/adl/slides.pptx
@@ -6,27 +6,13 @@
   </p:sldMasterIdLst>
   <p:sldIdLst>
     <p:sldId id="1685" r:id="rId2"/>
-    <p:sldId id="257" r:id="rId3"/>
-    <p:sldId id="258" r:id="rId4"/>
-    <p:sldId id="259" r:id="rId5"/>
-    <p:sldId id="260" r:id="rId6"/>
-    <p:sldId id="261" r:id="rId7"/>
-    <p:sldId id="262" r:id="rId8"/>
-    <p:sldId id="263" r:id="rId9"/>
-    <p:sldId id="264" r:id="rId10"/>
-    <p:sldId id="265" r:id="rId11"/>
-    <p:sldId id="266" r:id="rId12"/>
-    <p:sldId id="1689" r:id="rId13"/>
-    <p:sldId id="268" r:id="rId14"/>
-    <p:sldId id="269" r:id="rId15"/>
-    <p:sldId id="270" r:id="rId16"/>
-    <p:sldId id="271" r:id="rId17"/>
-    <p:sldId id="272" r:id="rId18"/>
-    <p:sldId id="273" r:id="rId19"/>
-    <p:sldId id="1686" r:id="rId20"/>
-    <p:sldId id="1687" r:id="rId21"/>
-    <p:sldId id="1688" r:id="rId22"/>
-    <p:sldId id="1684" r:id="rId23"/>
+    <p:sldId id="258" r:id="rId3"/>
+    <p:sldId id="1690" r:id="rId4"/>
+    <p:sldId id="257" r:id="rId5"/>
+    <p:sldId id="261" r:id="rId6"/>
+    <p:sldId id="1691" r:id="rId7"/>
+    <p:sldId id="1693" r:id="rId8"/>
+    <p:sldId id="1684" r:id="rId9"/>
   </p:sldIdLst>
   <p:sldSz cx="12192000" cy="6858000"/>
   <p:notesSz cx="6858000" cy="9144000"/>
@@ -2646,231 +2632,6 @@
 </p:sldLayout>
 </file>
 
-<file path=ppt/slideLayouts/slideLayout15.xml><?xml version="1.0" encoding="utf-8"?>
-<p:sldLayout xmlns:a="http://schemas.openxmlformats.org/drawingml/2006/main" xmlns:r="http://schemas.openxmlformats.org/officeDocument/2006/relationships" xmlns:p="http://schemas.openxmlformats.org/presentationml/2006/main" type="tx">
-  <p:cSld name="Title, Bullets &amp; Photo">
-    <p:spTree>
-      <p:nvGrpSpPr>
-        <p:cNvPr id="1" name=""/>
-        <p:cNvGrpSpPr/>
-        <p:nvPr/>
-      </p:nvGrpSpPr>
-      <p:grpSpPr>
-        <a:xfrm>
-          <a:off x="0" y="0"/>
-          <a:ext cx="0" cy="0"/>
-          <a:chOff x="0" y="0"/>
-          <a:chExt cx="0" cy="0"/>
-        </a:xfrm>
-      </p:grpSpPr>
-      <p:sp>
-        <p:nvSpPr>
-          <p:cNvPr id="97" name="Image"/>
-          <p:cNvSpPr>
-            <a:spLocks noGrp="1"/>
-          </p:cNvSpPr>
-          <p:nvPr>
-            <p:ph type="pic" sz="half" idx="21"/>
-          </p:nvPr>
-        </p:nvSpPr>
-        <p:spPr>
-          <a:xfrm>
-            <a:off x="7167562" y="1696640"/>
-            <a:ext cx="4024313" cy="4527352"/>
-          </a:xfrm>
-          <a:prstGeom prst="rect">
-            <a:avLst/>
-          </a:prstGeom>
-          <a:ln w="9525">
-            <a:round/>
-          </a:ln>
-        </p:spPr>
-        <p:txBody>
-          <a:bodyPr lIns="91439" tIns="45719" rIns="91439" bIns="45719" anchor="t">
-            <a:noAutofit/>
-          </a:bodyPr>
-          <a:lstStyle/>
-          <a:p>
-            <a:endParaRPr/>
-          </a:p>
-        </p:txBody>
-      </p:sp>
-      <p:sp>
-        <p:nvSpPr>
-          <p:cNvPr id="98" name="Title Text"/>
-          <p:cNvSpPr txBox="1">
-            <a:spLocks noGrp="1"/>
-          </p:cNvSpPr>
-          <p:nvPr>
-            <p:ph type="title"/>
-          </p:nvPr>
-        </p:nvSpPr>
-        <p:spPr>
-          <a:xfrm>
-            <a:off x="976313" y="187523"/>
-            <a:ext cx="10239375" cy="1714500"/>
-          </a:xfrm>
-          <a:prstGeom prst="rect">
-            <a:avLst/>
-          </a:prstGeom>
-        </p:spPr>
-        <p:txBody>
-          <a:bodyPr/>
-          <a:lstStyle>
-            <a:lvl1pPr>
-              <a:defRPr>
-                <a:solidFill>
-                  <a:srgbClr val="558AAB"/>
-                </a:solidFill>
-              </a:defRPr>
-            </a:lvl1pPr>
-          </a:lstStyle>
-          <a:p>
-            <a:r>
-              <a:t>Title Text</a:t>
-            </a:r>
-          </a:p>
-        </p:txBody>
-      </p:sp>
-      <p:sp>
-        <p:nvSpPr>
-          <p:cNvPr id="99" name="Body Level One…"/>
-          <p:cNvSpPr txBox="1">
-            <a:spLocks noGrp="1"/>
-          </p:cNvSpPr>
-          <p:nvPr>
-            <p:ph type="body" sz="half" idx="1"/>
-          </p:nvPr>
-        </p:nvSpPr>
-        <p:spPr>
-          <a:xfrm>
-            <a:off x="976313" y="1946672"/>
-            <a:ext cx="5000625" cy="4018359"/>
-          </a:xfrm>
-          <a:prstGeom prst="rect">
-            <a:avLst/>
-          </a:prstGeom>
-        </p:spPr>
-        <p:txBody>
-          <a:bodyPr/>
-          <a:lstStyle>
-            <a:lvl1pPr marL="267881" indent="-267881">
-              <a:spcBef>
-                <a:spcPts val="1969"/>
-              </a:spcBef>
-              <a:buBlip>
-                <a:blip r:embed="rId2"/>
-              </a:buBlip>
-              <a:defRPr sz="2109"/>
-            </a:lvl1pPr>
-            <a:lvl2pPr marL="535762" indent="-267881">
-              <a:spcBef>
-                <a:spcPts val="1969"/>
-              </a:spcBef>
-              <a:buBlip>
-                <a:blip r:embed="rId2"/>
-              </a:buBlip>
-              <a:defRPr sz="2109"/>
-            </a:lvl2pPr>
-            <a:lvl3pPr marL="803643" indent="-267881">
-              <a:spcBef>
-                <a:spcPts val="1969"/>
-              </a:spcBef>
-              <a:buBlip>
-                <a:blip r:embed="rId2"/>
-              </a:buBlip>
-              <a:defRPr sz="2109"/>
-            </a:lvl3pPr>
-            <a:lvl4pPr marL="1071524" indent="-267881">
-              <a:spcBef>
-                <a:spcPts val="1969"/>
-              </a:spcBef>
-              <a:buBlip>
-                <a:blip r:embed="rId2"/>
-              </a:buBlip>
-              <a:defRPr sz="2109"/>
-            </a:lvl4pPr>
-            <a:lvl5pPr marL="1339406" indent="-267881">
-              <a:spcBef>
-                <a:spcPts val="1969"/>
-              </a:spcBef>
-              <a:buBlip>
-                <a:blip r:embed="rId2"/>
-              </a:buBlip>
-              <a:defRPr sz="2109"/>
-            </a:lvl5pPr>
-          </a:lstStyle>
-          <a:p>
-            <a:r>
-              <a:t>Body Level One</a:t>
-            </a:r>
-          </a:p>
-          <a:p>
-            <a:pPr lvl="1"/>
-            <a:r>
-              <a:t>Body Level Two</a:t>
-            </a:r>
-          </a:p>
-          <a:p>
-            <a:pPr lvl="2"/>
-            <a:r>
-              <a:t>Body Level Three</a:t>
-            </a:r>
-          </a:p>
-          <a:p>
-            <a:pPr lvl="3"/>
-            <a:r>
-              <a:t>Body Level Four</a:t>
-            </a:r>
-          </a:p>
-          <a:p>
-            <a:pPr lvl="4"/>
-            <a:r>
-              <a:t>Body Level Five</a:t>
-            </a:r>
-          </a:p>
-        </p:txBody>
-      </p:sp>
-      <p:sp>
-        <p:nvSpPr>
-          <p:cNvPr id="100" name="Slide Number"/>
-          <p:cNvSpPr txBox="1">
-            <a:spLocks noGrp="1"/>
-          </p:cNvSpPr>
-          <p:nvPr>
-            <p:ph type="sldNum" sz="quarter" idx="2"/>
-          </p:nvPr>
-        </p:nvSpPr>
-        <p:spPr>
-          <a:prstGeom prst="rect">
-            <a:avLst/>
-          </a:prstGeom>
-        </p:spPr>
-        <p:txBody>
-          <a:bodyPr/>
-          <a:lstStyle/>
-          <a:p>
-            <a:fld id="{86CB4B4D-7CA3-9044-876B-883B54F8677D}" type="slidenum">
-              <a:t>‹#›</a:t>
-            </a:fld>
-            <a:endParaRPr/>
-          </a:p>
-        </p:txBody>
-      </p:sp>
-    </p:spTree>
-    <p:extLst>
-      <p:ext uri="{BB962C8B-B14F-4D97-AF65-F5344CB8AC3E}">
-        <p14:creationId xmlns:p14="http://schemas.microsoft.com/office/powerpoint/2010/main" val="3742654919"/>
-      </p:ext>
-    </p:extLst>
-  </p:cSld>
-  <p:clrMapOvr>
-    <a:masterClrMapping/>
-  </p:clrMapOvr>
-  <p:transition spd="med"/>
-</p:sldLayout>
-</file>
-
 <file path=ppt/slideLayouts/slideLayout2.xml><?xml version="1.0" encoding="utf-8"?>
 <p:sldLayout xmlns:a="http://schemas.openxmlformats.org/drawingml/2006/main" xmlns:r="http://schemas.openxmlformats.org/officeDocument/2006/relationships" xmlns:p="http://schemas.openxmlformats.org/presentationml/2006/main" type="obj" preserve="1">
   <p:cSld name="Title and Content">
@@ -9026,7 +8787,6 @@
     <p:sldLayoutId id="2147483672" r:id="rId12"/>
     <p:sldLayoutId id="2147483673" r:id="rId13"/>
     <p:sldLayoutId id="2147483674" r:id="rId14"/>
-    <p:sldLayoutId id="2147483675" r:id="rId15"/>
   </p:sldLayoutIdLst>
   <p:hf sldNum="0" hdr="0" ftr="0" dt="0"/>
   <p:txStyles>
@@ -9406,2178 +9166,7 @@
 </p:sld>
 </file>
 
-<file path=ppt/slides/slide10.xml><?xml version="1.0" encoding="utf-8"?>
-<p:sld xmlns:a="http://schemas.openxmlformats.org/drawingml/2006/main" xmlns:r="http://schemas.openxmlformats.org/officeDocument/2006/relationships" xmlns:p="http://schemas.openxmlformats.org/presentationml/2006/main">
-  <p:cSld>
-    <p:spTree>
-      <p:nvGrpSpPr>
-        <p:cNvPr id="1" name=""/>
-        <p:cNvGrpSpPr/>
-        <p:nvPr/>
-      </p:nvGrpSpPr>
-      <p:grpSpPr>
-        <a:xfrm>
-          <a:off x="0" y="0"/>
-          <a:ext cx="0" cy="0"/>
-          <a:chOff x="0" y="0"/>
-          <a:chExt cx="0" cy="0"/>
-        </a:xfrm>
-      </p:grpSpPr>
-      <p:sp>
-        <p:nvSpPr>
-          <p:cNvPr id="190" name="Moving Crates: Action"/>
-          <p:cNvSpPr txBox="1">
-            <a:spLocks noGrp="1"/>
-          </p:cNvSpPr>
-          <p:nvPr>
-            <p:ph type="title"/>
-          </p:nvPr>
-        </p:nvSpPr>
-        <p:spPr>
-          <a:prstGeom prst="rect">
-            <a:avLst/>
-          </a:prstGeom>
-        </p:spPr>
-        <p:txBody>
-          <a:bodyPr/>
-          <a:lstStyle/>
-          <a:p>
-            <a:r>
-              <a:t>Moving Crates: Action</a:t>
-            </a:r>
-          </a:p>
-        </p:txBody>
-      </p:sp>
-      <p:sp>
-        <p:nvSpPr>
-          <p:cNvPr id="191" name="(:action move…"/>
-          <p:cNvSpPr txBox="1">
-            <a:spLocks noGrp="1"/>
-          </p:cNvSpPr>
-          <p:nvPr>
-            <p:ph type="body" idx="1"/>
-          </p:nvPr>
-        </p:nvSpPr>
-        <p:spPr>
-          <a:prstGeom prst="rect">
-            <a:avLst/>
-          </a:prstGeom>
-        </p:spPr>
-        <p:txBody>
-          <a:bodyPr/>
-          <a:lstStyle/>
-          <a:p>
-            <a:pPr marL="0" indent="0">
-              <a:lnSpc>
-                <a:spcPct val="50000"/>
-              </a:lnSpc>
-              <a:buNone/>
-              <a:defRPr b="1"/>
-            </a:pPr>
-            <a:r>
-              <a:rPr dirty="0"/>
-              <a:t>(</a:t>
-            </a:r>
-            <a:r>
-              <a:rPr b="0" dirty="0"/>
-              <a:t>:action </a:t>
-            </a:r>
-            <a:r>
-              <a:rPr b="0" dirty="0">
-                <a:solidFill>
-                  <a:schemeClr val="accent4"/>
-                </a:solidFill>
-              </a:rPr>
-              <a:t>move</a:t>
-            </a:r>
-          </a:p>
-          <a:p>
-            <a:pPr marL="0" indent="0">
-              <a:lnSpc>
-                <a:spcPct val="50000"/>
-              </a:lnSpc>
-              <a:buNone/>
-            </a:pPr>
-            <a:br>
-              <a:rPr dirty="0"/>
-            </a:br>
-            <a:r>
-              <a:rPr dirty="0"/>
-              <a:t>    :parameters (</a:t>
-            </a:r>
-            <a:r>
-              <a:rPr dirty="0">
-                <a:solidFill>
-                  <a:schemeClr val="accent5"/>
-                </a:solidFill>
-              </a:rPr>
-              <a:t>?rob</a:t>
-            </a:r>
-            <a:r>
-              <a:rPr dirty="0"/>
-              <a:t> - </a:t>
-            </a:r>
-            <a:r>
-              <a:rPr dirty="0">
-                <a:solidFill>
-                  <a:schemeClr val="accent3"/>
-                </a:solidFill>
-              </a:rPr>
-              <a:t>robot</a:t>
-            </a:r>
-            <a:r>
-              <a:rPr dirty="0"/>
-              <a:t> </a:t>
-            </a:r>
-            <a:r>
-              <a:rPr dirty="0">
-                <a:solidFill>
-                  <a:schemeClr val="accent5"/>
-                </a:solidFill>
-              </a:rPr>
-              <a:t>?r1 ?r2 </a:t>
-            </a:r>
-            <a:r>
-              <a:rPr dirty="0"/>
-              <a:t>- </a:t>
-            </a:r>
-            <a:r>
-              <a:rPr dirty="0">
-                <a:solidFill>
-                  <a:schemeClr val="accent3"/>
-                </a:solidFill>
-              </a:rPr>
-              <a:t>room</a:t>
-            </a:r>
-            <a:r>
-              <a:rPr dirty="0"/>
-              <a:t>)</a:t>
-            </a:r>
-          </a:p>
-          <a:p>
-            <a:pPr marL="0" indent="0">
-              <a:lnSpc>
-                <a:spcPct val="50000"/>
-              </a:lnSpc>
-              <a:buNone/>
-            </a:pPr>
-            <a:br>
-              <a:rPr lang="en-US" dirty="0"/>
-            </a:br>
-            <a:br>
-              <a:rPr dirty="0"/>
-            </a:br>
-            <a:r>
-              <a:rPr dirty="0"/>
-              <a:t>    :precondition </a:t>
-            </a:r>
-            <a:r>
-              <a:rPr lang="en-US" dirty="0"/>
-              <a:t>	</a:t>
-            </a:r>
-            <a:r>
-              <a:rPr dirty="0"/>
-              <a:t>(</a:t>
-            </a:r>
-            <a:r>
-              <a:rPr dirty="0">
-                <a:solidFill>
-                  <a:srgbClr val="53585F"/>
-                </a:solidFill>
-              </a:rPr>
-              <a:t>and</a:t>
-            </a:r>
-            <a:r>
-              <a:rPr lang="en-US" dirty="0">
-                <a:solidFill>
-                  <a:srgbClr val="53585F"/>
-                </a:solidFill>
-              </a:rPr>
-              <a:t>	</a:t>
-            </a:r>
-            <a:r>
-              <a:rPr dirty="0"/>
-              <a:t>(</a:t>
-            </a:r>
-            <a:r>
-              <a:rPr dirty="0">
-                <a:solidFill>
-                  <a:schemeClr val="accent2"/>
-                </a:solidFill>
-              </a:rPr>
-              <a:t>in</a:t>
-            </a:r>
-            <a:r>
-              <a:rPr dirty="0"/>
-              <a:t> </a:t>
-            </a:r>
-            <a:r>
-              <a:rPr dirty="0">
-                <a:solidFill>
-                  <a:schemeClr val="accent5"/>
-                </a:solidFill>
-              </a:rPr>
-              <a:t>?rob ?r1</a:t>
-            </a:r>
-            <a:r>
-              <a:rPr dirty="0"/>
-              <a:t>)</a:t>
-            </a:r>
-          </a:p>
-          <a:p>
-            <a:pPr marL="0" indent="0">
-              <a:lnSpc>
-                <a:spcPct val="50000"/>
-              </a:lnSpc>
-              <a:buNone/>
-            </a:pPr>
-            <a:r>
-              <a:rPr dirty="0"/>
-              <a:t>                                  </a:t>
-            </a:r>
-            <a:r>
-              <a:rPr lang="en-US" dirty="0"/>
-              <a:t>          	</a:t>
-            </a:r>
-            <a:r>
-              <a:rPr dirty="0"/>
-              <a:t>(</a:t>
-            </a:r>
-            <a:r>
-              <a:rPr dirty="0">
-                <a:solidFill>
-                  <a:schemeClr val="accent2"/>
-                </a:solidFill>
-              </a:rPr>
-              <a:t>connected</a:t>
-            </a:r>
-            <a:r>
-              <a:rPr dirty="0"/>
-              <a:t> </a:t>
-            </a:r>
-            <a:r>
-              <a:rPr dirty="0">
-                <a:solidFill>
-                  <a:schemeClr val="accent5"/>
-                </a:solidFill>
-              </a:rPr>
-              <a:t>?r1 ?r2</a:t>
-            </a:r>
-            <a:r>
-              <a:rPr dirty="0"/>
-              <a:t>))</a:t>
-            </a:r>
-          </a:p>
-          <a:p>
-            <a:pPr marL="0" indent="0">
-              <a:lnSpc>
-                <a:spcPct val="50000"/>
-              </a:lnSpc>
-              <a:buNone/>
-            </a:pPr>
-            <a:br>
-              <a:rPr lang="en-US" dirty="0"/>
-            </a:br>
-            <a:br>
-              <a:rPr dirty="0"/>
-            </a:br>
-            <a:r>
-              <a:rPr dirty="0"/>
-              <a:t>    :effect </a:t>
-            </a:r>
-            <a:r>
-              <a:rPr lang="en-US" dirty="0"/>
-              <a:t>	</a:t>
-            </a:r>
-            <a:r>
-              <a:rPr dirty="0"/>
-              <a:t>(</a:t>
-            </a:r>
-            <a:r>
-              <a:rPr dirty="0">
-                <a:solidFill>
-                  <a:srgbClr val="53585F"/>
-                </a:solidFill>
-              </a:rPr>
-              <a:t>and</a:t>
-            </a:r>
-            <a:r>
-              <a:rPr lang="en-US" dirty="0">
-                <a:solidFill>
-                  <a:srgbClr val="53585F"/>
-                </a:solidFill>
-              </a:rPr>
-              <a:t>	</a:t>
-            </a:r>
-            <a:r>
-              <a:rPr dirty="0"/>
-              <a:t>(</a:t>
-            </a:r>
-            <a:r>
-              <a:rPr dirty="0">
-                <a:solidFill>
-                  <a:schemeClr val="accent2"/>
-                </a:solidFill>
-              </a:rPr>
-              <a:t>in</a:t>
-            </a:r>
-            <a:r>
-              <a:rPr dirty="0"/>
-              <a:t> </a:t>
-            </a:r>
-            <a:r>
-              <a:rPr dirty="0">
-                <a:solidFill>
-                  <a:schemeClr val="accent5"/>
-                </a:solidFill>
-              </a:rPr>
-              <a:t>?rob ?r2</a:t>
-            </a:r>
-            <a:r>
-              <a:rPr dirty="0"/>
-              <a:t>)</a:t>
-            </a:r>
-          </a:p>
-          <a:p>
-            <a:pPr marL="0" indent="0">
-              <a:lnSpc>
-                <a:spcPct val="50000"/>
-              </a:lnSpc>
-              <a:buNone/>
-            </a:pPr>
-            <a:r>
-              <a:rPr dirty="0"/>
-              <a:t>                    </a:t>
-            </a:r>
-            <a:r>
-              <a:rPr lang="en-US" dirty="0"/>
-              <a:t>      </a:t>
-            </a:r>
-            <a:r>
-              <a:rPr dirty="0"/>
-              <a:t>   </a:t>
-            </a:r>
-            <a:r>
-              <a:rPr lang="en-US" dirty="0"/>
-              <a:t>	</a:t>
-            </a:r>
-            <a:r>
-              <a:rPr dirty="0"/>
-              <a:t>(</a:t>
-            </a:r>
-            <a:r>
-              <a:rPr dirty="0">
-                <a:solidFill>
-                  <a:srgbClr val="53585F"/>
-                </a:solidFill>
-              </a:rPr>
-              <a:t>not</a:t>
-            </a:r>
-            <a:r>
-              <a:rPr dirty="0"/>
-              <a:t> (</a:t>
-            </a:r>
-            <a:r>
-              <a:rPr dirty="0">
-                <a:solidFill>
-                  <a:schemeClr val="accent2"/>
-                </a:solidFill>
-              </a:rPr>
-              <a:t>in</a:t>
-            </a:r>
-            <a:r>
-              <a:rPr dirty="0"/>
-              <a:t> </a:t>
-            </a:r>
-            <a:r>
-              <a:rPr dirty="0">
-                <a:solidFill>
-                  <a:schemeClr val="accent5"/>
-                </a:solidFill>
-              </a:rPr>
-              <a:t>?rob ?r1</a:t>
-            </a:r>
-            <a:r>
-              <a:rPr dirty="0"/>
-              <a:t>)))</a:t>
-            </a:r>
-          </a:p>
-          <a:p>
-            <a:pPr marL="0" indent="0">
-              <a:lnSpc>
-                <a:spcPct val="50000"/>
-              </a:lnSpc>
-              <a:buNone/>
-              <a:defRPr b="1"/>
-            </a:pPr>
-            <a:r>
-              <a:rPr dirty="0"/>
-              <a:t>)</a:t>
-            </a:r>
-          </a:p>
-        </p:txBody>
-      </p:sp>
-    </p:spTree>
-  </p:cSld>
-  <p:clrMapOvr>
-    <a:masterClrMapping/>
-  </p:clrMapOvr>
-  <p:transition spd="med"/>
-</p:sld>
-</file>
-
-<file path=ppt/slides/slide11.xml><?xml version="1.0" encoding="utf-8"?>
-<p:sld xmlns:a="http://schemas.openxmlformats.org/drawingml/2006/main" xmlns:r="http://schemas.openxmlformats.org/officeDocument/2006/relationships" xmlns:p="http://schemas.openxmlformats.org/presentationml/2006/main">
-  <p:cSld>
-    <p:spTree>
-      <p:nvGrpSpPr>
-        <p:cNvPr id="1" name=""/>
-        <p:cNvGrpSpPr/>
-        <p:nvPr/>
-      </p:nvGrpSpPr>
-      <p:grpSpPr>
-        <a:xfrm>
-          <a:off x="0" y="0"/>
-          <a:ext cx="0" cy="0"/>
-          <a:chOff x="0" y="0"/>
-          <a:chExt cx="0" cy="0"/>
-        </a:xfrm>
-      </p:grpSpPr>
-      <p:sp>
-        <p:nvSpPr>
-          <p:cNvPr id="193" name="http://editor.planning.domains/ibm/crate-start"/>
-          <p:cNvSpPr txBox="1">
-            <a:spLocks noGrp="1"/>
-          </p:cNvSpPr>
-          <p:nvPr>
-            <p:ph type="body" idx="21"/>
-          </p:nvPr>
-        </p:nvSpPr>
-        <p:spPr>
-          <a:xfrm>
-            <a:off x="1190625" y="3018235"/>
-            <a:ext cx="9810750" cy="452432"/>
-          </a:xfrm>
-          <a:prstGeom prst="rect">
-            <a:avLst/>
-          </a:prstGeom>
-        </p:spPr>
-        <p:txBody>
-          <a:bodyPr/>
-          <a:lstStyle/>
-          <a:p>
-            <a:r>
-              <a:rPr sz="2600" dirty="0"/>
-              <a:t>http://editor.planning.domains/</a:t>
-            </a:r>
-            <a:r>
-              <a:rPr lang="en-US" sz="2600" dirty="0"/>
-              <a:t>planning-course</a:t>
-            </a:r>
-            <a:r>
-              <a:rPr sz="2600" dirty="0"/>
-              <a:t>/</a:t>
-            </a:r>
-            <a:r>
-              <a:rPr lang="en-US" sz="2600" dirty="0"/>
-              <a:t>fod/</a:t>
-            </a:r>
-            <a:r>
-              <a:rPr sz="2600" dirty="0"/>
-              <a:t>crate-start</a:t>
-            </a:r>
-          </a:p>
-        </p:txBody>
-      </p:sp>
-    </p:spTree>
-  </p:cSld>
-  <p:clrMapOvr>
-    <a:masterClrMapping/>
-  </p:clrMapOvr>
-  <p:transition spd="med"/>
-</p:sld>
-</file>
-
-<file path=ppt/slides/slide12.xml><?xml version="1.0" encoding="utf-8"?>
-<p:sld xmlns:a="http://schemas.openxmlformats.org/drawingml/2006/main" xmlns:r="http://schemas.openxmlformats.org/officeDocument/2006/relationships" xmlns:p="http://schemas.openxmlformats.org/presentationml/2006/main">
-  <p:cSld>
-    <p:spTree>
-      <p:nvGrpSpPr>
-        <p:cNvPr id="1" name=""/>
-        <p:cNvGrpSpPr/>
-        <p:nvPr/>
-      </p:nvGrpSpPr>
-      <p:grpSpPr>
-        <a:xfrm>
-          <a:off x="0" y="0"/>
-          <a:ext cx="0" cy="0"/>
-          <a:chOff x="0" y="0"/>
-          <a:chExt cx="0" cy="0"/>
-        </a:xfrm>
-      </p:grpSpPr>
-      <p:sp>
-        <p:nvSpPr>
-          <p:cNvPr id="187" name="Moving Crates: Action"/>
-          <p:cNvSpPr txBox="1">
-            <a:spLocks noGrp="1"/>
-          </p:cNvSpPr>
-          <p:nvPr>
-            <p:ph type="title"/>
-          </p:nvPr>
-        </p:nvSpPr>
-        <p:spPr>
-          <a:prstGeom prst="rect">
-            <a:avLst/>
-          </a:prstGeom>
-        </p:spPr>
-        <p:txBody>
-          <a:bodyPr/>
-          <a:lstStyle/>
-          <a:p>
-            <a:r>
-              <a:t>Moving Crates: Action</a:t>
-            </a:r>
-          </a:p>
-        </p:txBody>
-      </p:sp>
-      <p:sp>
-        <p:nvSpPr>
-          <p:cNvPr id="188" name="(move ?rob - robot ?r1 ?r2 - room)…"/>
-          <p:cNvSpPr txBox="1">
-            <a:spLocks noGrp="1"/>
-          </p:cNvSpPr>
-          <p:nvPr>
-            <p:ph type="body" idx="1"/>
-          </p:nvPr>
-        </p:nvSpPr>
-        <p:spPr>
-          <a:xfrm>
-            <a:off x="976313" y="1818752"/>
-            <a:ext cx="10239375" cy="5039248"/>
-          </a:xfrm>
-          <a:prstGeom prst="rect">
-            <a:avLst/>
-          </a:prstGeom>
-        </p:spPr>
-        <p:txBody>
-          <a:bodyPr>
-            <a:normAutofit/>
-          </a:bodyPr>
-          <a:lstStyle/>
-          <a:p>
-            <a:pPr marL="0" indent="0" defTabSz="316278">
-              <a:lnSpc>
-                <a:spcPct val="50000"/>
-              </a:lnSpc>
-              <a:spcBef>
-                <a:spcPts val="1687"/>
-              </a:spcBef>
-              <a:buNone/>
-              <a:defRPr sz="2772" b="1"/>
-            </a:pPr>
-            <a:r>
-              <a:rPr dirty="0"/>
-              <a:t>(</a:t>
-            </a:r>
-            <a:r>
-              <a:rPr b="0" dirty="0">
-                <a:solidFill>
-                  <a:schemeClr val="accent4"/>
-                </a:solidFill>
-              </a:rPr>
-              <a:t>move</a:t>
-            </a:r>
-            <a:r>
-              <a:rPr b="0" dirty="0">
-                <a:solidFill>
-                  <a:schemeClr val="accent6">
-                    <a:hueOff val="52948"/>
-                    <a:satOff val="5436"/>
-                    <a:lumOff val="-12041"/>
-                  </a:schemeClr>
-                </a:solidFill>
-              </a:rPr>
-              <a:t> </a:t>
-            </a:r>
-            <a:r>
-              <a:rPr b="0" dirty="0">
-                <a:solidFill>
-                  <a:schemeClr val="accent5"/>
-                </a:solidFill>
-              </a:rPr>
-              <a:t>?rob </a:t>
-            </a:r>
-            <a:r>
-              <a:rPr b="0" dirty="0">
-                <a:solidFill>
-                  <a:schemeClr val="accent6">
-                    <a:hueOff val="52948"/>
-                    <a:satOff val="5436"/>
-                    <a:lumOff val="-12041"/>
-                  </a:schemeClr>
-                </a:solidFill>
-              </a:rPr>
-              <a:t>- </a:t>
-            </a:r>
-            <a:r>
-              <a:rPr b="0" dirty="0">
-                <a:solidFill>
-                  <a:schemeClr val="accent3"/>
-                </a:solidFill>
-              </a:rPr>
-              <a:t>robot</a:t>
-            </a:r>
-            <a:r>
-              <a:rPr b="0" dirty="0">
-                <a:solidFill>
-                  <a:schemeClr val="accent6">
-                    <a:hueOff val="52948"/>
-                    <a:satOff val="5436"/>
-                    <a:lumOff val="-12041"/>
-                  </a:schemeClr>
-                </a:solidFill>
-              </a:rPr>
-              <a:t> </a:t>
-            </a:r>
-            <a:r>
-              <a:rPr b="0" dirty="0">
-                <a:solidFill>
-                  <a:schemeClr val="accent5"/>
-                </a:solidFill>
-              </a:rPr>
-              <a:t>?r1 ?r2</a:t>
-            </a:r>
-            <a:r>
-              <a:rPr b="0" dirty="0">
-                <a:solidFill>
-                  <a:schemeClr val="accent6">
-                    <a:hueOff val="52948"/>
-                    <a:satOff val="5436"/>
-                    <a:lumOff val="-12041"/>
-                  </a:schemeClr>
-                </a:solidFill>
-              </a:rPr>
-              <a:t> - </a:t>
-            </a:r>
-            <a:r>
-              <a:rPr b="0" dirty="0">
-                <a:solidFill>
-                  <a:schemeClr val="accent3"/>
-                </a:solidFill>
-              </a:rPr>
-              <a:t>room</a:t>
-            </a:r>
-            <a:r>
-              <a:rPr dirty="0"/>
-              <a:t>)</a:t>
-            </a:r>
-          </a:p>
-          <a:p>
-            <a:pPr marL="481292" lvl="1" indent="-240646" defTabSz="316278">
-              <a:lnSpc>
-                <a:spcPct val="50000"/>
-              </a:lnSpc>
-              <a:spcBef>
-                <a:spcPts val="1687"/>
-              </a:spcBef>
-              <a:defRPr sz="2772" b="1"/>
-            </a:pPr>
-            <a:r>
-              <a:rPr dirty="0"/>
-              <a:t>Pre:</a:t>
-            </a:r>
-            <a:r>
-              <a:rPr b="0" dirty="0"/>
-              <a:t> Robot in right location, and rooms connected</a:t>
-            </a:r>
-          </a:p>
-          <a:p>
-            <a:pPr marL="481292" lvl="1" indent="-240646" defTabSz="316278">
-              <a:lnSpc>
-                <a:spcPct val="50000"/>
-              </a:lnSpc>
-              <a:spcBef>
-                <a:spcPts val="1687"/>
-              </a:spcBef>
-              <a:defRPr sz="2772" b="1"/>
-            </a:pPr>
-            <a:r>
-              <a:rPr dirty="0"/>
-              <a:t>Eff</a:t>
-            </a:r>
-            <a:r>
-              <a:rPr b="0" dirty="0"/>
-              <a:t>: Robot in new room</a:t>
-            </a:r>
-          </a:p>
-          <a:p>
-            <a:pPr marL="0" indent="0" defTabSz="316278">
-              <a:lnSpc>
-                <a:spcPct val="50000"/>
-              </a:lnSpc>
-              <a:spcBef>
-                <a:spcPts val="1687"/>
-              </a:spcBef>
-              <a:buNone/>
-              <a:defRPr sz="2772" b="1"/>
-            </a:pPr>
-            <a:br>
-              <a:rPr b="0" dirty="0"/>
-            </a:br>
-            <a:br>
-              <a:rPr b="0" dirty="0"/>
-            </a:br>
-            <a:r>
-              <a:rPr dirty="0"/>
-              <a:t>(</a:t>
-            </a:r>
-            <a:r>
-              <a:rPr b="0" dirty="0">
-                <a:solidFill>
-                  <a:schemeClr val="accent4"/>
-                </a:solidFill>
-              </a:rPr>
-              <a:t>drop</a:t>
-            </a:r>
-            <a:r>
-              <a:rPr b="0" dirty="0">
-                <a:solidFill>
-                  <a:schemeClr val="accent6">
-                    <a:hueOff val="52948"/>
-                    <a:satOff val="5436"/>
-                    <a:lumOff val="-12041"/>
-                  </a:schemeClr>
-                </a:solidFill>
-              </a:rPr>
-              <a:t> </a:t>
-            </a:r>
-            <a:r>
-              <a:rPr b="0" dirty="0">
-                <a:solidFill>
-                  <a:schemeClr val="accent5"/>
-                </a:solidFill>
-              </a:rPr>
-              <a:t>?rob </a:t>
-            </a:r>
-            <a:r>
-              <a:rPr b="0" dirty="0">
-                <a:solidFill>
-                  <a:schemeClr val="accent6">
-                    <a:hueOff val="52948"/>
-                    <a:satOff val="5436"/>
-                    <a:lumOff val="-12041"/>
-                  </a:schemeClr>
-                </a:solidFill>
-              </a:rPr>
-              <a:t>- </a:t>
-            </a:r>
-            <a:r>
-              <a:rPr b="0" dirty="0">
-                <a:solidFill>
-                  <a:schemeClr val="accent3"/>
-                </a:solidFill>
-              </a:rPr>
-              <a:t>robot</a:t>
-            </a:r>
-            <a:r>
-              <a:rPr b="0" dirty="0">
-                <a:solidFill>
-                  <a:schemeClr val="accent6">
-                    <a:hueOff val="52948"/>
-                    <a:satOff val="5436"/>
-                    <a:lumOff val="-12041"/>
-                  </a:schemeClr>
-                </a:solidFill>
-              </a:rPr>
-              <a:t> </a:t>
-            </a:r>
-            <a:r>
-              <a:rPr b="0" dirty="0">
-                <a:solidFill>
-                  <a:schemeClr val="accent5"/>
-                </a:solidFill>
-              </a:rPr>
-              <a:t>?rm </a:t>
-            </a:r>
-            <a:r>
-              <a:rPr b="0" dirty="0">
-                <a:solidFill>
-                  <a:schemeClr val="accent6">
-                    <a:hueOff val="52948"/>
-                    <a:satOff val="5436"/>
-                    <a:lumOff val="-12041"/>
-                  </a:schemeClr>
-                </a:solidFill>
-              </a:rPr>
-              <a:t>- </a:t>
-            </a:r>
-            <a:r>
-              <a:rPr b="0" dirty="0">
-                <a:solidFill>
-                  <a:schemeClr val="accent3"/>
-                </a:solidFill>
-              </a:rPr>
-              <a:t>room</a:t>
-            </a:r>
-            <a:r>
-              <a:rPr b="0" dirty="0">
-                <a:solidFill>
-                  <a:schemeClr val="accent6">
-                    <a:hueOff val="52948"/>
-                    <a:satOff val="5436"/>
-                    <a:lumOff val="-12041"/>
-                  </a:schemeClr>
-                </a:solidFill>
-              </a:rPr>
-              <a:t> </a:t>
-            </a:r>
-            <a:r>
-              <a:rPr b="0" dirty="0">
-                <a:solidFill>
-                  <a:schemeClr val="accent5"/>
-                </a:solidFill>
-              </a:rPr>
-              <a:t>?c</a:t>
-            </a:r>
-            <a:r>
-              <a:rPr b="0" dirty="0">
-                <a:solidFill>
-                  <a:schemeClr val="accent6">
-                    <a:hueOff val="52948"/>
-                    <a:satOff val="5436"/>
-                    <a:lumOff val="-12041"/>
-                  </a:schemeClr>
-                </a:solidFill>
-              </a:rPr>
-              <a:t> - </a:t>
-            </a:r>
-            <a:r>
-              <a:rPr b="0" dirty="0">
-                <a:solidFill>
-                  <a:schemeClr val="accent3"/>
-                </a:solidFill>
-              </a:rPr>
-              <a:t>crate</a:t>
-            </a:r>
-            <a:r>
-              <a:rPr dirty="0"/>
-              <a:t>)</a:t>
-            </a:r>
-          </a:p>
-          <a:p>
-            <a:pPr marL="481292" lvl="1" indent="-240646" defTabSz="316278">
-              <a:lnSpc>
-                <a:spcPct val="50000"/>
-              </a:lnSpc>
-              <a:spcBef>
-                <a:spcPts val="1687"/>
-              </a:spcBef>
-              <a:defRPr sz="2772" b="1"/>
-            </a:pPr>
-            <a:r>
-              <a:rPr dirty="0"/>
-              <a:t>Pre:</a:t>
-            </a:r>
-            <a:r>
-              <a:rPr b="0" dirty="0"/>
-              <a:t> Robot in right room, and holding crate</a:t>
-            </a:r>
-          </a:p>
-          <a:p>
-            <a:pPr marL="481292" lvl="1" indent="-240646" defTabSz="316278">
-              <a:lnSpc>
-                <a:spcPct val="50000"/>
-              </a:lnSpc>
-              <a:spcBef>
-                <a:spcPts val="1687"/>
-              </a:spcBef>
-              <a:defRPr sz="2772" b="1"/>
-            </a:pPr>
-            <a:r>
-              <a:rPr dirty="0"/>
-              <a:t>Eff: </a:t>
-            </a:r>
-            <a:r>
-              <a:rPr b="0" dirty="0"/>
-              <a:t>Crate now in room, and hand is free</a:t>
-            </a:r>
-          </a:p>
-          <a:p>
-            <a:pPr marL="0" indent="0" defTabSz="316278">
-              <a:lnSpc>
-                <a:spcPct val="50000"/>
-              </a:lnSpc>
-              <a:spcBef>
-                <a:spcPts val="1687"/>
-              </a:spcBef>
-              <a:buNone/>
-              <a:defRPr sz="2772" b="1"/>
-            </a:pPr>
-            <a:br>
-              <a:rPr b="0" dirty="0"/>
-            </a:br>
-            <a:br>
-              <a:rPr b="0" dirty="0"/>
-            </a:br>
-            <a:r>
-              <a:rPr dirty="0"/>
-              <a:t>(</a:t>
-            </a:r>
-            <a:r>
-              <a:rPr b="0" dirty="0">
-                <a:solidFill>
-                  <a:schemeClr val="accent4"/>
-                </a:solidFill>
-              </a:rPr>
-              <a:t>pickup</a:t>
-            </a:r>
-            <a:r>
-              <a:rPr b="0" dirty="0">
-                <a:solidFill>
-                  <a:schemeClr val="accent6">
-                    <a:hueOff val="52948"/>
-                    <a:satOff val="5436"/>
-                    <a:lumOff val="-12041"/>
-                  </a:schemeClr>
-                </a:solidFill>
-              </a:rPr>
-              <a:t> </a:t>
-            </a:r>
-            <a:r>
-              <a:rPr b="0" dirty="0">
-                <a:solidFill>
-                  <a:schemeClr val="accent5"/>
-                </a:solidFill>
-              </a:rPr>
-              <a:t>?rob </a:t>
-            </a:r>
-            <a:r>
-              <a:rPr b="0" dirty="0">
-                <a:solidFill>
-                  <a:schemeClr val="accent6">
-                    <a:hueOff val="52948"/>
-                    <a:satOff val="5436"/>
-                    <a:lumOff val="-12041"/>
-                  </a:schemeClr>
-                </a:solidFill>
-              </a:rPr>
-              <a:t>- </a:t>
-            </a:r>
-            <a:r>
-              <a:rPr b="0" dirty="0">
-                <a:solidFill>
-                  <a:schemeClr val="accent3"/>
-                </a:solidFill>
-              </a:rPr>
-              <a:t>robot</a:t>
-            </a:r>
-            <a:r>
-              <a:rPr b="0" dirty="0">
-                <a:solidFill>
-                  <a:schemeClr val="accent6">
-                    <a:hueOff val="52948"/>
-                    <a:satOff val="5436"/>
-                    <a:lumOff val="-12041"/>
-                  </a:schemeClr>
-                </a:solidFill>
-              </a:rPr>
-              <a:t> </a:t>
-            </a:r>
-            <a:r>
-              <a:rPr b="0" dirty="0">
-                <a:solidFill>
-                  <a:schemeClr val="accent5"/>
-                </a:solidFill>
-              </a:rPr>
-              <a:t>?rm </a:t>
-            </a:r>
-            <a:r>
-              <a:rPr b="0" dirty="0">
-                <a:solidFill>
-                  <a:schemeClr val="accent6">
-                    <a:hueOff val="52948"/>
-                    <a:satOff val="5436"/>
-                    <a:lumOff val="-12041"/>
-                  </a:schemeClr>
-                </a:solidFill>
-              </a:rPr>
-              <a:t>- </a:t>
-            </a:r>
-            <a:r>
-              <a:rPr b="0" dirty="0">
-                <a:solidFill>
-                  <a:schemeClr val="accent3"/>
-                </a:solidFill>
-              </a:rPr>
-              <a:t>room</a:t>
-            </a:r>
-            <a:r>
-              <a:rPr b="0" dirty="0">
-                <a:solidFill>
-                  <a:schemeClr val="accent6">
-                    <a:hueOff val="52948"/>
-                    <a:satOff val="5436"/>
-                    <a:lumOff val="-12041"/>
-                  </a:schemeClr>
-                </a:solidFill>
-              </a:rPr>
-              <a:t> </a:t>
-            </a:r>
-            <a:r>
-              <a:rPr b="0" dirty="0">
-                <a:solidFill>
-                  <a:schemeClr val="accent5"/>
-                </a:solidFill>
-              </a:rPr>
-              <a:t>?c</a:t>
-            </a:r>
-            <a:r>
-              <a:rPr b="0" dirty="0">
-                <a:solidFill>
-                  <a:schemeClr val="accent6">
-                    <a:hueOff val="52948"/>
-                    <a:satOff val="5436"/>
-                    <a:lumOff val="-12041"/>
-                  </a:schemeClr>
-                </a:solidFill>
-              </a:rPr>
-              <a:t> - </a:t>
-            </a:r>
-            <a:r>
-              <a:rPr b="0" dirty="0">
-                <a:solidFill>
-                  <a:schemeClr val="accent3"/>
-                </a:solidFill>
-              </a:rPr>
-              <a:t>crate</a:t>
-            </a:r>
-            <a:r>
-              <a:rPr dirty="0"/>
-              <a:t>)</a:t>
-            </a:r>
-          </a:p>
-          <a:p>
-            <a:pPr marL="481292" lvl="1" indent="-240646" defTabSz="316278">
-              <a:lnSpc>
-                <a:spcPct val="50000"/>
-              </a:lnSpc>
-              <a:spcBef>
-                <a:spcPts val="1687"/>
-              </a:spcBef>
-              <a:defRPr sz="2772" b="1"/>
-            </a:pPr>
-            <a:r>
-              <a:rPr dirty="0"/>
-              <a:t>Pre:</a:t>
-            </a:r>
-            <a:r>
-              <a:rPr b="0" dirty="0"/>
-              <a:t> Robot in right room, and hand is free</a:t>
-            </a:r>
-          </a:p>
-          <a:p>
-            <a:pPr marL="481292" lvl="1" indent="-240646" defTabSz="316278">
-              <a:lnSpc>
-                <a:spcPct val="50000"/>
-              </a:lnSpc>
-              <a:spcBef>
-                <a:spcPts val="1687"/>
-              </a:spcBef>
-              <a:defRPr sz="2772" b="1"/>
-            </a:pPr>
-            <a:r>
-              <a:rPr dirty="0"/>
-              <a:t>Eff: </a:t>
-            </a:r>
-            <a:r>
-              <a:rPr b="0" dirty="0"/>
-              <a:t>Crate now being held</a:t>
-            </a:r>
-          </a:p>
-        </p:txBody>
-      </p:sp>
-    </p:spTree>
-    <p:extLst>
-      <p:ext uri="{BB962C8B-B14F-4D97-AF65-F5344CB8AC3E}">
-        <p14:creationId xmlns:p14="http://schemas.microsoft.com/office/powerpoint/2010/main" val="3526007069"/>
-      </p:ext>
-    </p:extLst>
-  </p:cSld>
-  <p:clrMapOvr>
-    <a:masterClrMapping/>
-  </p:clrMapOvr>
-  <p:transition spd="med"/>
-</p:sld>
-</file>
-
-<file path=ppt/slides/slide13.xml><?xml version="1.0" encoding="utf-8"?>
-<p:sld xmlns:a="http://schemas.openxmlformats.org/drawingml/2006/main" xmlns:r="http://schemas.openxmlformats.org/officeDocument/2006/relationships" xmlns:p="http://schemas.openxmlformats.org/presentationml/2006/main">
-  <p:cSld>
-    <p:spTree>
-      <p:nvGrpSpPr>
-        <p:cNvPr id="1" name=""/>
-        <p:cNvGrpSpPr/>
-        <p:nvPr/>
-      </p:nvGrpSpPr>
-      <p:grpSpPr>
-        <a:xfrm>
-          <a:off x="0" y="0"/>
-          <a:ext cx="0" cy="0"/>
-          <a:chOff x="0" y="0"/>
-          <a:chExt cx="0" cy="0"/>
-        </a:xfrm>
-      </p:grpSpPr>
-      <p:sp>
-        <p:nvSpPr>
-          <p:cNvPr id="198" name="http://editor.planning.domains/ibm/crate-fin"/>
-          <p:cNvSpPr txBox="1">
-            <a:spLocks noGrp="1"/>
-          </p:cNvSpPr>
-          <p:nvPr>
-            <p:ph type="body" idx="21"/>
-          </p:nvPr>
-        </p:nvSpPr>
-        <p:spPr>
-          <a:xfrm>
-            <a:off x="1190625" y="3018235"/>
-            <a:ext cx="9810750" cy="452432"/>
-          </a:xfrm>
-          <a:prstGeom prst="rect">
-            <a:avLst/>
-          </a:prstGeom>
-        </p:spPr>
-        <p:txBody>
-          <a:bodyPr/>
-          <a:lstStyle/>
-          <a:p>
-            <a:r>
-              <a:rPr sz="2600" dirty="0"/>
-              <a:t>http://editor.planning.domains/</a:t>
-            </a:r>
-            <a:r>
-              <a:rPr lang="en-US" sz="2600" dirty="0"/>
-              <a:t>planning-course</a:t>
-            </a:r>
-            <a:r>
-              <a:rPr sz="2600" dirty="0"/>
-              <a:t>/</a:t>
-            </a:r>
-            <a:r>
-              <a:rPr lang="en-US" sz="2600" dirty="0"/>
-              <a:t>fod/</a:t>
-            </a:r>
-            <a:r>
-              <a:rPr sz="2600" dirty="0"/>
-              <a:t>crate-fin</a:t>
-            </a:r>
-          </a:p>
-        </p:txBody>
-      </p:sp>
-    </p:spTree>
-  </p:cSld>
-  <p:clrMapOvr>
-    <a:masterClrMapping/>
-  </p:clrMapOvr>
-  <p:transition spd="med"/>
-</p:sld>
-</file>
-
-<file path=ppt/slides/slide14.xml><?xml version="1.0" encoding="utf-8"?>
-<p:sld xmlns:a="http://schemas.openxmlformats.org/drawingml/2006/main" xmlns:r="http://schemas.openxmlformats.org/officeDocument/2006/relationships" xmlns:p="http://schemas.openxmlformats.org/presentationml/2006/main">
-  <p:cSld>
-    <p:spTree>
-      <p:nvGrpSpPr>
-        <p:cNvPr id="1" name=""/>
-        <p:cNvGrpSpPr/>
-        <p:nvPr/>
-      </p:nvGrpSpPr>
-      <p:grpSpPr>
-        <a:xfrm>
-          <a:off x="0" y="0"/>
-          <a:ext cx="0" cy="0"/>
-          <a:chOff x="0" y="0"/>
-          <a:chExt cx="0" cy="0"/>
-        </a:xfrm>
-      </p:grpSpPr>
-      <p:sp>
-        <p:nvSpPr>
-          <p:cNvPr id="200" name="Stacking Setarc"/>
-          <p:cNvSpPr txBox="1">
-            <a:spLocks noGrp="1"/>
-          </p:cNvSpPr>
-          <p:nvPr>
-            <p:ph type="title"/>
-          </p:nvPr>
-        </p:nvSpPr>
-        <p:spPr>
-          <a:prstGeom prst="rect">
-            <a:avLst/>
-          </a:prstGeom>
-        </p:spPr>
-        <p:txBody>
-          <a:bodyPr/>
-          <a:lstStyle/>
-          <a:p>
-            <a:r>
-              <a:t>Stacking Setarc</a:t>
-            </a:r>
-          </a:p>
-        </p:txBody>
-      </p:sp>
-      <p:sp>
-        <p:nvSpPr>
-          <p:cNvPr id="201" name="Task: Shift the elusive Setarc in such a way that the           desired configuration is achieved…"/>
-          <p:cNvSpPr txBox="1">
-            <a:spLocks noGrp="1"/>
-          </p:cNvSpPr>
-          <p:nvPr>
-            <p:ph type="body" idx="1"/>
-          </p:nvPr>
-        </p:nvSpPr>
-        <p:spPr>
-          <a:prstGeom prst="rect">
-            <a:avLst/>
-          </a:prstGeom>
-        </p:spPr>
-        <p:txBody>
-          <a:bodyPr>
-            <a:normAutofit fontScale="92500" lnSpcReduction="20000"/>
-          </a:bodyPr>
-          <a:lstStyle/>
-          <a:p>
-            <a:pPr marL="0" indent="0" defTabSz="390213">
-              <a:spcBef>
-                <a:spcPts val="2109"/>
-              </a:spcBef>
-              <a:buNone/>
-              <a:defRPr sz="3420" b="1"/>
-            </a:pPr>
-            <a:r>
-              <a:rPr dirty="0"/>
-              <a:t>Task</a:t>
-            </a:r>
-            <a:r>
-              <a:rPr b="0" dirty="0"/>
-              <a:t>:</a:t>
-            </a:r>
-            <a:r>
-              <a:rPr lang="en-US" b="0" dirty="0"/>
-              <a:t>	</a:t>
-            </a:r>
-            <a:r>
-              <a:rPr b="0" dirty="0"/>
-              <a:t>Shift the elusive </a:t>
-            </a:r>
-            <a:r>
-              <a:rPr b="0" i="1" dirty="0" err="1"/>
-              <a:t>Setarc</a:t>
-            </a:r>
-            <a:r>
-              <a:rPr b="0" dirty="0"/>
-              <a:t> in such a way that the</a:t>
-            </a:r>
-            <a:br>
-              <a:rPr b="0" dirty="0"/>
-            </a:br>
-            <a:r>
-              <a:rPr lang="en-US" b="0" dirty="0"/>
-              <a:t>			</a:t>
-            </a:r>
-            <a:r>
-              <a:rPr b="0" dirty="0"/>
-              <a:t>desired configuration is achieved</a:t>
-            </a:r>
-          </a:p>
-          <a:p>
-            <a:pPr marL="296902" indent="-296902" defTabSz="390213">
-              <a:spcBef>
-                <a:spcPts val="2109"/>
-              </a:spcBef>
-              <a:defRPr sz="3420" b="1"/>
-            </a:pPr>
-            <a:r>
-              <a:rPr dirty="0"/>
-              <a:t>Types</a:t>
-            </a:r>
-            <a:r>
-              <a:rPr b="0" dirty="0"/>
-              <a:t>: </a:t>
-            </a:r>
-            <a:r>
-              <a:rPr b="0" i="1" dirty="0"/>
-              <a:t>none</a:t>
-            </a:r>
-            <a:endParaRPr b="0" dirty="0"/>
-          </a:p>
-          <a:p>
-            <a:pPr marL="296902" indent="-296902" defTabSz="390213">
-              <a:spcBef>
-                <a:spcPts val="2109"/>
-              </a:spcBef>
-              <a:defRPr sz="3420" b="1"/>
-            </a:pPr>
-            <a:r>
-              <a:rPr dirty="0"/>
-              <a:t>Predicates</a:t>
-            </a:r>
-            <a:r>
-              <a:rPr b="0" dirty="0"/>
-              <a:t>: </a:t>
-            </a:r>
-            <a:r>
-              <a:rPr b="0" dirty="0">
-                <a:solidFill>
-                  <a:schemeClr val="accent2"/>
-                </a:solidFill>
-              </a:rPr>
-              <a:t>on</a:t>
-            </a:r>
-            <a:r>
-              <a:rPr b="0" dirty="0"/>
-              <a:t>,</a:t>
-            </a:r>
-            <a:r>
-              <a:rPr b="0" dirty="0">
-                <a:solidFill>
-                  <a:schemeClr val="accent2">
-                    <a:satOff val="21919"/>
-                    <a:lumOff val="-20666"/>
-                  </a:schemeClr>
-                </a:solidFill>
-              </a:rPr>
-              <a:t> </a:t>
-            </a:r>
-            <a:r>
-              <a:rPr b="0" dirty="0">
-                <a:solidFill>
-                  <a:schemeClr val="accent2"/>
-                </a:solidFill>
-              </a:rPr>
-              <a:t>top</a:t>
-            </a:r>
-          </a:p>
-          <a:p>
-            <a:pPr marL="296902" indent="-296902" defTabSz="390213">
-              <a:spcBef>
-                <a:spcPts val="2109"/>
-              </a:spcBef>
-              <a:defRPr sz="3420" b="1"/>
-            </a:pPr>
-            <a:r>
-              <a:rPr dirty="0"/>
-              <a:t>Actions</a:t>
-            </a:r>
-            <a:r>
-              <a:rPr b="0" dirty="0"/>
-              <a:t>: </a:t>
-            </a:r>
-            <a:r>
-              <a:rPr b="0" dirty="0">
-                <a:solidFill>
-                  <a:schemeClr val="accent4"/>
-                </a:solidFill>
-              </a:rPr>
-              <a:t>shift</a:t>
-            </a:r>
-          </a:p>
-          <a:p>
-            <a:pPr marL="593803" lvl="1" indent="-296902" defTabSz="390213">
-              <a:spcBef>
-                <a:spcPts val="2109"/>
-              </a:spcBef>
-              <a:defRPr sz="3420" b="1"/>
-            </a:pPr>
-            <a:r>
-              <a:rPr b="0" dirty="0"/>
-              <a:t>Move a </a:t>
-            </a:r>
-            <a:r>
-              <a:rPr b="0" dirty="0" err="1"/>
-              <a:t>Setarc</a:t>
-            </a:r>
-            <a:r>
-              <a:rPr b="0" dirty="0"/>
-              <a:t> from the top of one stack to another</a:t>
-            </a:r>
-          </a:p>
-          <a:p>
-            <a:pPr marL="296902" indent="-296902" defTabSz="390213">
-              <a:spcBef>
-                <a:spcPts val="2109"/>
-              </a:spcBef>
-              <a:defRPr sz="3420" b="1"/>
-            </a:pPr>
-            <a:r>
-              <a:rPr dirty="0"/>
-              <a:t>Initial State / Goal</a:t>
-            </a:r>
-            <a:r>
-              <a:rPr b="0" dirty="0"/>
-              <a:t>: Shift the </a:t>
-            </a:r>
-            <a:r>
-              <a:rPr b="0" dirty="0" err="1"/>
-              <a:t>Setarc</a:t>
-            </a:r>
-            <a:r>
-              <a:rPr b="0" dirty="0"/>
-              <a:t>!</a:t>
-            </a:r>
-          </a:p>
-        </p:txBody>
-      </p:sp>
-    </p:spTree>
-  </p:cSld>
-  <p:clrMapOvr>
-    <a:masterClrMapping/>
-  </p:clrMapOvr>
-  <p:transition spd="med"/>
-</p:sld>
-</file>
-
-<file path=ppt/slides/slide15.xml><?xml version="1.0" encoding="utf-8"?>
-<p:sld xmlns:a="http://schemas.openxmlformats.org/drawingml/2006/main" xmlns:r="http://schemas.openxmlformats.org/officeDocument/2006/relationships" xmlns:p="http://schemas.openxmlformats.org/presentationml/2006/main">
-  <p:cSld>
-    <p:spTree>
-      <p:nvGrpSpPr>
-        <p:cNvPr id="1" name=""/>
-        <p:cNvGrpSpPr/>
-        <p:nvPr/>
-      </p:nvGrpSpPr>
-      <p:grpSpPr>
-        <a:xfrm>
-          <a:off x="0" y="0"/>
-          <a:ext cx="0" cy="0"/>
-          <a:chOff x="0" y="0"/>
-          <a:chExt cx="0" cy="0"/>
-        </a:xfrm>
-      </p:grpSpPr>
-      <p:sp>
-        <p:nvSpPr>
-          <p:cNvPr id="203" name="http://editor.planning.domains/ibm/setarc"/>
-          <p:cNvSpPr txBox="1">
-            <a:spLocks noGrp="1"/>
-          </p:cNvSpPr>
-          <p:nvPr>
-            <p:ph type="body" idx="21"/>
-          </p:nvPr>
-        </p:nvSpPr>
-        <p:spPr>
-          <a:xfrm>
-            <a:off x="1190625" y="3018235"/>
-            <a:ext cx="9810750" cy="452432"/>
-          </a:xfrm>
-          <a:prstGeom prst="rect">
-            <a:avLst/>
-          </a:prstGeom>
-        </p:spPr>
-        <p:txBody>
-          <a:bodyPr/>
-          <a:lstStyle/>
-          <a:p>
-            <a:r>
-              <a:rPr sz="2600" dirty="0"/>
-              <a:t>http://editor.planning.domains/</a:t>
-            </a:r>
-            <a:r>
-              <a:rPr lang="en-US" sz="2600" dirty="0"/>
-              <a:t>planning-course</a:t>
-            </a:r>
-            <a:r>
-              <a:rPr sz="2600" dirty="0"/>
-              <a:t>/</a:t>
-            </a:r>
-            <a:r>
-              <a:rPr lang="en-US" sz="2600" dirty="0"/>
-              <a:t>fod/</a:t>
-            </a:r>
-            <a:r>
-              <a:rPr sz="2600" dirty="0"/>
-              <a:t>setarc</a:t>
-            </a:r>
-          </a:p>
-        </p:txBody>
-      </p:sp>
-    </p:spTree>
-  </p:cSld>
-  <p:clrMapOvr>
-    <a:masterClrMapping/>
-  </p:clrMapOvr>
-  <p:transition spd="med"/>
-</p:sld>
-</file>
-
-<file path=ppt/slides/slide16.xml><?xml version="1.0" encoding="utf-8"?>
-<p:sld xmlns:a="http://schemas.openxmlformats.org/drawingml/2006/main" xmlns:r="http://schemas.openxmlformats.org/officeDocument/2006/relationships" xmlns:p="http://schemas.openxmlformats.org/presentationml/2006/main">
-  <p:cSld>
-    <p:spTree>
-      <p:nvGrpSpPr>
-        <p:cNvPr id="1" name=""/>
-        <p:cNvGrpSpPr/>
-        <p:nvPr/>
-      </p:nvGrpSpPr>
-      <p:grpSpPr>
-        <a:xfrm>
-          <a:off x="0" y="0"/>
-          <a:ext cx="0" cy="0"/>
-          <a:chOff x="0" y="0"/>
-          <a:chExt cx="0" cy="0"/>
-        </a:xfrm>
-      </p:grpSpPr>
-      <p:pic>
-        <p:nvPicPr>
-          <p:cNvPr id="205" name="PSM_V26_D464_The_tower_of_hanoi.jpg" descr="PSM_V26_D464_The_tower_of_hanoi.jpg"/>
-          <p:cNvPicPr>
-            <a:picLocks noGrp="1"/>
-          </p:cNvPicPr>
-          <p:nvPr>
-            <p:ph type="pic" idx="21"/>
-          </p:nvPr>
-        </p:nvPicPr>
-        <p:blipFill>
-          <a:blip r:embed="rId2"/>
-          <a:stretch>
-            <a:fillRect/>
-          </a:stretch>
-        </p:blipFill>
-        <p:spPr>
-          <a:xfrm>
-            <a:off x="5957246" y="659115"/>
-            <a:ext cx="4185432" cy="5539771"/>
-          </a:xfrm>
-          <a:prstGeom prst="rect">
-            <a:avLst/>
-          </a:prstGeom>
-        </p:spPr>
-      </p:pic>
-      <p:sp>
-        <p:nvSpPr>
-          <p:cNvPr id="206" name="Setarc??"/>
-          <p:cNvSpPr txBox="1">
-            <a:spLocks noGrp="1"/>
-          </p:cNvSpPr>
-          <p:nvPr>
-            <p:ph type="title"/>
-          </p:nvPr>
-        </p:nvSpPr>
-        <p:spPr>
-          <a:prstGeom prst="rect">
-            <a:avLst/>
-          </a:prstGeom>
-        </p:spPr>
-        <p:txBody>
-          <a:bodyPr/>
-          <a:lstStyle/>
-          <a:p>
-            <a:r>
-              <a:t>Setarc??</a:t>
-            </a:r>
-          </a:p>
-        </p:txBody>
-      </p:sp>
-      <p:sp>
-        <p:nvSpPr>
-          <p:cNvPr id="207" name="“Crates”.reverse( )"/>
-          <p:cNvSpPr txBox="1">
-            <a:spLocks noGrp="1"/>
-          </p:cNvSpPr>
-          <p:nvPr>
-            <p:ph type="body" sz="quarter" idx="1"/>
-          </p:nvPr>
-        </p:nvSpPr>
-        <p:spPr>
-          <a:xfrm>
-            <a:off x="2669849" y="3174521"/>
-            <a:ext cx="2342454" cy="526818"/>
-          </a:xfrm>
-          <a:prstGeom prst="rect">
-            <a:avLst/>
-          </a:prstGeom>
-        </p:spPr>
-        <p:txBody>
-          <a:bodyPr/>
-          <a:lstStyle>
-            <a:lvl1pPr marL="0" indent="0">
-              <a:buSzTx/>
-              <a:buNone/>
-            </a:lvl1pPr>
-          </a:lstStyle>
-          <a:p>
-            <a:r>
-              <a:t>“Crates”.reverse( )</a:t>
-            </a:r>
-          </a:p>
-        </p:txBody>
-      </p:sp>
-    </p:spTree>
-  </p:cSld>
-  <p:clrMapOvr>
-    <a:masterClrMapping/>
-  </p:clrMapOvr>
-  <p:transition spd="med"/>
-</p:sld>
-</file>
-
-<file path=ppt/slides/slide17.xml><?xml version="1.0" encoding="utf-8"?>
-<p:sld xmlns:a="http://schemas.openxmlformats.org/drawingml/2006/main" xmlns:r="http://schemas.openxmlformats.org/officeDocument/2006/relationships" xmlns:p="http://schemas.openxmlformats.org/presentationml/2006/main">
-  <p:cSld>
-    <p:spTree>
-      <p:nvGrpSpPr>
-        <p:cNvPr id="1" name=""/>
-        <p:cNvGrpSpPr/>
-        <p:nvPr/>
-      </p:nvGrpSpPr>
-      <p:grpSpPr>
-        <a:xfrm>
-          <a:off x="0" y="0"/>
-          <a:ext cx="0" cy="0"/>
-          <a:chOff x="0" y="0"/>
-          <a:chExt cx="0" cy="0"/>
-        </a:xfrm>
-      </p:grpSpPr>
-      <p:sp>
-        <p:nvSpPr>
-          <p:cNvPr id="209" name="http://editor.planning.domains/ibm/setarc-nif"/>
-          <p:cNvSpPr txBox="1">
-            <a:spLocks noGrp="1"/>
-          </p:cNvSpPr>
-          <p:nvPr>
-            <p:ph type="body" idx="21"/>
-          </p:nvPr>
-        </p:nvSpPr>
-        <p:spPr>
-          <a:xfrm>
-            <a:off x="1190625" y="3018235"/>
-            <a:ext cx="9810750" cy="452432"/>
-          </a:xfrm>
-          <a:prstGeom prst="rect">
-            <a:avLst/>
-          </a:prstGeom>
-        </p:spPr>
-        <p:txBody>
-          <a:bodyPr/>
-          <a:lstStyle/>
-          <a:p>
-            <a:r>
-              <a:rPr sz="2600" dirty="0"/>
-              <a:t>http://editor.planning.domains/</a:t>
-            </a:r>
-            <a:r>
-              <a:rPr lang="en-US" sz="2600" dirty="0"/>
-              <a:t>planning-course</a:t>
-            </a:r>
-            <a:r>
-              <a:rPr sz="2600" dirty="0"/>
-              <a:t>/</a:t>
-            </a:r>
-            <a:r>
-              <a:rPr lang="en-US" sz="2600" dirty="0"/>
-              <a:t>fod/</a:t>
-            </a:r>
-            <a:r>
-              <a:rPr sz="2600" dirty="0"/>
-              <a:t>setarc-nif</a:t>
-            </a:r>
-          </a:p>
-        </p:txBody>
-      </p:sp>
-    </p:spTree>
-  </p:cSld>
-  <p:clrMapOvr>
-    <a:masterClrMapping/>
-  </p:clrMapOvr>
-  <p:transition spd="med"/>
-</p:sld>
-</file>
-
-<file path=ppt/slides/slide18.xml><?xml version="1.0" encoding="utf-8"?>
-<p:sld xmlns:a="http://schemas.openxmlformats.org/drawingml/2006/main" xmlns:r="http://schemas.openxmlformats.org/officeDocument/2006/relationships" xmlns:p="http://schemas.openxmlformats.org/presentationml/2006/main">
-  <p:cSld>
-    <p:spTree>
-      <p:nvGrpSpPr>
-        <p:cNvPr id="1" name=""/>
-        <p:cNvGrpSpPr/>
-        <p:nvPr/>
-      </p:nvGrpSpPr>
-      <p:grpSpPr>
-        <a:xfrm>
-          <a:off x="0" y="0"/>
-          <a:ext cx="0" cy="0"/>
-          <a:chOff x="0" y="0"/>
-          <a:chExt cx="0" cy="0"/>
-        </a:xfrm>
-      </p:grpSpPr>
-      <p:sp>
-        <p:nvSpPr>
-          <p:cNvPr id="211" name="Merging Things"/>
-          <p:cNvSpPr txBox="1">
-            <a:spLocks noGrp="1"/>
-          </p:cNvSpPr>
-          <p:nvPr>
-            <p:ph type="title"/>
-          </p:nvPr>
-        </p:nvSpPr>
-        <p:spPr>
-          <a:prstGeom prst="rect">
-            <a:avLst/>
-          </a:prstGeom>
-        </p:spPr>
-        <p:txBody>
-          <a:bodyPr/>
-          <a:lstStyle/>
-          <a:p>
-            <a:r>
-              <a:t>Merging Things</a:t>
-            </a:r>
-          </a:p>
-        </p:txBody>
-      </p:sp>
-      <p:sp>
-        <p:nvSpPr>
-          <p:cNvPr id="212" name="Task: Merge the Crates and Setarc domains so that the           robots have limited space they can place crates"/>
-          <p:cNvSpPr txBox="1">
-            <a:spLocks noGrp="1"/>
-          </p:cNvSpPr>
-          <p:nvPr>
-            <p:ph type="body" idx="1"/>
-          </p:nvPr>
-        </p:nvSpPr>
-        <p:spPr>
-          <a:xfrm>
-            <a:off x="976313" y="1946672"/>
-            <a:ext cx="10239375" cy="3620115"/>
-          </a:xfrm>
-          <a:prstGeom prst="rect">
-            <a:avLst/>
-          </a:prstGeom>
-        </p:spPr>
-        <p:txBody>
-          <a:bodyPr/>
-          <a:lstStyle/>
-          <a:p>
-            <a:pPr marL="0" indent="0">
-              <a:buNone/>
-              <a:defRPr sz="3400" b="1"/>
-            </a:pPr>
-            <a:r>
-              <a:rPr dirty="0"/>
-              <a:t>Task</a:t>
-            </a:r>
-            <a:r>
-              <a:rPr b="0" dirty="0"/>
-              <a:t>:</a:t>
-            </a:r>
-            <a:endParaRPr lang="en-US" b="0" dirty="0"/>
-          </a:p>
-          <a:p>
-            <a:pPr marL="0" indent="0">
-              <a:buNone/>
-              <a:defRPr sz="3400" b="1"/>
-            </a:pPr>
-            <a:r>
-              <a:rPr lang="en-US" dirty="0"/>
-              <a:t>	</a:t>
-            </a:r>
-            <a:r>
-              <a:rPr b="0" dirty="0"/>
-              <a:t>Merge the Crates and </a:t>
-            </a:r>
-            <a:r>
-              <a:rPr b="0" dirty="0" err="1"/>
-              <a:t>Setarc</a:t>
-            </a:r>
-            <a:r>
-              <a:rPr b="0" dirty="0"/>
-              <a:t> domains so that the</a:t>
-            </a:r>
-            <a:br>
-              <a:rPr b="0" dirty="0"/>
-            </a:br>
-            <a:r>
-              <a:rPr lang="en-US" b="0" dirty="0"/>
-              <a:t>	</a:t>
-            </a:r>
-            <a:r>
-              <a:rPr b="0" dirty="0"/>
-              <a:t>robots have limited space they can place crates</a:t>
-            </a:r>
-          </a:p>
-        </p:txBody>
-      </p:sp>
-    </p:spTree>
-  </p:cSld>
-  <p:clrMapOvr>
-    <a:masterClrMapping/>
-  </p:clrMapOvr>
-  <p:transition spd="med"/>
-</p:sld>
-</file>
-
-<file path=ppt/slides/slide19.xml><?xml version="1.0" encoding="utf-8"?>
-<p:sld xmlns:a="http://schemas.openxmlformats.org/drawingml/2006/main" xmlns:r="http://schemas.openxmlformats.org/officeDocument/2006/relationships" xmlns:p="http://schemas.openxmlformats.org/presentationml/2006/main">
-  <p:cSld>
-    <p:spTree>
-      <p:nvGrpSpPr>
-        <p:cNvPr id="1" name=""/>
-        <p:cNvGrpSpPr/>
-        <p:nvPr/>
-      </p:nvGrpSpPr>
-      <p:grpSpPr>
-        <a:xfrm>
-          <a:off x="0" y="0"/>
-          <a:ext cx="0" cy="0"/>
-          <a:chOff x="0" y="0"/>
-          <a:chExt cx="0" cy="0"/>
-        </a:xfrm>
-      </p:grpSpPr>
-      <p:sp>
-        <p:nvSpPr>
-          <p:cNvPr id="214" name="http://editor.planning.domains/ibm/merge"/>
-          <p:cNvSpPr txBox="1">
-            <a:spLocks noGrp="1"/>
-          </p:cNvSpPr>
-          <p:nvPr>
-            <p:ph type="body" idx="21"/>
-          </p:nvPr>
-        </p:nvSpPr>
-        <p:spPr>
-          <a:xfrm>
-            <a:off x="1190625" y="3018235"/>
-            <a:ext cx="9810750" cy="452432"/>
-          </a:xfrm>
-          <a:prstGeom prst="rect">
-            <a:avLst/>
-          </a:prstGeom>
-        </p:spPr>
-        <p:txBody>
-          <a:bodyPr/>
-          <a:lstStyle/>
-          <a:p>
-            <a:r>
-              <a:rPr sz="2600" dirty="0"/>
-              <a:t>http://editor.planning.domains/</a:t>
-            </a:r>
-            <a:r>
-              <a:rPr lang="en-US" sz="2600" dirty="0"/>
-              <a:t>planning-course</a:t>
-            </a:r>
-            <a:r>
-              <a:rPr sz="2600" dirty="0"/>
-              <a:t>/</a:t>
-            </a:r>
-            <a:r>
-              <a:rPr lang="en-US" sz="2600" dirty="0"/>
-              <a:t>fod/</a:t>
-            </a:r>
-            <a:r>
-              <a:rPr sz="2600" dirty="0"/>
-              <a:t>merge</a:t>
-            </a:r>
-          </a:p>
-        </p:txBody>
-      </p:sp>
-    </p:spTree>
-  </p:cSld>
-  <p:clrMapOvr>
-    <a:masterClrMapping/>
-  </p:clrMapOvr>
-  <p:transition spd="med"/>
-</p:sld>
-</file>
-
 <file path=ppt/slides/slide2.xml><?xml version="1.0" encoding="utf-8"?>
-<p:sld xmlns:a="http://schemas.openxmlformats.org/drawingml/2006/main" xmlns:r="http://schemas.openxmlformats.org/officeDocument/2006/relationships" xmlns:p="http://schemas.openxmlformats.org/presentationml/2006/main">
-  <p:cSld>
-    <p:spTree>
-      <p:nvGrpSpPr>
-        <p:cNvPr id="1" name=""/>
-        <p:cNvGrpSpPr/>
-        <p:nvPr/>
-      </p:nvGrpSpPr>
-      <p:grpSpPr>
-        <a:xfrm>
-          <a:off x="0" y="0"/>
-          <a:ext cx="0" cy="0"/>
-          <a:chOff x="0" y="0"/>
-          <a:chExt cx="0" cy="0"/>
-        </a:xfrm>
-      </p:grpSpPr>
-      <p:sp>
-        <p:nvSpPr>
-          <p:cNvPr id="169" name="Online Editor         ( your IDE )…"/>
-          <p:cNvSpPr txBox="1">
-            <a:spLocks noGrp="1"/>
-          </p:cNvSpPr>
-          <p:nvPr>
-            <p:ph type="body" idx="1"/>
-          </p:nvPr>
-        </p:nvSpPr>
-        <p:spPr>
-          <a:xfrm>
-            <a:off x="838200" y="565220"/>
-            <a:ext cx="10515600" cy="5727560"/>
-          </a:xfrm>
-          <a:prstGeom prst="rect">
-            <a:avLst/>
-          </a:prstGeom>
-        </p:spPr>
-        <p:txBody>
-          <a:bodyPr>
-            <a:normAutofit/>
-          </a:bodyPr>
-          <a:lstStyle/>
-          <a:p>
-            <a:pPr marL="446469" indent="-446469">
-              <a:buSzPct val="100000"/>
-              <a:buAutoNum type="arabicPeriod"/>
-            </a:pPr>
-            <a:r>
-              <a:rPr lang="en-US" dirty="0"/>
-              <a:t>Moving a manual car around</a:t>
-            </a:r>
-            <a:br>
-              <a:rPr lang="en-US" dirty="0"/>
-            </a:br>
-            <a:endParaRPr dirty="0"/>
-          </a:p>
-          <a:p>
-            <a:pPr marL="446469" indent="-446469">
-              <a:buSzPct val="100000"/>
-              <a:buAutoNum type="arabicPeriod"/>
-            </a:pPr>
-            <a:r>
-              <a:rPr lang="en-US" dirty="0"/>
-              <a:t>Moving an autonomous car around</a:t>
-            </a:r>
-            <a:br>
-              <a:rPr lang="en-US" dirty="0"/>
-            </a:br>
-            <a:endParaRPr dirty="0"/>
-          </a:p>
-          <a:p>
-            <a:pPr marL="446469" indent="-446469">
-              <a:buSzPct val="100000"/>
-              <a:buAutoNum type="arabicPeriod"/>
-            </a:pPr>
-            <a:r>
-              <a:rPr lang="en-US" dirty="0"/>
-              <a:t>Picking up / dropping off passengers</a:t>
-            </a:r>
-            <a:br>
-              <a:rPr lang="en-US" dirty="0"/>
-            </a:br>
-            <a:endParaRPr lang="en-US" dirty="0"/>
-          </a:p>
-          <a:p>
-            <a:pPr marL="446469" indent="-446469">
-              <a:buSzPct val="100000"/>
-              <a:buAutoNum type="arabicPeriod"/>
-            </a:pPr>
-            <a:r>
-              <a:rPr lang="en-US" dirty="0"/>
-              <a:t>Pausing to stop for drop-off / pickup</a:t>
-            </a:r>
-            <a:br>
-              <a:rPr lang="en-US" dirty="0"/>
-            </a:br>
-            <a:endParaRPr lang="en-US" dirty="0"/>
-          </a:p>
-          <a:p>
-            <a:pPr marL="446469" indent="-446469">
-              <a:buSzPct val="100000"/>
-              <a:buAutoNum type="arabicPeriod"/>
-            </a:pPr>
-            <a:r>
-              <a:rPr lang="en-US" dirty="0"/>
-              <a:t>Safe manual moves</a:t>
-            </a:r>
-          </a:p>
-        </p:txBody>
-      </p:sp>
-    </p:spTree>
-  </p:cSld>
-  <p:clrMapOvr>
-    <a:masterClrMapping/>
-  </p:clrMapOvr>
-  <p:transition spd="med"/>
-</p:sld>
-</file>
-
-<file path=ppt/slides/slide20.xml><?xml version="1.0" encoding="utf-8"?>
-<p:sld xmlns:a="http://schemas.openxmlformats.org/drawingml/2006/main" xmlns:r="http://schemas.openxmlformats.org/officeDocument/2006/relationships" xmlns:p="http://schemas.openxmlformats.org/presentationml/2006/main">
-  <p:cSld>
-    <p:spTree>
-      <p:nvGrpSpPr>
-        <p:cNvPr id="1" name=""/>
-        <p:cNvGrpSpPr/>
-        <p:nvPr/>
-      </p:nvGrpSpPr>
-      <p:grpSpPr>
-        <a:xfrm>
-          <a:off x="0" y="0"/>
-          <a:ext cx="0" cy="0"/>
-          <a:chOff x="0" y="0"/>
-          <a:chExt cx="0" cy="0"/>
-        </a:xfrm>
-      </p:grpSpPr>
-      <p:sp>
-        <p:nvSpPr>
-          <p:cNvPr id="216" name="http://editor.planning.domains/ibm/all-merged"/>
-          <p:cNvSpPr txBox="1">
-            <a:spLocks noGrp="1"/>
-          </p:cNvSpPr>
-          <p:nvPr>
-            <p:ph type="body" idx="21"/>
-          </p:nvPr>
-        </p:nvSpPr>
-        <p:spPr>
-          <a:xfrm>
-            <a:off x="1190625" y="3018235"/>
-            <a:ext cx="9810750" cy="452432"/>
-          </a:xfrm>
-          <a:prstGeom prst="rect">
-            <a:avLst/>
-          </a:prstGeom>
-        </p:spPr>
-        <p:txBody>
-          <a:bodyPr/>
-          <a:lstStyle/>
-          <a:p>
-            <a:r>
-              <a:rPr sz="2600" dirty="0"/>
-              <a:t>http://editor.planning.domains/</a:t>
-            </a:r>
-            <a:r>
-              <a:rPr lang="en-US" sz="2600" dirty="0"/>
-              <a:t>planning-course</a:t>
-            </a:r>
-            <a:r>
-              <a:rPr sz="2600" dirty="0"/>
-              <a:t>/</a:t>
-            </a:r>
-            <a:r>
-              <a:rPr lang="en-US" sz="2600" dirty="0"/>
-              <a:t>fod/</a:t>
-            </a:r>
-            <a:r>
-              <a:rPr sz="2600" dirty="0"/>
-              <a:t>all-merged</a:t>
-            </a:r>
-          </a:p>
-        </p:txBody>
-      </p:sp>
-    </p:spTree>
-  </p:cSld>
-  <p:clrMapOvr>
-    <a:masterClrMapping/>
-  </p:clrMapOvr>
-  <p:transition spd="med"/>
-</p:sld>
-</file>
-
-<file path=ppt/slides/slide21.xml><?xml version="1.0" encoding="utf-8"?>
-<p:sld xmlns:a="http://schemas.openxmlformats.org/drawingml/2006/main" xmlns:r="http://schemas.openxmlformats.org/officeDocument/2006/relationships" xmlns:p="http://schemas.openxmlformats.org/presentationml/2006/main">
-  <p:cSld>
-    <p:spTree>
-      <p:nvGrpSpPr>
-        <p:cNvPr id="1" name=""/>
-        <p:cNvGrpSpPr/>
-        <p:nvPr/>
-      </p:nvGrpSpPr>
-      <p:grpSpPr>
-        <a:xfrm>
-          <a:off x="0" y="0"/>
-          <a:ext cx="0" cy="0"/>
-          <a:chOff x="0" y="0"/>
-          <a:chExt cx="0" cy="0"/>
-        </a:xfrm>
-      </p:grpSpPr>
-      <p:sp>
-        <p:nvSpPr>
-          <p:cNvPr id="218" name="http://editor.planning.domains/ibm/all-domains"/>
-          <p:cNvSpPr txBox="1">
-            <a:spLocks noGrp="1"/>
-          </p:cNvSpPr>
-          <p:nvPr>
-            <p:ph type="body" idx="21"/>
-          </p:nvPr>
-        </p:nvSpPr>
-        <p:spPr>
-          <a:xfrm>
-            <a:off x="1190625" y="3018235"/>
-            <a:ext cx="9810750" cy="452432"/>
-          </a:xfrm>
-          <a:prstGeom prst="rect">
-            <a:avLst/>
-          </a:prstGeom>
-        </p:spPr>
-        <p:txBody>
-          <a:bodyPr/>
-          <a:lstStyle/>
-          <a:p>
-            <a:r>
-              <a:rPr sz="2600" dirty="0"/>
-              <a:t>http://editor.planning.domains/</a:t>
-            </a:r>
-            <a:r>
-              <a:rPr lang="en-US" sz="2600" dirty="0"/>
-              <a:t>planning-course</a:t>
-            </a:r>
-            <a:r>
-              <a:rPr sz="2600" dirty="0"/>
-              <a:t>/</a:t>
-            </a:r>
-            <a:r>
-              <a:rPr lang="en-US" sz="2600" dirty="0"/>
-              <a:t>fod/</a:t>
-            </a:r>
-            <a:r>
-              <a:rPr sz="2600" dirty="0"/>
-              <a:t>all-domains</a:t>
-            </a:r>
-          </a:p>
-        </p:txBody>
-      </p:sp>
-    </p:spTree>
-  </p:cSld>
-  <p:clrMapOvr>
-    <a:masterClrMapping/>
-  </p:clrMapOvr>
-  <p:transition spd="med"/>
-</p:sld>
-</file>
-
-<file path=ppt/slides/slide22.xml><?xml version="1.0" encoding="utf-8"?>
-<p:sld xmlns:a="http://schemas.openxmlformats.org/drawingml/2006/main" xmlns:r="http://schemas.openxmlformats.org/officeDocument/2006/relationships" xmlns:p="http://schemas.openxmlformats.org/presentationml/2006/main">
-  <p:cSld>
-    <p:spTree>
-      <p:nvGrpSpPr>
-        <p:cNvPr id="1" name=""/>
-        <p:cNvGrpSpPr/>
-        <p:nvPr/>
-      </p:nvGrpSpPr>
-      <p:grpSpPr>
-        <a:xfrm>
-          <a:off x="0" y="0"/>
-          <a:ext cx="0" cy="0"/>
-          <a:chOff x="0" y="0"/>
-          <a:chExt cx="0" cy="0"/>
-        </a:xfrm>
-      </p:grpSpPr>
-    </p:spTree>
-    <p:extLst>
-      <p:ext uri="{BB962C8B-B14F-4D97-AF65-F5344CB8AC3E}">
-        <p14:creationId xmlns:p14="http://schemas.microsoft.com/office/powerpoint/2010/main" val="1299345925"/>
-      </p:ext>
-    </p:extLst>
-  </p:cSld>
-  <p:clrMapOvr>
-    <a:masterClrMapping/>
-  </p:clrMapOvr>
-</p:sld>
-</file>
-
-<file path=ppt/slides/slide3.xml><?xml version="1.0" encoding="utf-8"?>
 <p:sld xmlns:a="http://schemas.openxmlformats.org/drawingml/2006/main" xmlns:r="http://schemas.openxmlformats.org/officeDocument/2006/relationships" xmlns:p="http://schemas.openxmlformats.org/presentationml/2006/main">
   <p:cSld>
     <p:spTree>
@@ -11648,6 +9237,83 @@
 </p:sld>
 </file>
 
+<file path=ppt/slides/slide3.xml><?xml version="1.0" encoding="utf-8"?>
+<p:sld xmlns:a="http://schemas.openxmlformats.org/drawingml/2006/main" xmlns:r="http://schemas.openxmlformats.org/officeDocument/2006/relationships" xmlns:p="http://schemas.openxmlformats.org/presentationml/2006/main" showMasterSp="0">
+  <p:cSld>
+    <p:spTree>
+      <p:nvGrpSpPr>
+        <p:cNvPr id="1" name=""/>
+        <p:cNvGrpSpPr/>
+        <p:nvPr/>
+      </p:nvGrpSpPr>
+      <p:grpSpPr>
+        <a:xfrm>
+          <a:off x="0" y="0"/>
+          <a:ext cx="0" cy="0"/>
+          <a:chOff x="0" y="0"/>
+          <a:chExt cx="0" cy="0"/>
+        </a:xfrm>
+      </p:grpSpPr>
+      <p:pic>
+        <p:nvPicPr>
+          <p:cNvPr id="1026" name="Picture 2" descr="i'm here but i'm not here">
+            <a:extLst>
+              <a:ext uri="{FF2B5EF4-FFF2-40B4-BE49-F238E27FC236}">
+                <a16:creationId xmlns:a16="http://schemas.microsoft.com/office/drawing/2014/main" id="{8BF27172-6895-CEA3-5B32-230EA6342CF2}"/>
+              </a:ext>
+            </a:extLst>
+          </p:cNvPr>
+          <p:cNvPicPr>
+            <a:picLocks noChangeAspect="1" noChangeArrowheads="1"/>
+          </p:cNvPicPr>
+          <p:nvPr/>
+        </p:nvPicPr>
+        <p:blipFill>
+          <a:blip r:embed="rId2">
+            <a:extLst>
+              <a:ext uri="{28A0092B-C50C-407E-A947-70E740481C1C}">
+                <a14:useLocalDpi xmlns:a14="http://schemas.microsoft.com/office/drawing/2010/main" val="0"/>
+              </a:ext>
+            </a:extLst>
+          </a:blip>
+          <a:srcRect/>
+          <a:stretch>
+            <a:fillRect/>
+          </a:stretch>
+        </p:blipFill>
+        <p:spPr bwMode="auto">
+          <a:xfrm>
+            <a:off x="-267092" y="0"/>
+            <a:ext cx="12726184" cy="6858000"/>
+          </a:xfrm>
+          <a:prstGeom prst="rect">
+            <a:avLst/>
+          </a:prstGeom>
+          <a:noFill/>
+          <a:extLst>
+            <a:ext uri="{909E8E84-426E-40DD-AFC4-6F175D3DCCD1}">
+              <a14:hiddenFill xmlns:a14="http://schemas.microsoft.com/office/drawing/2010/main">
+                <a:solidFill>
+                  <a:srgbClr val="FFFFFF"/>
+                </a:solidFill>
+              </a14:hiddenFill>
+            </a:ext>
+          </a:extLst>
+        </p:spPr>
+      </p:pic>
+    </p:spTree>
+    <p:extLst>
+      <p:ext uri="{BB962C8B-B14F-4D97-AF65-F5344CB8AC3E}">
+        <p14:creationId xmlns:p14="http://schemas.microsoft.com/office/powerpoint/2010/main" val="815600195"/>
+      </p:ext>
+    </p:extLst>
+  </p:cSld>
+  <p:clrMapOvr>
+    <a:masterClrMapping/>
+  </p:clrMapOvr>
+</p:sld>
+</file>
+
 <file path=ppt/slides/slide4.xml><?xml version="1.0" encoding="utf-8"?>
 <p:sld xmlns:a="http://schemas.openxmlformats.org/drawingml/2006/main" xmlns:r="http://schemas.openxmlformats.org/officeDocument/2006/relationships" xmlns:p="http://schemas.openxmlformats.org/presentationml/2006/main">
   <p:cSld>
@@ -11667,32 +9333,7 @@
       </p:grpSpPr>
       <p:sp>
         <p:nvSpPr>
-          <p:cNvPr id="173" name="Hello World"/>
-          <p:cNvSpPr txBox="1">
-            <a:spLocks noGrp="1"/>
-          </p:cNvSpPr>
-          <p:nvPr>
-            <p:ph type="title"/>
-          </p:nvPr>
-        </p:nvSpPr>
-        <p:spPr>
-          <a:prstGeom prst="rect">
-            <a:avLst/>
-          </a:prstGeom>
-        </p:spPr>
-        <p:txBody>
-          <a:bodyPr/>
-          <a:lstStyle/>
-          <a:p>
-            <a:r>
-              <a:t>Hello World</a:t>
-            </a:r>
-          </a:p>
-        </p:txBody>
-      </p:sp>
-      <p:sp>
-        <p:nvSpPr>
-          <p:cNvPr id="174" name="Task: Create a planning model that executes the           actions (hello) and (world)"/>
+          <p:cNvPr id="169" name="Online Editor         ( your IDE )…"/>
           <p:cNvSpPr txBox="1">
             <a:spLocks noGrp="1"/>
           </p:cNvSpPr>
@@ -11702,8 +9343,8 @@
         </p:nvSpPr>
         <p:spPr>
           <a:xfrm>
-            <a:off x="2278438" y="2869962"/>
-            <a:ext cx="7635124" cy="1862812"/>
+            <a:off x="2891913" y="1283042"/>
+            <a:ext cx="6408174" cy="4291915"/>
           </a:xfrm>
           <a:prstGeom prst="rect">
             <a:avLst/>
@@ -11715,67 +9356,69 @@
           </a:bodyPr>
           <a:lstStyle/>
           <a:p>
-            <a:pPr marL="0" indent="0">
-              <a:buNone/>
-              <a:defRPr b="1"/>
+            <a:pPr marL="446469" indent="-446469">
+              <a:buSzPct val="100000"/>
+              <a:buAutoNum type="arabicPeriod"/>
             </a:pPr>
             <a:r>
-              <a:rPr dirty="0"/>
-              <a:t>Task</a:t>
-            </a:r>
-            <a:endParaRPr lang="en-US" b="0" dirty="0"/>
-          </a:p>
-          <a:p>
-            <a:pPr marL="0" indent="0">
-              <a:buNone/>
-              <a:defRPr b="1"/>
+              <a:rPr lang="en-US" dirty="0"/>
+              <a:t>Moving a manual car around</a:t>
+            </a:r>
+            <a:br>
+              <a:rPr lang="en-US" dirty="0"/>
+            </a:br>
+            <a:endParaRPr dirty="0"/>
+          </a:p>
+          <a:p>
+            <a:pPr marL="446469" indent="-446469">
+              <a:buSzPct val="100000"/>
+              <a:buAutoNum type="arabicPeriod"/>
             </a:pPr>
             <a:r>
-              <a:rPr lang="en-US" b="0" dirty="0"/>
-              <a:t>	</a:t>
-            </a:r>
-            <a:r>
-              <a:rPr b="0" dirty="0"/>
-              <a:t>Create a planning model that execute</a:t>
-            </a:r>
-            <a:r>
-              <a:rPr lang="en-US" b="0" dirty="0"/>
-              <a:t>s</a:t>
+              <a:rPr lang="en-US" dirty="0"/>
+              <a:t>Moving an autonomous car around</a:t>
             </a:r>
             <a:br>
-              <a:rPr b="0" dirty="0"/>
+              <a:rPr lang="en-US" dirty="0"/>
             </a:br>
-            <a:r>
-              <a:rPr lang="en-US" b="0" dirty="0"/>
-              <a:t>	the </a:t>
-            </a:r>
-            <a:r>
-              <a:rPr b="0" dirty="0"/>
-              <a:t>actions (</a:t>
-            </a:r>
-            <a:r>
-              <a:rPr b="0" dirty="0">
-                <a:solidFill>
-                  <a:schemeClr val="accent4"/>
-                </a:solidFill>
-              </a:rPr>
-              <a:t>hello</a:t>
-            </a:r>
-            <a:r>
-              <a:rPr b="0" dirty="0"/>
-              <a:t>) and (</a:t>
-            </a:r>
-            <a:r>
-              <a:rPr b="0" dirty="0">
-                <a:solidFill>
-                  <a:schemeClr val="accent4"/>
-                </a:solidFill>
-              </a:rPr>
-              <a:t>world</a:t>
-            </a:r>
-            <a:r>
-              <a:rPr b="0" dirty="0"/>
-              <a:t>)</a:t>
+            <a:endParaRPr dirty="0"/>
+          </a:p>
+          <a:p>
+            <a:pPr marL="446469" indent="-446469">
+              <a:buSzPct val="100000"/>
+              <a:buAutoNum type="arabicPeriod"/>
+            </a:pPr>
+            <a:r>
+              <a:rPr lang="en-US" dirty="0"/>
+              <a:t>Picking up / dropping off passengers</a:t>
+            </a:r>
+            <a:br>
+              <a:rPr lang="en-US" dirty="0"/>
+            </a:br>
+            <a:endParaRPr lang="en-US" dirty="0"/>
+          </a:p>
+          <a:p>
+            <a:pPr marL="446469" indent="-446469">
+              <a:buSzPct val="100000"/>
+              <a:buAutoNum type="arabicPeriod"/>
+            </a:pPr>
+            <a:r>
+              <a:rPr lang="en-US" dirty="0"/>
+              <a:t>Pausing to stop for drop-off / pickup</a:t>
+            </a:r>
+            <a:br>
+              <a:rPr lang="en-US" dirty="0"/>
+            </a:br>
+            <a:endParaRPr lang="en-US" dirty="0"/>
+          </a:p>
+          <a:p>
+            <a:pPr marL="446469" indent="-446469">
+              <a:buSzPct val="100000"/>
+              <a:buAutoNum type="arabicPeriod"/>
+            </a:pPr>
+            <a:r>
+              <a:rPr lang="en-US" dirty="0"/>
+              <a:t>Safe manual moves</a:t>
             </a:r>
           </a:p>
         </p:txBody>
@@ -11790,78 +9433,6 @@
 </file>
 
 <file path=ppt/slides/slide5.xml><?xml version="1.0" encoding="utf-8"?>
-<p:sld xmlns:a="http://schemas.openxmlformats.org/drawingml/2006/main" xmlns:r="http://schemas.openxmlformats.org/officeDocument/2006/relationships" xmlns:p="http://schemas.openxmlformats.org/presentationml/2006/main">
-  <p:cSld>
-    <p:spTree>
-      <p:nvGrpSpPr>
-        <p:cNvPr id="1" name=""/>
-        <p:cNvGrpSpPr/>
-        <p:nvPr/>
-      </p:nvGrpSpPr>
-      <p:grpSpPr>
-        <a:xfrm>
-          <a:off x="0" y="0"/>
-          <a:ext cx="0" cy="0"/>
-          <a:chOff x="0" y="0"/>
-          <a:chExt cx="0" cy="0"/>
-        </a:xfrm>
-      </p:grpSpPr>
-      <p:sp>
-        <p:nvSpPr>
-          <p:cNvPr id="176" name="http://editor.planning.domains/ibm/hello-world"/>
-          <p:cNvSpPr txBox="1">
-            <a:spLocks noGrp="1"/>
-          </p:cNvSpPr>
-          <p:nvPr>
-            <p:ph type="body" idx="21"/>
-          </p:nvPr>
-        </p:nvSpPr>
-        <p:spPr>
-          <a:xfrm>
-            <a:off x="1190625" y="3018235"/>
-            <a:ext cx="9810750" cy="452432"/>
-          </a:xfrm>
-          <a:prstGeom prst="rect">
-            <a:avLst/>
-          </a:prstGeom>
-        </p:spPr>
-        <p:txBody>
-          <a:bodyPr/>
-          <a:lstStyle/>
-          <a:p>
-            <a:r>
-              <a:rPr sz="2600" dirty="0"/>
-              <a:t>http://editor.planning.domains/</a:t>
-            </a:r>
-            <a:r>
-              <a:rPr lang="en-US" sz="2600" dirty="0"/>
-              <a:t>planning-course</a:t>
-            </a:r>
-            <a:r>
-              <a:rPr sz="2600" dirty="0"/>
-              <a:t>/</a:t>
-            </a:r>
-            <a:r>
-              <a:rPr lang="en-US" sz="2600" dirty="0"/>
-              <a:t>fod/</a:t>
-            </a:r>
-            <a:r>
-              <a:rPr sz="2600" dirty="0"/>
-              <a:t>hello-world</a:t>
-            </a:r>
-          </a:p>
-        </p:txBody>
-      </p:sp>
-    </p:spTree>
-  </p:cSld>
-  <p:clrMapOvr>
-    <a:masterClrMapping/>
-  </p:clrMapOvr>
-  <p:transition spd="med"/>
-</p:sld>
-</file>
-
-<file path=ppt/slides/slide6.xml><?xml version="1.0" encoding="utf-8"?>
 <p:sld xmlns:a="http://schemas.openxmlformats.org/drawingml/2006/main" xmlns:r="http://schemas.openxmlformats.org/officeDocument/2006/relationships" xmlns:p="http://schemas.openxmlformats.org/presentationml/2006/main">
   <p:cSld>
     <p:spTree>
@@ -11898,9 +9469,10 @@
           <a:lstStyle/>
           <a:p>
             <a:r>
-              <a:rPr dirty="0"/>
-              <a:t>Moving Crates</a:t>
-            </a:r>
+              <a:rPr lang="en-US" dirty="0"/>
+              <a:t>Summary</a:t>
+            </a:r>
+            <a:endParaRPr dirty="0"/>
           </a:p>
         </p:txBody>
       </p:sp>
@@ -11940,8 +9512,24 @@
             </a:br>
             <a:r>
               <a:rPr b="0" dirty="0"/>
-              <a:t>          movement of crates in a warehouse via robots</a:t>
-            </a:r>
+              <a:t>          </a:t>
+            </a:r>
+            <a:r>
+              <a:rPr lang="en-US" b="0" dirty="0"/>
+              <a:t>   </a:t>
+            </a:r>
+            <a:r>
+              <a:rPr b="0" dirty="0"/>
+              <a:t>movement of </a:t>
+            </a:r>
+            <a:r>
+              <a:rPr lang="en-US" b="0" dirty="0"/>
+              <a:t>cars, shuttles, and people</a:t>
+            </a:r>
+            <a:br>
+              <a:rPr lang="en-US" b="0" dirty="0"/>
+            </a:br>
+            <a:endParaRPr b="0" dirty="0"/>
           </a:p>
           <a:p>
             <a:pPr>
@@ -11964,44 +9552,73 @@
                   <a:schemeClr val="accent3"/>
                 </a:solidFill>
               </a:rPr>
-              <a:t>room</a:t>
+              <a:t>locatable</a:t>
             </a:r>
             <a:r>
               <a:rPr b="0" dirty="0"/>
               <a:t>, </a:t>
             </a:r>
             <a:r>
-              <a:rPr b="0" dirty="0">
+              <a:rPr lang="en-US" b="0" dirty="0">
                 <a:solidFill>
                   <a:schemeClr val="accent3"/>
                 </a:solidFill>
               </a:rPr>
-              <a:t>locatable</a:t>
-            </a:r>
-            <a:r>
-              <a:rPr b="0" dirty="0"/>
+              <a:t>location</a:t>
+            </a:r>
+            <a:r>
+              <a:rPr lang="en-CA" b="0" dirty="0"/>
               <a:t>, </a:t>
             </a:r>
             <a:r>
-              <a:rPr b="0" dirty="0">
+              <a:rPr lang="en-US" b="0" dirty="0">
                 <a:solidFill>
                   <a:schemeClr val="accent3"/>
                 </a:solidFill>
               </a:rPr>
-              <a:t>crate</a:t>
-            </a:r>
-            <a:r>
-              <a:rPr b="0" dirty="0"/>
+              <a:t>car</a:t>
+            </a:r>
+            <a:r>
+              <a:rPr lang="en-CA" b="0" dirty="0"/>
               <a:t>, </a:t>
             </a:r>
             <a:r>
-              <a:rPr b="0" dirty="0">
+              <a:rPr lang="en-US" b="0" dirty="0">
                 <a:solidFill>
                   <a:schemeClr val="accent3"/>
                 </a:solidFill>
               </a:rPr>
-              <a:t>robot</a:t>
-            </a:r>
+              <a:t>person</a:t>
+            </a:r>
+            <a:r>
+              <a:rPr lang="en-CA" b="0" dirty="0"/>
+              <a:t>, </a:t>
+            </a:r>
+            <a:r>
+              <a:rPr lang="en-US" b="0" dirty="0">
+                <a:solidFill>
+                  <a:schemeClr val="accent3"/>
+                </a:solidFill>
+              </a:rPr>
+              <a:t>mv</a:t>
+            </a:r>
+            <a:r>
+              <a:rPr lang="en-CA" b="0" dirty="0"/>
+              <a:t>, </a:t>
+            </a:r>
+            <a:r>
+              <a:rPr lang="en-US" b="0" dirty="0">
+                <a:solidFill>
+                  <a:schemeClr val="accent3"/>
+                </a:solidFill>
+              </a:rPr>
+              <a:t>av</a:t>
+            </a:r>
+            <a:endParaRPr lang="fr-FR" b="0" dirty="0">
+              <a:solidFill>
+                <a:schemeClr val="accent3"/>
+              </a:solidFill>
+            </a:endParaRPr>
           </a:p>
           <a:p>
             <a:pPr>
@@ -12011,27 +9628,27 @@
               <a:defRPr b="1"/>
             </a:pPr>
             <a:r>
-              <a:rPr dirty="0"/>
+              <a:rPr lang="fr-FR" dirty="0" err="1"/>
               <a:t>Predicates</a:t>
             </a:r>
             <a:r>
-              <a:rPr b="0" dirty="0"/>
+              <a:rPr lang="fr-FR" b="0" dirty="0"/>
               <a:t>: </a:t>
             </a:r>
             <a:r>
-              <a:rPr b="0" dirty="0">
+              <a:rPr lang="fr-FR" b="0" dirty="0">
                 <a:solidFill>
                   <a:schemeClr val="accent2"/>
                 </a:solidFill>
               </a:rPr>
-              <a:t>holding</a:t>
-            </a:r>
-            <a:r>
-              <a:rPr b="0" dirty="0"/>
+              <a:t>at</a:t>
+            </a:r>
+            <a:r>
+              <a:rPr lang="fr-FR" b="0" dirty="0"/>
               <a:t>, </a:t>
             </a:r>
             <a:r>
-              <a:rPr b="0" dirty="0">
+              <a:rPr lang="fr-FR" b="0" dirty="0">
                 <a:solidFill>
                   <a:schemeClr val="accent2"/>
                 </a:solidFill>
@@ -12039,29 +9656,58 @@
               <a:t>in</a:t>
             </a:r>
             <a:r>
-              <a:rPr b="0" dirty="0"/>
+              <a:rPr lang="fr-FR" b="0" dirty="0"/>
               <a:t>, </a:t>
             </a:r>
             <a:r>
-              <a:rPr b="0" dirty="0">
+              <a:rPr lang="fr-FR" b="0" dirty="0" err="1">
                 <a:solidFill>
                   <a:schemeClr val="accent2"/>
                 </a:solidFill>
               </a:rPr>
-              <a:t>hands-free</a:t>
-            </a:r>
-            <a:r>
-              <a:rPr b="0" dirty="0"/>
+              <a:t>link</a:t>
+            </a:r>
+            <a:r>
+              <a:rPr lang="fr-FR" b="0" dirty="0"/>
               <a:t>, </a:t>
             </a:r>
             <a:r>
-              <a:rPr b="0" dirty="0">
+              <a:rPr lang="fr-FR" b="0" dirty="0">
                 <a:solidFill>
                   <a:schemeClr val="accent2"/>
                 </a:solidFill>
               </a:rPr>
-              <a:t>connected</a:t>
-            </a:r>
+              <a:t>destination</a:t>
+            </a:r>
+            <a:r>
+              <a:rPr lang="fr-FR" b="0" dirty="0"/>
+              <a:t>, </a:t>
+            </a:r>
+            <a:r>
+              <a:rPr lang="fr-FR" b="0" dirty="0">
+                <a:solidFill>
+                  <a:schemeClr val="accent2"/>
+                </a:solidFill>
+              </a:rPr>
+              <a:t>hub</a:t>
+            </a:r>
+            <a:r>
+              <a:rPr lang="fr-FR" b="0" dirty="0"/>
+              <a:t>, </a:t>
+            </a:r>
+            <a:r>
+              <a:rPr lang="fr-FR" b="0" dirty="0" err="1">
+                <a:solidFill>
+                  <a:schemeClr val="accent2"/>
+                </a:solidFill>
+              </a:rPr>
+              <a:t>path</a:t>
+            </a:r>
+            <a:endParaRPr lang="fr-FR" dirty="0">
+              <a:solidFill>
+                <a:schemeClr val="accent2"/>
+              </a:solidFill>
+            </a:endParaRPr>
           </a:p>
           <a:p>
             <a:pPr>
@@ -12091,25 +9737,42 @@
               <a:t>, </a:t>
             </a:r>
             <a:r>
-              <a:rPr b="0" dirty="0">
+              <a:rPr lang="en-US" b="0" dirty="0" err="1">
                 <a:solidFill>
                   <a:schemeClr val="accent4"/>
                 </a:solidFill>
               </a:rPr>
-              <a:t>drop</a:t>
-            </a:r>
-            <a:r>
-              <a:rPr b="0" dirty="0"/>
+              <a:t>getin</a:t>
+            </a:r>
+            <a:r>
+              <a:rPr lang="en-CA" b="0" dirty="0"/>
               <a:t>, </a:t>
             </a:r>
             <a:r>
-              <a:rPr b="0" dirty="0">
+              <a:rPr lang="en-US" b="0" dirty="0" err="1">
                 <a:solidFill>
                   <a:schemeClr val="accent4"/>
                 </a:solidFill>
               </a:rPr>
-              <a:t>pickup</a:t>
-            </a:r>
+              <a:t>getout</a:t>
+            </a:r>
+            <a:r>
+              <a:rPr b="0" dirty="0"/>
+              <a:t>, </a:t>
+            </a:r>
+            <a:r>
+              <a:rPr lang="en-US" b="0" dirty="0">
+                <a:solidFill>
+                  <a:schemeClr val="accent4"/>
+                </a:solidFill>
+              </a:rPr>
+              <a:t>step</a:t>
+            </a:r>
+            <a:endParaRPr b="0" dirty="0">
+              <a:solidFill>
+                <a:schemeClr val="accent4"/>
+              </a:solidFill>
+            </a:endParaRPr>
           </a:p>
           <a:p>
             <a:pPr>
@@ -12124,8 +9787,21 @@
             </a:r>
             <a:r>
               <a:rPr b="0" dirty="0"/>
-              <a:t>: Move crates to their targets</a:t>
-            </a:r>
+              <a:t>: </a:t>
+            </a:r>
+            <a:r>
+              <a:rPr lang="en-US" b="0" dirty="0"/>
+              <a:t>Get pe</a:t>
+            </a:r>
+            <a:r>
+              <a:rPr b="0" dirty="0"/>
+              <a:t>o</a:t>
+            </a:r>
+            <a:r>
+              <a:rPr lang="en-US" b="0" dirty="0"/>
+              <a:t>ple where they need to be</a:t>
+            </a:r>
+            <a:endParaRPr b="0" dirty="0"/>
           </a:p>
         </p:txBody>
       </p:sp>
@@ -12135,6 +9811,111 @@
     <a:masterClrMapping/>
   </p:clrMapOvr>
   <p:transition spd="med"/>
+</p:sld>
+</file>
+
+<file path=ppt/slides/slide6.xml><?xml version="1.0" encoding="utf-8"?>
+<p:sld xmlns:a="http://schemas.openxmlformats.org/drawingml/2006/main" xmlns:r="http://schemas.openxmlformats.org/officeDocument/2006/relationships" xmlns:p="http://schemas.openxmlformats.org/presentationml/2006/main">
+  <p:cSld>
+    <p:spTree>
+      <p:nvGrpSpPr>
+        <p:cNvPr id="1" name=""/>
+        <p:cNvGrpSpPr/>
+        <p:nvPr/>
+      </p:nvGrpSpPr>
+      <p:grpSpPr>
+        <a:xfrm>
+          <a:off x="0" y="0"/>
+          <a:ext cx="0" cy="0"/>
+          <a:chOff x="0" y="0"/>
+          <a:chExt cx="0" cy="0"/>
+        </a:xfrm>
+      </p:grpSpPr>
+      <p:sp>
+        <p:nvSpPr>
+          <p:cNvPr id="3" name="Title 2">
+            <a:extLst>
+              <a:ext uri="{FF2B5EF4-FFF2-40B4-BE49-F238E27FC236}">
+                <a16:creationId xmlns:a16="http://schemas.microsoft.com/office/drawing/2014/main" id="{4773ACD6-E562-016B-2D7E-8F280D382706}"/>
+              </a:ext>
+            </a:extLst>
+          </p:cNvPr>
+          <p:cNvSpPr>
+            <a:spLocks noGrp="1"/>
+          </p:cNvSpPr>
+          <p:nvPr>
+            <p:ph type="title"/>
+          </p:nvPr>
+        </p:nvSpPr>
+        <p:spPr/>
+        <p:txBody>
+          <a:bodyPr/>
+          <a:lstStyle/>
+          <a:p>
+            <a:r>
+              <a:rPr lang="en-US" dirty="0"/>
+              <a:t>Types</a:t>
+            </a:r>
+            <a:endParaRPr lang="en-CA" dirty="0"/>
+          </a:p>
+        </p:txBody>
+      </p:sp>
+      <p:pic>
+        <p:nvPicPr>
+          <p:cNvPr id="5" name="Picture 4">
+            <a:extLst>
+              <a:ext uri="{FF2B5EF4-FFF2-40B4-BE49-F238E27FC236}">
+                <a16:creationId xmlns:a16="http://schemas.microsoft.com/office/drawing/2014/main" id="{85014569-79F5-F3D0-CCBD-782FA65A1D40}"/>
+              </a:ext>
+            </a:extLst>
+          </p:cNvPr>
+          <p:cNvPicPr>
+            <a:picLocks noChangeAspect="1"/>
+          </p:cNvPicPr>
+          <p:nvPr/>
+        </p:nvPicPr>
+        <p:blipFill>
+          <a:blip r:embed="rId2"/>
+          <a:stretch>
+            <a:fillRect/>
+          </a:stretch>
+        </p:blipFill>
+        <p:spPr>
+          <a:xfrm>
+            <a:off x="4076418" y="856891"/>
+            <a:ext cx="4039164" cy="5144218"/>
+          </a:xfrm>
+          <a:prstGeom prst="round2DiagRect">
+            <a:avLst>
+              <a:gd name="adj1" fmla="val 16667"/>
+              <a:gd name="adj2" fmla="val 0"/>
+            </a:avLst>
+          </a:prstGeom>
+          <a:ln w="88900" cap="sq">
+            <a:solidFill>
+              <a:srgbClr val="FFFFFF"/>
+            </a:solidFill>
+            <a:miter lim="800000"/>
+          </a:ln>
+          <a:effectLst>
+            <a:outerShdw blurRad="254000" algn="tl" rotWithShape="0">
+              <a:srgbClr val="000000">
+                <a:alpha val="43000"/>
+              </a:srgbClr>
+            </a:outerShdw>
+          </a:effectLst>
+        </p:spPr>
+      </p:pic>
+    </p:spTree>
+    <p:extLst>
+      <p:ext uri="{BB962C8B-B14F-4D97-AF65-F5344CB8AC3E}">
+        <p14:creationId xmlns:p14="http://schemas.microsoft.com/office/powerpoint/2010/main" val="1622156670"/>
+      </p:ext>
+    </p:extLst>
+  </p:cSld>
+  <p:clrMapOvr>
+    <a:masterClrMapping/>
+  </p:clrMapOvr>
 </p:sld>
 </file>
 
@@ -12157,152 +9938,510 @@
       </p:grpSpPr>
       <p:sp>
         <p:nvSpPr>
-          <p:cNvPr id="181" name="Moving Crates: Types"/>
-          <p:cNvSpPr txBox="1">
-            <a:spLocks noGrp="1"/>
-          </p:cNvSpPr>
-          <p:nvPr>
-            <p:ph type="title"/>
-          </p:nvPr>
+          <p:cNvPr id="4" name="TextBox 3">
+            <a:extLst>
+              <a:ext uri="{FF2B5EF4-FFF2-40B4-BE49-F238E27FC236}">
+                <a16:creationId xmlns:a16="http://schemas.microsoft.com/office/drawing/2014/main" id="{9FEF2AC4-823A-915B-BDEC-B7A47C66E28F}"/>
+              </a:ext>
+            </a:extLst>
+          </p:cNvPr>
+          <p:cNvSpPr txBox="1"/>
+          <p:nvPr/>
         </p:nvSpPr>
         <p:spPr>
+          <a:xfrm>
+            <a:off x="5777643" y="3136612"/>
+            <a:ext cx="636713" cy="584775"/>
+          </a:xfrm>
           <a:prstGeom prst="rect">
             <a:avLst/>
           </a:prstGeom>
+          <a:noFill/>
         </p:spPr>
         <p:txBody>
-          <a:bodyPr/>
+          <a:bodyPr wrap="none" rtlCol="0">
+            <a:spAutoFit/>
+          </a:bodyPr>
           <a:lstStyle/>
           <a:p>
             <a:r>
-              <a:t>Moving Crates: Types</a:t>
-            </a:r>
+              <a:rPr lang="en-US" sz="3200" b="1" dirty="0">
+                <a:latin typeface="Consolas" panose="020B0609020204030204" pitchFamily="49" charset="0"/>
+                <a:cs typeface="Aharoni" panose="020B0604020202020204" pitchFamily="2" charset="-79"/>
+              </a:rPr>
+              <a:t>l1</a:t>
+            </a:r>
+            <a:endParaRPr lang="en-CA" sz="3200" b="1" dirty="0">
+              <a:latin typeface="Consolas" panose="020B0609020204030204" pitchFamily="49" charset="0"/>
+              <a:cs typeface="Aharoni" panose="020B0604020202020204" pitchFamily="2" charset="-79"/>
+            </a:endParaRPr>
           </a:p>
         </p:txBody>
       </p:sp>
       <p:sp>
         <p:nvSpPr>
-          <p:cNvPr id="182" name="(:types…"/>
-          <p:cNvSpPr txBox="1">
-            <a:spLocks noGrp="1"/>
-          </p:cNvSpPr>
-          <p:nvPr>
-            <p:ph type="body" sz="quarter" idx="1"/>
-          </p:nvPr>
+          <p:cNvPr id="5" name="TextBox 4">
+            <a:extLst>
+              <a:ext uri="{FF2B5EF4-FFF2-40B4-BE49-F238E27FC236}">
+                <a16:creationId xmlns:a16="http://schemas.microsoft.com/office/drawing/2014/main" id="{8390EC66-2296-ED58-51FE-7AD368A222C3}"/>
+              </a:ext>
+            </a:extLst>
+          </p:cNvPr>
+          <p:cNvSpPr txBox="1"/>
+          <p:nvPr/>
         </p:nvSpPr>
         <p:spPr>
           <a:xfrm>
-            <a:off x="3939633" y="2658654"/>
-            <a:ext cx="4312735" cy="2594396"/>
+            <a:off x="7332763" y="4184683"/>
+            <a:ext cx="636713" cy="584775"/>
           </a:xfrm>
           <a:prstGeom prst="rect">
             <a:avLst/>
           </a:prstGeom>
+          <a:noFill/>
         </p:spPr>
         <p:txBody>
-          <a:bodyPr/>
+          <a:bodyPr wrap="none" rtlCol="0">
+            <a:spAutoFit/>
+          </a:bodyPr>
           <a:lstStyle/>
           <a:p>
-            <a:pPr marL="0" indent="0">
-              <a:buNone/>
-              <a:defRPr b="1"/>
-            </a:pPr>
-            <a:r>
-              <a:rPr dirty="0"/>
-              <a:t>(</a:t>
-            </a:r>
-            <a:r>
-              <a:rPr b="0" dirty="0"/>
-              <a:t>:types</a:t>
-            </a:r>
-          </a:p>
-          <a:p>
-            <a:pPr marL="0" indent="0">
-              <a:buNone/>
-            </a:pPr>
-            <a:r>
-              <a:rPr dirty="0"/>
-              <a:t>        </a:t>
-            </a:r>
-            <a:r>
-              <a:rPr dirty="0">
-                <a:solidFill>
-                  <a:schemeClr val="accent3"/>
-                </a:solidFill>
+            <a:r>
+              <a:rPr lang="en-US" sz="3200" b="1" dirty="0">
+                <a:latin typeface="Consolas" panose="020B0609020204030204" pitchFamily="49" charset="0"/>
+                <a:cs typeface="Aharoni" panose="020B0604020202020204" pitchFamily="2" charset="-79"/>
               </a:rPr>
-              <a:t>room locatable</a:t>
-            </a:r>
-            <a:r>
-              <a:rPr dirty="0"/>
-              <a:t> </a:t>
-            </a:r>
-            <a:r>
-              <a:rPr b="1" dirty="0"/>
-              <a:t>-</a:t>
-            </a:r>
-            <a:r>
-              <a:rPr dirty="0"/>
-              <a:t> </a:t>
-            </a:r>
-            <a:r>
-              <a:rPr dirty="0">
-                <a:solidFill>
-                  <a:schemeClr val="accent3"/>
-                </a:solidFill>
-              </a:rPr>
-              <a:t>object</a:t>
-            </a:r>
-          </a:p>
-          <a:p>
-            <a:pPr marL="0" indent="0">
-              <a:buNone/>
-            </a:pPr>
-            <a:r>
-              <a:rPr dirty="0"/>
-              <a:t>        </a:t>
-            </a:r>
-            <a:r>
-              <a:rPr dirty="0">
-                <a:solidFill>
-                  <a:schemeClr val="accent3"/>
-                </a:solidFill>
-              </a:rPr>
-              <a:t>robot crate</a:t>
-            </a:r>
-            <a:r>
-              <a:rPr dirty="0"/>
-              <a:t> </a:t>
-            </a:r>
-            <a:r>
-              <a:rPr b="1" dirty="0"/>
-              <a:t>-</a:t>
-            </a:r>
-            <a:r>
-              <a:rPr dirty="0"/>
-              <a:t> </a:t>
-            </a:r>
-            <a:r>
-              <a:rPr dirty="0">
-                <a:solidFill>
-                  <a:schemeClr val="accent3"/>
-                </a:solidFill>
-              </a:rPr>
-              <a:t>locatable</a:t>
-            </a:r>
-          </a:p>
-          <a:p>
-            <a:pPr marL="0" indent="0">
-              <a:buNone/>
-              <a:defRPr b="1"/>
-            </a:pPr>
-            <a:r>
-              <a:rPr dirty="0"/>
-              <a:t>)</a:t>
-            </a:r>
+              <a:t>l5</a:t>
+            </a:r>
+            <a:endParaRPr lang="en-CA" sz="3200" b="1" dirty="0">
+              <a:latin typeface="Consolas" panose="020B0609020204030204" pitchFamily="49" charset="0"/>
+              <a:cs typeface="Aharoni" panose="020B0604020202020204" pitchFamily="2" charset="-79"/>
+            </a:endParaRPr>
           </a:p>
         </p:txBody>
       </p:sp>
+      <p:sp>
+        <p:nvSpPr>
+          <p:cNvPr id="6" name="TextBox 5">
+            <a:extLst>
+              <a:ext uri="{FF2B5EF4-FFF2-40B4-BE49-F238E27FC236}">
+                <a16:creationId xmlns:a16="http://schemas.microsoft.com/office/drawing/2014/main" id="{A346B01F-43F8-CA9F-D682-72221B86D4FA}"/>
+              </a:ext>
+            </a:extLst>
+          </p:cNvPr>
+          <p:cNvSpPr txBox="1"/>
+          <p:nvPr/>
+        </p:nvSpPr>
+        <p:spPr>
+          <a:xfrm>
+            <a:off x="7332764" y="2088542"/>
+            <a:ext cx="636713" cy="584775"/>
+          </a:xfrm>
+          <a:prstGeom prst="rect">
+            <a:avLst/>
+          </a:prstGeom>
+          <a:noFill/>
+        </p:spPr>
+        <p:txBody>
+          <a:bodyPr wrap="none" rtlCol="0">
+            <a:spAutoFit/>
+          </a:bodyPr>
+          <a:lstStyle/>
+          <a:p>
+            <a:r>
+              <a:rPr lang="en-US" sz="3200" b="1" dirty="0">
+                <a:latin typeface="Consolas" panose="020B0609020204030204" pitchFamily="49" charset="0"/>
+                <a:cs typeface="Aharoni" panose="020B0604020202020204" pitchFamily="2" charset="-79"/>
+              </a:rPr>
+              <a:t>l4</a:t>
+            </a:r>
+            <a:endParaRPr lang="en-CA" sz="3200" b="1" dirty="0">
+              <a:latin typeface="Consolas" panose="020B0609020204030204" pitchFamily="49" charset="0"/>
+              <a:cs typeface="Aharoni" panose="020B0604020202020204" pitchFamily="2" charset="-79"/>
+            </a:endParaRPr>
+          </a:p>
+        </p:txBody>
+      </p:sp>
+      <p:sp>
+        <p:nvSpPr>
+          <p:cNvPr id="7" name="TextBox 6">
+            <a:extLst>
+              <a:ext uri="{FF2B5EF4-FFF2-40B4-BE49-F238E27FC236}">
+                <a16:creationId xmlns:a16="http://schemas.microsoft.com/office/drawing/2014/main" id="{5F08CD88-F803-9293-B62F-A4C4E916F050}"/>
+              </a:ext>
+            </a:extLst>
+          </p:cNvPr>
+          <p:cNvSpPr txBox="1"/>
+          <p:nvPr/>
+        </p:nvSpPr>
+        <p:spPr>
+          <a:xfrm>
+            <a:off x="3904168" y="2088542"/>
+            <a:ext cx="636713" cy="584775"/>
+          </a:xfrm>
+          <a:prstGeom prst="rect">
+            <a:avLst/>
+          </a:prstGeom>
+          <a:noFill/>
+        </p:spPr>
+        <p:txBody>
+          <a:bodyPr wrap="none" rtlCol="0">
+            <a:spAutoFit/>
+          </a:bodyPr>
+          <a:lstStyle/>
+          <a:p>
+            <a:r>
+              <a:rPr lang="en-US" sz="3200" b="1" dirty="0">
+                <a:latin typeface="Consolas" panose="020B0609020204030204" pitchFamily="49" charset="0"/>
+                <a:cs typeface="Aharoni" panose="020B0604020202020204" pitchFamily="2" charset="-79"/>
+              </a:rPr>
+              <a:t>l2</a:t>
+            </a:r>
+            <a:endParaRPr lang="en-CA" sz="3200" b="1" dirty="0">
+              <a:latin typeface="Consolas" panose="020B0609020204030204" pitchFamily="49" charset="0"/>
+              <a:cs typeface="Aharoni" panose="020B0604020202020204" pitchFamily="2" charset="-79"/>
+            </a:endParaRPr>
+          </a:p>
+        </p:txBody>
+      </p:sp>
+      <p:sp>
+        <p:nvSpPr>
+          <p:cNvPr id="8" name="TextBox 7">
+            <a:extLst>
+              <a:ext uri="{FF2B5EF4-FFF2-40B4-BE49-F238E27FC236}">
+                <a16:creationId xmlns:a16="http://schemas.microsoft.com/office/drawing/2014/main" id="{58A01EB0-EFE8-4FDC-4F2C-EB83E0F28593}"/>
+              </a:ext>
+            </a:extLst>
+          </p:cNvPr>
+          <p:cNvSpPr txBox="1"/>
+          <p:nvPr/>
+        </p:nvSpPr>
+        <p:spPr>
+          <a:xfrm>
+            <a:off x="3904168" y="4184684"/>
+            <a:ext cx="636713" cy="584775"/>
+          </a:xfrm>
+          <a:prstGeom prst="rect">
+            <a:avLst/>
+          </a:prstGeom>
+          <a:noFill/>
+        </p:spPr>
+        <p:txBody>
+          <a:bodyPr wrap="none" rtlCol="0">
+            <a:spAutoFit/>
+          </a:bodyPr>
+          <a:lstStyle/>
+          <a:p>
+            <a:r>
+              <a:rPr lang="en-US" sz="3200" b="1" dirty="0">
+                <a:latin typeface="Consolas" panose="020B0609020204030204" pitchFamily="49" charset="0"/>
+                <a:cs typeface="Aharoni" panose="020B0604020202020204" pitchFamily="2" charset="-79"/>
+              </a:rPr>
+              <a:t>l3</a:t>
+            </a:r>
+            <a:endParaRPr lang="en-CA" sz="3200" b="1" dirty="0">
+              <a:latin typeface="Consolas" panose="020B0609020204030204" pitchFamily="49" charset="0"/>
+              <a:cs typeface="Aharoni" panose="020B0604020202020204" pitchFamily="2" charset="-79"/>
+            </a:endParaRPr>
+          </a:p>
+        </p:txBody>
+      </p:sp>
+      <p:cxnSp>
+        <p:nvCxnSpPr>
+          <p:cNvPr id="10" name="Connector: Curved 9">
+            <a:extLst>
+              <a:ext uri="{FF2B5EF4-FFF2-40B4-BE49-F238E27FC236}">
+                <a16:creationId xmlns:a16="http://schemas.microsoft.com/office/drawing/2014/main" id="{CBCE71C7-32D6-E752-98C0-7C75681D5AA0}"/>
+              </a:ext>
+            </a:extLst>
+          </p:cNvPr>
+          <p:cNvCxnSpPr>
+            <a:cxnSpLocks/>
+            <a:stCxn id="4" idx="0"/>
+            <a:endCxn id="7" idx="3"/>
+          </p:cNvCxnSpPr>
+          <p:nvPr/>
+        </p:nvCxnSpPr>
+        <p:spPr>
+          <a:xfrm rot="16200000" flipV="1">
+            <a:off x="4940600" y="1981211"/>
+            <a:ext cx="755682" cy="1555119"/>
+          </a:xfrm>
+          <a:prstGeom prst="curvedConnector2">
+            <a:avLst/>
+          </a:prstGeom>
+          <a:ln w="57150">
+            <a:solidFill>
+              <a:schemeClr val="tx2">
+                <a:lumMod val="90000"/>
+              </a:schemeClr>
+            </a:solidFill>
+            <a:tailEnd type="triangle"/>
+          </a:ln>
+        </p:spPr>
+        <p:style>
+          <a:lnRef idx="1">
+            <a:schemeClr val="accent1"/>
+          </a:lnRef>
+          <a:fillRef idx="0">
+            <a:schemeClr val="accent1"/>
+          </a:fillRef>
+          <a:effectRef idx="0">
+            <a:schemeClr val="accent1"/>
+          </a:effectRef>
+          <a:fontRef idx="minor">
+            <a:schemeClr val="tx1"/>
+          </a:fontRef>
+        </p:style>
+      </p:cxnSp>
+      <p:cxnSp>
+        <p:nvCxnSpPr>
+          <p:cNvPr id="11" name="Connector: Curved 10">
+            <a:extLst>
+              <a:ext uri="{FF2B5EF4-FFF2-40B4-BE49-F238E27FC236}">
+                <a16:creationId xmlns:a16="http://schemas.microsoft.com/office/drawing/2014/main" id="{F703C8DD-BCFF-1F14-BB71-72DA209FE0BD}"/>
+              </a:ext>
+            </a:extLst>
+          </p:cNvPr>
+          <p:cNvCxnSpPr>
+            <a:cxnSpLocks/>
+            <a:stCxn id="7" idx="2"/>
+            <a:endCxn id="8" idx="0"/>
+          </p:cNvCxnSpPr>
+          <p:nvPr/>
+        </p:nvCxnSpPr>
+        <p:spPr>
+          <a:xfrm rot="5400000">
+            <a:off x="3466842" y="3429000"/>
+            <a:ext cx="1511367" cy="12700"/>
+          </a:xfrm>
+          <a:prstGeom prst="curvedConnector3">
+            <a:avLst/>
+          </a:prstGeom>
+          <a:ln w="57150">
+            <a:solidFill>
+              <a:schemeClr val="tx2">
+                <a:lumMod val="90000"/>
+              </a:schemeClr>
+            </a:solidFill>
+            <a:tailEnd type="triangle"/>
+          </a:ln>
+        </p:spPr>
+        <p:style>
+          <a:lnRef idx="1">
+            <a:schemeClr val="accent1"/>
+          </a:lnRef>
+          <a:fillRef idx="0">
+            <a:schemeClr val="accent1"/>
+          </a:fillRef>
+          <a:effectRef idx="0">
+            <a:schemeClr val="accent1"/>
+          </a:effectRef>
+          <a:fontRef idx="minor">
+            <a:schemeClr val="tx1"/>
+          </a:fontRef>
+        </p:style>
+      </p:cxnSp>
+      <p:cxnSp>
+        <p:nvCxnSpPr>
+          <p:cNvPr id="12" name="Connector: Curved 11">
+            <a:extLst>
+              <a:ext uri="{FF2B5EF4-FFF2-40B4-BE49-F238E27FC236}">
+                <a16:creationId xmlns:a16="http://schemas.microsoft.com/office/drawing/2014/main" id="{5014F027-4B8B-F6A1-93E9-11707228A624}"/>
+              </a:ext>
+            </a:extLst>
+          </p:cNvPr>
+          <p:cNvCxnSpPr>
+            <a:cxnSpLocks/>
+            <a:stCxn id="5" idx="1"/>
+            <a:endCxn id="4" idx="2"/>
+          </p:cNvCxnSpPr>
+          <p:nvPr/>
+        </p:nvCxnSpPr>
+        <p:spPr>
+          <a:xfrm rot="10800000">
+            <a:off x="6096001" y="3721387"/>
+            <a:ext cx="1236763" cy="755684"/>
+          </a:xfrm>
+          <a:prstGeom prst="curvedConnector2">
+            <a:avLst/>
+          </a:prstGeom>
+          <a:ln w="57150">
+            <a:solidFill>
+              <a:schemeClr val="tx2">
+                <a:lumMod val="90000"/>
+              </a:schemeClr>
+            </a:solidFill>
+            <a:tailEnd type="triangle"/>
+          </a:ln>
+        </p:spPr>
+        <p:style>
+          <a:lnRef idx="1">
+            <a:schemeClr val="accent1"/>
+          </a:lnRef>
+          <a:fillRef idx="0">
+            <a:schemeClr val="accent1"/>
+          </a:fillRef>
+          <a:effectRef idx="0">
+            <a:schemeClr val="accent1"/>
+          </a:effectRef>
+          <a:fontRef idx="minor">
+            <a:schemeClr val="tx1"/>
+          </a:fontRef>
+        </p:style>
+      </p:cxnSp>
+      <p:cxnSp>
+        <p:nvCxnSpPr>
+          <p:cNvPr id="13" name="Connector: Curved 12">
+            <a:extLst>
+              <a:ext uri="{FF2B5EF4-FFF2-40B4-BE49-F238E27FC236}">
+                <a16:creationId xmlns:a16="http://schemas.microsoft.com/office/drawing/2014/main" id="{53A916BA-B83B-4FB4-0529-4E039A455DD2}"/>
+              </a:ext>
+            </a:extLst>
+          </p:cNvPr>
+          <p:cNvCxnSpPr>
+            <a:cxnSpLocks/>
+            <a:stCxn id="6" idx="2"/>
+            <a:endCxn id="5" idx="0"/>
+          </p:cNvCxnSpPr>
+          <p:nvPr/>
+        </p:nvCxnSpPr>
+        <p:spPr>
+          <a:xfrm rot="5400000">
+            <a:off x="6895438" y="3429000"/>
+            <a:ext cx="1511366" cy="1"/>
+          </a:xfrm>
+          <a:prstGeom prst="curvedConnector3">
+            <a:avLst>
+              <a:gd name="adj1" fmla="val 50000"/>
+            </a:avLst>
+          </a:prstGeom>
+          <a:ln w="57150">
+            <a:solidFill>
+              <a:schemeClr val="tx2">
+                <a:lumMod val="90000"/>
+              </a:schemeClr>
+            </a:solidFill>
+            <a:tailEnd type="triangle"/>
+          </a:ln>
+        </p:spPr>
+        <p:style>
+          <a:lnRef idx="1">
+            <a:schemeClr val="accent1"/>
+          </a:lnRef>
+          <a:fillRef idx="0">
+            <a:schemeClr val="accent1"/>
+          </a:fillRef>
+          <a:effectRef idx="0">
+            <a:schemeClr val="accent1"/>
+          </a:effectRef>
+          <a:fontRef idx="minor">
+            <a:schemeClr val="tx1"/>
+          </a:fontRef>
+        </p:style>
+      </p:cxnSp>
+      <p:cxnSp>
+        <p:nvCxnSpPr>
+          <p:cNvPr id="14" name="Connector: Curved 13">
+            <a:extLst>
+              <a:ext uri="{FF2B5EF4-FFF2-40B4-BE49-F238E27FC236}">
+                <a16:creationId xmlns:a16="http://schemas.microsoft.com/office/drawing/2014/main" id="{A5F862B4-E228-4A23-88C0-F7F0F193E1F0}"/>
+              </a:ext>
+            </a:extLst>
+          </p:cNvPr>
+          <p:cNvCxnSpPr>
+            <a:cxnSpLocks/>
+            <a:stCxn id="4" idx="0"/>
+            <a:endCxn id="6" idx="1"/>
+          </p:cNvCxnSpPr>
+          <p:nvPr/>
+        </p:nvCxnSpPr>
+        <p:spPr>
+          <a:xfrm rot="5400000" flipH="1" flipV="1">
+            <a:off x="6336541" y="2140389"/>
+            <a:ext cx="755682" cy="1236764"/>
+          </a:xfrm>
+          <a:prstGeom prst="curvedConnector2">
+            <a:avLst/>
+          </a:prstGeom>
+          <a:ln w="57150">
+            <a:solidFill>
+              <a:schemeClr val="tx2">
+                <a:lumMod val="90000"/>
+              </a:schemeClr>
+            </a:solidFill>
+            <a:tailEnd type="triangle"/>
+          </a:ln>
+        </p:spPr>
+        <p:style>
+          <a:lnRef idx="1">
+            <a:schemeClr val="accent1"/>
+          </a:lnRef>
+          <a:fillRef idx="0">
+            <a:schemeClr val="accent1"/>
+          </a:fillRef>
+          <a:effectRef idx="0">
+            <a:schemeClr val="accent1"/>
+          </a:effectRef>
+          <a:fontRef idx="minor">
+            <a:schemeClr val="tx1"/>
+          </a:fontRef>
+        </p:style>
+      </p:cxnSp>
+      <p:cxnSp>
+        <p:nvCxnSpPr>
+          <p:cNvPr id="15" name="Connector: Curved 14">
+            <a:extLst>
+              <a:ext uri="{FF2B5EF4-FFF2-40B4-BE49-F238E27FC236}">
+                <a16:creationId xmlns:a16="http://schemas.microsoft.com/office/drawing/2014/main" id="{2E9AC1C0-AB39-51F9-1934-14922BB47086}"/>
+              </a:ext>
+            </a:extLst>
+          </p:cNvPr>
+          <p:cNvCxnSpPr>
+            <a:cxnSpLocks/>
+            <a:stCxn id="8" idx="3"/>
+            <a:endCxn id="4" idx="2"/>
+          </p:cNvCxnSpPr>
+          <p:nvPr/>
+        </p:nvCxnSpPr>
+        <p:spPr>
+          <a:xfrm flipV="1">
+            <a:off x="4540881" y="3721387"/>
+            <a:ext cx="1555119" cy="755685"/>
+          </a:xfrm>
+          <a:prstGeom prst="curvedConnector2">
+            <a:avLst/>
+          </a:prstGeom>
+          <a:ln w="57150">
+            <a:solidFill>
+              <a:schemeClr val="tx2">
+                <a:lumMod val="90000"/>
+              </a:schemeClr>
+            </a:solidFill>
+            <a:tailEnd type="triangle"/>
+          </a:ln>
+        </p:spPr>
+        <p:style>
+          <a:lnRef idx="1">
+            <a:schemeClr val="accent1"/>
+          </a:lnRef>
+          <a:fillRef idx="0">
+            <a:schemeClr val="accent1"/>
+          </a:fillRef>
+          <a:effectRef idx="0">
+            <a:schemeClr val="accent1"/>
+          </a:effectRef>
+          <a:fontRef idx="minor">
+            <a:schemeClr val="tx1"/>
+          </a:fontRef>
+        </p:style>
+      </p:cxnSp>
     </p:spTree>
+    <p:extLst>
+      <p:ext uri="{BB962C8B-B14F-4D97-AF65-F5344CB8AC3E}">
+        <p14:creationId xmlns:p14="http://schemas.microsoft.com/office/powerpoint/2010/main" val="2383263933"/>
+      </p:ext>
+    </p:extLst>
   </p:cSld>
   <p:clrMapOvr>
     <a:masterClrMapping/>
@@ -12328,984 +10467,16 @@
           <a:chExt cx="0" cy="0"/>
         </a:xfrm>
       </p:grpSpPr>
-      <p:sp>
-        <p:nvSpPr>
-          <p:cNvPr id="184" name="Moving Crates: Predicates"/>
-          <p:cNvSpPr txBox="1">
-            <a:spLocks noGrp="1"/>
-          </p:cNvSpPr>
-          <p:nvPr>
-            <p:ph type="title"/>
-          </p:nvPr>
-        </p:nvSpPr>
-        <p:spPr>
-          <a:prstGeom prst="rect">
-            <a:avLst/>
-          </a:prstGeom>
-        </p:spPr>
-        <p:txBody>
-          <a:bodyPr/>
-          <a:lstStyle/>
-          <a:p>
-            <a:r>
-              <a:t>Moving Crates: Predicates</a:t>
-            </a:r>
-          </a:p>
-        </p:txBody>
-      </p:sp>
-      <p:sp>
-        <p:nvSpPr>
-          <p:cNvPr id="185" name="(holding ?r - robot ?c - crate)…"/>
-          <p:cNvSpPr txBox="1">
-            <a:spLocks noGrp="1"/>
-          </p:cNvSpPr>
-          <p:nvPr>
-            <p:ph type="body" sz="half" idx="1"/>
-          </p:nvPr>
-        </p:nvSpPr>
-        <p:spPr>
-          <a:xfrm>
-            <a:off x="3909443" y="1946672"/>
-            <a:ext cx="4521124" cy="4018359"/>
-          </a:xfrm>
-          <a:prstGeom prst="rect">
-            <a:avLst/>
-          </a:prstGeom>
-        </p:spPr>
-        <p:txBody>
-          <a:bodyPr/>
-          <a:lstStyle/>
-          <a:p>
-            <a:pPr marL="0" indent="0">
-              <a:buNone/>
-              <a:defRPr b="1"/>
-            </a:pPr>
-            <a:r>
-              <a:rPr dirty="0"/>
-              <a:t>(</a:t>
-            </a:r>
-            <a:r>
-              <a:rPr b="0" dirty="0">
-                <a:solidFill>
-                  <a:schemeClr val="accent2"/>
-                </a:solidFill>
-              </a:rPr>
-              <a:t>holding</a:t>
-            </a:r>
-            <a:r>
-              <a:rPr b="0" dirty="0">
-                <a:solidFill>
-                  <a:schemeClr val="accent2">
-                    <a:satOff val="21919"/>
-                    <a:lumOff val="-20666"/>
-                  </a:schemeClr>
-                </a:solidFill>
-              </a:rPr>
-              <a:t> </a:t>
-            </a:r>
-            <a:r>
-              <a:rPr b="0" dirty="0">
-                <a:solidFill>
-                  <a:schemeClr val="accent5"/>
-                </a:solidFill>
-              </a:rPr>
-              <a:t>?r</a:t>
-            </a:r>
-            <a:r>
-              <a:rPr b="0" dirty="0">
-                <a:solidFill>
-                  <a:schemeClr val="accent2">
-                    <a:satOff val="21919"/>
-                    <a:lumOff val="-20666"/>
-                  </a:schemeClr>
-                </a:solidFill>
-              </a:rPr>
-              <a:t> - </a:t>
-            </a:r>
-            <a:r>
-              <a:rPr b="0" dirty="0">
-                <a:solidFill>
-                  <a:schemeClr val="accent3"/>
-                </a:solidFill>
-              </a:rPr>
-              <a:t>robot</a:t>
-            </a:r>
-            <a:r>
-              <a:rPr b="0" dirty="0">
-                <a:solidFill>
-                  <a:schemeClr val="accent2">
-                    <a:satOff val="21919"/>
-                    <a:lumOff val="-20666"/>
-                  </a:schemeClr>
-                </a:solidFill>
-              </a:rPr>
-              <a:t> </a:t>
-            </a:r>
-            <a:r>
-              <a:rPr b="0" dirty="0">
-                <a:solidFill>
-                  <a:schemeClr val="accent5"/>
-                </a:solidFill>
-              </a:rPr>
-              <a:t>?c </a:t>
-            </a:r>
-            <a:r>
-              <a:rPr b="0" dirty="0">
-                <a:solidFill>
-                  <a:schemeClr val="accent2">
-                    <a:satOff val="21919"/>
-                    <a:lumOff val="-20666"/>
-                  </a:schemeClr>
-                </a:solidFill>
-              </a:rPr>
-              <a:t>- </a:t>
-            </a:r>
-            <a:r>
-              <a:rPr b="0" dirty="0">
-                <a:solidFill>
-                  <a:schemeClr val="accent3"/>
-                </a:solidFill>
-              </a:rPr>
-              <a:t>crate</a:t>
-            </a:r>
-            <a:r>
-              <a:rPr dirty="0"/>
-              <a:t>)</a:t>
-            </a:r>
-          </a:p>
-          <a:p>
-            <a:pPr marL="0" indent="0">
-              <a:buNone/>
-              <a:defRPr b="1"/>
-            </a:pPr>
-            <a:r>
-              <a:rPr dirty="0"/>
-              <a:t>(</a:t>
-            </a:r>
-            <a:r>
-              <a:rPr b="0" dirty="0">
-                <a:solidFill>
-                  <a:schemeClr val="accent2"/>
-                </a:solidFill>
-              </a:rPr>
-              <a:t>in</a:t>
-            </a:r>
-            <a:r>
-              <a:rPr b="0" dirty="0">
-                <a:solidFill>
-                  <a:schemeClr val="accent2">
-                    <a:satOff val="21919"/>
-                    <a:lumOff val="-20666"/>
-                  </a:schemeClr>
-                </a:solidFill>
-              </a:rPr>
-              <a:t> </a:t>
-            </a:r>
-            <a:r>
-              <a:rPr b="0" dirty="0">
-                <a:solidFill>
-                  <a:schemeClr val="accent5"/>
-                </a:solidFill>
-              </a:rPr>
-              <a:t>?obj </a:t>
-            </a:r>
-            <a:r>
-              <a:rPr b="0" dirty="0">
-                <a:solidFill>
-                  <a:schemeClr val="accent2">
-                    <a:satOff val="21919"/>
-                    <a:lumOff val="-20666"/>
-                  </a:schemeClr>
-                </a:solidFill>
-              </a:rPr>
-              <a:t>- </a:t>
-            </a:r>
-            <a:r>
-              <a:rPr b="0" dirty="0">
-                <a:solidFill>
-                  <a:schemeClr val="accent3"/>
-                </a:solidFill>
-              </a:rPr>
-              <a:t>locatable</a:t>
-            </a:r>
-            <a:r>
-              <a:rPr b="0" dirty="0">
-                <a:solidFill>
-                  <a:schemeClr val="accent2">
-                    <a:satOff val="21919"/>
-                    <a:lumOff val="-20666"/>
-                  </a:schemeClr>
-                </a:solidFill>
-              </a:rPr>
-              <a:t> </a:t>
-            </a:r>
-            <a:r>
-              <a:rPr b="0" dirty="0">
-                <a:solidFill>
-                  <a:schemeClr val="accent5"/>
-                </a:solidFill>
-              </a:rPr>
-              <a:t>?r </a:t>
-            </a:r>
-            <a:r>
-              <a:rPr b="0" dirty="0">
-                <a:solidFill>
-                  <a:schemeClr val="accent2">
-                    <a:satOff val="21919"/>
-                    <a:lumOff val="-20666"/>
-                  </a:schemeClr>
-                </a:solidFill>
-              </a:rPr>
-              <a:t>- </a:t>
-            </a:r>
-            <a:r>
-              <a:rPr b="0" dirty="0">
-                <a:solidFill>
-                  <a:schemeClr val="accent3"/>
-                </a:solidFill>
-              </a:rPr>
-              <a:t>room</a:t>
-            </a:r>
-            <a:r>
-              <a:rPr dirty="0"/>
-              <a:t>)</a:t>
-            </a:r>
-          </a:p>
-          <a:p>
-            <a:pPr marL="0" indent="0">
-              <a:buNone/>
-              <a:defRPr b="1"/>
-            </a:pPr>
-            <a:r>
-              <a:rPr dirty="0"/>
-              <a:t>(</a:t>
-            </a:r>
-            <a:r>
-              <a:rPr b="0" dirty="0">
-                <a:solidFill>
-                  <a:schemeClr val="accent2"/>
-                </a:solidFill>
-              </a:rPr>
-              <a:t>hands-free</a:t>
-            </a:r>
-            <a:r>
-              <a:rPr b="0" dirty="0">
-                <a:solidFill>
-                  <a:schemeClr val="accent2">
-                    <a:satOff val="21919"/>
-                    <a:lumOff val="-20666"/>
-                  </a:schemeClr>
-                </a:solidFill>
-              </a:rPr>
-              <a:t> </a:t>
-            </a:r>
-            <a:r>
-              <a:rPr b="0" dirty="0">
-                <a:solidFill>
-                  <a:schemeClr val="accent5"/>
-                </a:solidFill>
-              </a:rPr>
-              <a:t>?r </a:t>
-            </a:r>
-            <a:r>
-              <a:rPr b="0" dirty="0">
-                <a:solidFill>
-                  <a:schemeClr val="accent2">
-                    <a:satOff val="21919"/>
-                    <a:lumOff val="-20666"/>
-                  </a:schemeClr>
-                </a:solidFill>
-              </a:rPr>
-              <a:t>- </a:t>
-            </a:r>
-            <a:r>
-              <a:rPr b="0" dirty="0">
-                <a:solidFill>
-                  <a:schemeClr val="accent3"/>
-                </a:solidFill>
-              </a:rPr>
-              <a:t>robot</a:t>
-            </a:r>
-            <a:r>
-              <a:rPr dirty="0"/>
-              <a:t>)</a:t>
-            </a:r>
-          </a:p>
-          <a:p>
-            <a:pPr marL="0" indent="0">
-              <a:buNone/>
-              <a:defRPr b="1"/>
-            </a:pPr>
-            <a:r>
-              <a:rPr dirty="0"/>
-              <a:t>(</a:t>
-            </a:r>
-            <a:r>
-              <a:rPr b="0" dirty="0">
-                <a:solidFill>
-                  <a:schemeClr val="accent2"/>
-                </a:solidFill>
-              </a:rPr>
-              <a:t>connected</a:t>
-            </a:r>
-            <a:r>
-              <a:rPr b="0" dirty="0">
-                <a:solidFill>
-                  <a:schemeClr val="accent2">
-                    <a:satOff val="21919"/>
-                    <a:lumOff val="-20666"/>
-                  </a:schemeClr>
-                </a:solidFill>
-              </a:rPr>
-              <a:t> </a:t>
-            </a:r>
-            <a:r>
-              <a:rPr b="0" dirty="0">
-                <a:solidFill>
-                  <a:schemeClr val="accent5"/>
-                </a:solidFill>
-              </a:rPr>
-              <a:t>?r1 ?r2 </a:t>
-            </a:r>
-            <a:r>
-              <a:rPr b="0" dirty="0">
-                <a:solidFill>
-                  <a:schemeClr val="accent2">
-                    <a:satOff val="21919"/>
-                    <a:lumOff val="-20666"/>
-                  </a:schemeClr>
-                </a:solidFill>
-              </a:rPr>
-              <a:t>- </a:t>
-            </a:r>
-            <a:r>
-              <a:rPr b="0" dirty="0">
-                <a:solidFill>
-                  <a:schemeClr val="accent3"/>
-                </a:solidFill>
-              </a:rPr>
-              <a:t>room</a:t>
-            </a:r>
-            <a:r>
-              <a:rPr dirty="0"/>
-              <a:t>)</a:t>
-            </a:r>
-          </a:p>
-        </p:txBody>
-      </p:sp>
     </p:spTree>
+    <p:extLst>
+      <p:ext uri="{BB962C8B-B14F-4D97-AF65-F5344CB8AC3E}">
+        <p14:creationId xmlns:p14="http://schemas.microsoft.com/office/powerpoint/2010/main" val="1299345925"/>
+      </p:ext>
+    </p:extLst>
   </p:cSld>
   <p:clrMapOvr>
     <a:masterClrMapping/>
   </p:clrMapOvr>
-  <p:transition spd="med"/>
-</p:sld>
-</file>
-
-<file path=ppt/slides/slide9.xml><?xml version="1.0" encoding="utf-8"?>
-<p:sld xmlns:a="http://schemas.openxmlformats.org/drawingml/2006/main" xmlns:r="http://schemas.openxmlformats.org/officeDocument/2006/relationships" xmlns:p="http://schemas.openxmlformats.org/presentationml/2006/main">
-  <p:cSld>
-    <p:spTree>
-      <p:nvGrpSpPr>
-        <p:cNvPr id="1" name=""/>
-        <p:cNvGrpSpPr/>
-        <p:nvPr/>
-      </p:nvGrpSpPr>
-      <p:grpSpPr>
-        <a:xfrm>
-          <a:off x="0" y="0"/>
-          <a:ext cx="0" cy="0"/>
-          <a:chOff x="0" y="0"/>
-          <a:chExt cx="0" cy="0"/>
-        </a:xfrm>
-      </p:grpSpPr>
-      <p:sp>
-        <p:nvSpPr>
-          <p:cNvPr id="187" name="Moving Crates: Action"/>
-          <p:cNvSpPr txBox="1">
-            <a:spLocks noGrp="1"/>
-          </p:cNvSpPr>
-          <p:nvPr>
-            <p:ph type="title"/>
-          </p:nvPr>
-        </p:nvSpPr>
-        <p:spPr>
-          <a:prstGeom prst="rect">
-            <a:avLst/>
-          </a:prstGeom>
-        </p:spPr>
-        <p:txBody>
-          <a:bodyPr/>
-          <a:lstStyle/>
-          <a:p>
-            <a:r>
-              <a:t>Moving Crates: Action</a:t>
-            </a:r>
-          </a:p>
-        </p:txBody>
-      </p:sp>
-      <p:sp>
-        <p:nvSpPr>
-          <p:cNvPr id="188" name="(move ?rob - robot ?r1 ?r2 - room)…"/>
-          <p:cNvSpPr txBox="1">
-            <a:spLocks noGrp="1"/>
-          </p:cNvSpPr>
-          <p:nvPr>
-            <p:ph type="body" idx="1"/>
-          </p:nvPr>
-        </p:nvSpPr>
-        <p:spPr>
-          <a:xfrm>
-            <a:off x="976313" y="1818752"/>
-            <a:ext cx="10239375" cy="5039248"/>
-          </a:xfrm>
-          <a:prstGeom prst="rect">
-            <a:avLst/>
-          </a:prstGeom>
-        </p:spPr>
-        <p:txBody>
-          <a:bodyPr>
-            <a:normAutofit/>
-          </a:bodyPr>
-          <a:lstStyle/>
-          <a:p>
-            <a:pPr marL="0" indent="0" defTabSz="316278">
-              <a:lnSpc>
-                <a:spcPct val="50000"/>
-              </a:lnSpc>
-              <a:spcBef>
-                <a:spcPts val="1687"/>
-              </a:spcBef>
-              <a:buNone/>
-              <a:defRPr sz="2772" b="1"/>
-            </a:pPr>
-            <a:r>
-              <a:rPr dirty="0"/>
-              <a:t>(</a:t>
-            </a:r>
-            <a:r>
-              <a:rPr b="0" dirty="0">
-                <a:solidFill>
-                  <a:schemeClr val="accent4"/>
-                </a:solidFill>
-              </a:rPr>
-              <a:t>move</a:t>
-            </a:r>
-            <a:r>
-              <a:rPr b="0" dirty="0">
-                <a:solidFill>
-                  <a:schemeClr val="accent6">
-                    <a:hueOff val="52948"/>
-                    <a:satOff val="5436"/>
-                    <a:lumOff val="-12041"/>
-                  </a:schemeClr>
-                </a:solidFill>
-              </a:rPr>
-              <a:t> </a:t>
-            </a:r>
-            <a:r>
-              <a:rPr b="0" dirty="0">
-                <a:solidFill>
-                  <a:schemeClr val="accent5"/>
-                </a:solidFill>
-              </a:rPr>
-              <a:t>?rob </a:t>
-            </a:r>
-            <a:r>
-              <a:rPr b="0" dirty="0">
-                <a:solidFill>
-                  <a:schemeClr val="accent6">
-                    <a:hueOff val="52948"/>
-                    <a:satOff val="5436"/>
-                    <a:lumOff val="-12041"/>
-                  </a:schemeClr>
-                </a:solidFill>
-              </a:rPr>
-              <a:t>- </a:t>
-            </a:r>
-            <a:r>
-              <a:rPr b="0" dirty="0">
-                <a:solidFill>
-                  <a:schemeClr val="accent3"/>
-                </a:solidFill>
-              </a:rPr>
-              <a:t>robot</a:t>
-            </a:r>
-            <a:r>
-              <a:rPr b="0" dirty="0">
-                <a:solidFill>
-                  <a:schemeClr val="accent6">
-                    <a:hueOff val="52948"/>
-                    <a:satOff val="5436"/>
-                    <a:lumOff val="-12041"/>
-                  </a:schemeClr>
-                </a:solidFill>
-              </a:rPr>
-              <a:t> </a:t>
-            </a:r>
-            <a:r>
-              <a:rPr b="0" dirty="0">
-                <a:solidFill>
-                  <a:schemeClr val="accent5"/>
-                </a:solidFill>
-              </a:rPr>
-              <a:t>?r1 ?r2</a:t>
-            </a:r>
-            <a:r>
-              <a:rPr b="0" dirty="0">
-                <a:solidFill>
-                  <a:schemeClr val="accent6">
-                    <a:hueOff val="52948"/>
-                    <a:satOff val="5436"/>
-                    <a:lumOff val="-12041"/>
-                  </a:schemeClr>
-                </a:solidFill>
-              </a:rPr>
-              <a:t> - </a:t>
-            </a:r>
-            <a:r>
-              <a:rPr b="0" dirty="0">
-                <a:solidFill>
-                  <a:schemeClr val="accent3"/>
-                </a:solidFill>
-              </a:rPr>
-              <a:t>room</a:t>
-            </a:r>
-            <a:r>
-              <a:rPr dirty="0"/>
-              <a:t>)</a:t>
-            </a:r>
-          </a:p>
-          <a:p>
-            <a:pPr marL="481292" lvl="1" indent="-240646" defTabSz="316278">
-              <a:lnSpc>
-                <a:spcPct val="50000"/>
-              </a:lnSpc>
-              <a:spcBef>
-                <a:spcPts val="1687"/>
-              </a:spcBef>
-              <a:defRPr sz="2772" b="1"/>
-            </a:pPr>
-            <a:r>
-              <a:rPr dirty="0"/>
-              <a:t>Pre:</a:t>
-            </a:r>
-            <a:r>
-              <a:rPr b="0" dirty="0"/>
-              <a:t> Robot in right location, and rooms connected</a:t>
-            </a:r>
-          </a:p>
-          <a:p>
-            <a:pPr marL="481292" lvl="1" indent="-240646" defTabSz="316278">
-              <a:lnSpc>
-                <a:spcPct val="50000"/>
-              </a:lnSpc>
-              <a:spcBef>
-                <a:spcPts val="1687"/>
-              </a:spcBef>
-              <a:defRPr sz="2772" b="1"/>
-            </a:pPr>
-            <a:r>
-              <a:rPr dirty="0"/>
-              <a:t>Eff</a:t>
-            </a:r>
-            <a:r>
-              <a:rPr b="0" dirty="0"/>
-              <a:t>: Robot in new room</a:t>
-            </a:r>
-          </a:p>
-          <a:p>
-            <a:pPr marL="0" indent="0" defTabSz="316278">
-              <a:lnSpc>
-                <a:spcPct val="50000"/>
-              </a:lnSpc>
-              <a:spcBef>
-                <a:spcPts val="1687"/>
-              </a:spcBef>
-              <a:buNone/>
-              <a:defRPr sz="2772" b="1"/>
-            </a:pPr>
-            <a:br>
-              <a:rPr b="0" dirty="0"/>
-            </a:br>
-            <a:br>
-              <a:rPr b="0" dirty="0"/>
-            </a:br>
-            <a:r>
-              <a:rPr dirty="0"/>
-              <a:t>(</a:t>
-            </a:r>
-            <a:r>
-              <a:rPr b="0" dirty="0">
-                <a:solidFill>
-                  <a:schemeClr val="accent4"/>
-                </a:solidFill>
-              </a:rPr>
-              <a:t>drop</a:t>
-            </a:r>
-            <a:r>
-              <a:rPr b="0" dirty="0">
-                <a:solidFill>
-                  <a:schemeClr val="accent6">
-                    <a:hueOff val="52948"/>
-                    <a:satOff val="5436"/>
-                    <a:lumOff val="-12041"/>
-                  </a:schemeClr>
-                </a:solidFill>
-              </a:rPr>
-              <a:t> </a:t>
-            </a:r>
-            <a:r>
-              <a:rPr b="0" dirty="0">
-                <a:solidFill>
-                  <a:schemeClr val="accent5"/>
-                </a:solidFill>
-              </a:rPr>
-              <a:t>?rob </a:t>
-            </a:r>
-            <a:r>
-              <a:rPr b="0" dirty="0">
-                <a:solidFill>
-                  <a:schemeClr val="accent6">
-                    <a:hueOff val="52948"/>
-                    <a:satOff val="5436"/>
-                    <a:lumOff val="-12041"/>
-                  </a:schemeClr>
-                </a:solidFill>
-              </a:rPr>
-              <a:t>- </a:t>
-            </a:r>
-            <a:r>
-              <a:rPr b="0" dirty="0">
-                <a:solidFill>
-                  <a:schemeClr val="accent3"/>
-                </a:solidFill>
-              </a:rPr>
-              <a:t>robot</a:t>
-            </a:r>
-            <a:r>
-              <a:rPr b="0" dirty="0">
-                <a:solidFill>
-                  <a:schemeClr val="accent6">
-                    <a:hueOff val="52948"/>
-                    <a:satOff val="5436"/>
-                    <a:lumOff val="-12041"/>
-                  </a:schemeClr>
-                </a:solidFill>
-              </a:rPr>
-              <a:t> </a:t>
-            </a:r>
-            <a:r>
-              <a:rPr b="0" dirty="0">
-                <a:solidFill>
-                  <a:schemeClr val="accent5"/>
-                </a:solidFill>
-              </a:rPr>
-              <a:t>?rm </a:t>
-            </a:r>
-            <a:r>
-              <a:rPr b="0" dirty="0">
-                <a:solidFill>
-                  <a:schemeClr val="accent6">
-                    <a:hueOff val="52948"/>
-                    <a:satOff val="5436"/>
-                    <a:lumOff val="-12041"/>
-                  </a:schemeClr>
-                </a:solidFill>
-              </a:rPr>
-              <a:t>- </a:t>
-            </a:r>
-            <a:r>
-              <a:rPr b="0" dirty="0">
-                <a:solidFill>
-                  <a:schemeClr val="accent3"/>
-                </a:solidFill>
-              </a:rPr>
-              <a:t>room</a:t>
-            </a:r>
-            <a:r>
-              <a:rPr b="0" dirty="0">
-                <a:solidFill>
-                  <a:schemeClr val="accent6">
-                    <a:hueOff val="52948"/>
-                    <a:satOff val="5436"/>
-                    <a:lumOff val="-12041"/>
-                  </a:schemeClr>
-                </a:solidFill>
-              </a:rPr>
-              <a:t> </a:t>
-            </a:r>
-            <a:r>
-              <a:rPr b="0" dirty="0">
-                <a:solidFill>
-                  <a:schemeClr val="accent5"/>
-                </a:solidFill>
-              </a:rPr>
-              <a:t>?c</a:t>
-            </a:r>
-            <a:r>
-              <a:rPr b="0" dirty="0">
-                <a:solidFill>
-                  <a:schemeClr val="accent6">
-                    <a:hueOff val="52948"/>
-                    <a:satOff val="5436"/>
-                    <a:lumOff val="-12041"/>
-                  </a:schemeClr>
-                </a:solidFill>
-              </a:rPr>
-              <a:t> - </a:t>
-            </a:r>
-            <a:r>
-              <a:rPr b="0" dirty="0">
-                <a:solidFill>
-                  <a:schemeClr val="accent3"/>
-                </a:solidFill>
-              </a:rPr>
-              <a:t>crate</a:t>
-            </a:r>
-            <a:r>
-              <a:rPr dirty="0"/>
-              <a:t>)</a:t>
-            </a:r>
-          </a:p>
-          <a:p>
-            <a:pPr marL="481292" lvl="1" indent="-240646" defTabSz="316278">
-              <a:lnSpc>
-                <a:spcPct val="50000"/>
-              </a:lnSpc>
-              <a:spcBef>
-                <a:spcPts val="1687"/>
-              </a:spcBef>
-              <a:defRPr sz="2772" b="1"/>
-            </a:pPr>
-            <a:r>
-              <a:rPr dirty="0"/>
-              <a:t>Pre:</a:t>
-            </a:r>
-            <a:r>
-              <a:rPr b="0" dirty="0"/>
-              <a:t> Robot in right room, and holding crate</a:t>
-            </a:r>
-          </a:p>
-          <a:p>
-            <a:pPr marL="481292" lvl="1" indent="-240646" defTabSz="316278">
-              <a:lnSpc>
-                <a:spcPct val="50000"/>
-              </a:lnSpc>
-              <a:spcBef>
-                <a:spcPts val="1687"/>
-              </a:spcBef>
-              <a:defRPr sz="2772" b="1"/>
-            </a:pPr>
-            <a:r>
-              <a:rPr dirty="0"/>
-              <a:t>Eff: </a:t>
-            </a:r>
-            <a:r>
-              <a:rPr b="0" dirty="0"/>
-              <a:t>Crate now in room, and hand is free</a:t>
-            </a:r>
-          </a:p>
-          <a:p>
-            <a:pPr marL="0" indent="0" defTabSz="316278">
-              <a:lnSpc>
-                <a:spcPct val="50000"/>
-              </a:lnSpc>
-              <a:spcBef>
-                <a:spcPts val="1687"/>
-              </a:spcBef>
-              <a:buNone/>
-              <a:defRPr sz="2772" b="1"/>
-            </a:pPr>
-            <a:br>
-              <a:rPr b="0" dirty="0"/>
-            </a:br>
-            <a:br>
-              <a:rPr b="0" dirty="0"/>
-            </a:br>
-            <a:r>
-              <a:rPr dirty="0"/>
-              <a:t>(</a:t>
-            </a:r>
-            <a:r>
-              <a:rPr b="0" dirty="0">
-                <a:solidFill>
-                  <a:schemeClr val="accent4"/>
-                </a:solidFill>
-              </a:rPr>
-              <a:t>pickup</a:t>
-            </a:r>
-            <a:r>
-              <a:rPr b="0" dirty="0">
-                <a:solidFill>
-                  <a:schemeClr val="accent6">
-                    <a:hueOff val="52948"/>
-                    <a:satOff val="5436"/>
-                    <a:lumOff val="-12041"/>
-                  </a:schemeClr>
-                </a:solidFill>
-              </a:rPr>
-              <a:t> </a:t>
-            </a:r>
-            <a:r>
-              <a:rPr b="0" dirty="0">
-                <a:solidFill>
-                  <a:schemeClr val="accent5"/>
-                </a:solidFill>
-              </a:rPr>
-              <a:t>?rob </a:t>
-            </a:r>
-            <a:r>
-              <a:rPr b="0" dirty="0">
-                <a:solidFill>
-                  <a:schemeClr val="accent6">
-                    <a:hueOff val="52948"/>
-                    <a:satOff val="5436"/>
-                    <a:lumOff val="-12041"/>
-                  </a:schemeClr>
-                </a:solidFill>
-              </a:rPr>
-              <a:t>- </a:t>
-            </a:r>
-            <a:r>
-              <a:rPr b="0" dirty="0">
-                <a:solidFill>
-                  <a:schemeClr val="accent3"/>
-                </a:solidFill>
-              </a:rPr>
-              <a:t>robot</a:t>
-            </a:r>
-            <a:r>
-              <a:rPr b="0" dirty="0">
-                <a:solidFill>
-                  <a:schemeClr val="accent6">
-                    <a:hueOff val="52948"/>
-                    <a:satOff val="5436"/>
-                    <a:lumOff val="-12041"/>
-                  </a:schemeClr>
-                </a:solidFill>
-              </a:rPr>
-              <a:t> </a:t>
-            </a:r>
-            <a:r>
-              <a:rPr b="0" dirty="0">
-                <a:solidFill>
-                  <a:schemeClr val="accent5"/>
-                </a:solidFill>
-              </a:rPr>
-              <a:t>?rm </a:t>
-            </a:r>
-            <a:r>
-              <a:rPr b="0" dirty="0">
-                <a:solidFill>
-                  <a:schemeClr val="accent6">
-                    <a:hueOff val="52948"/>
-                    <a:satOff val="5436"/>
-                    <a:lumOff val="-12041"/>
-                  </a:schemeClr>
-                </a:solidFill>
-              </a:rPr>
-              <a:t>- </a:t>
-            </a:r>
-            <a:r>
-              <a:rPr b="0" dirty="0">
-                <a:solidFill>
-                  <a:schemeClr val="accent3"/>
-                </a:solidFill>
-              </a:rPr>
-              <a:t>room</a:t>
-            </a:r>
-            <a:r>
-              <a:rPr b="0" dirty="0">
-                <a:solidFill>
-                  <a:schemeClr val="accent6">
-                    <a:hueOff val="52948"/>
-                    <a:satOff val="5436"/>
-                    <a:lumOff val="-12041"/>
-                  </a:schemeClr>
-                </a:solidFill>
-              </a:rPr>
-              <a:t> </a:t>
-            </a:r>
-            <a:r>
-              <a:rPr b="0" dirty="0">
-                <a:solidFill>
-                  <a:schemeClr val="accent5"/>
-                </a:solidFill>
-              </a:rPr>
-              <a:t>?c</a:t>
-            </a:r>
-            <a:r>
-              <a:rPr b="0" dirty="0">
-                <a:solidFill>
-                  <a:schemeClr val="accent6">
-                    <a:hueOff val="52948"/>
-                    <a:satOff val="5436"/>
-                    <a:lumOff val="-12041"/>
-                  </a:schemeClr>
-                </a:solidFill>
-              </a:rPr>
-              <a:t> - </a:t>
-            </a:r>
-            <a:r>
-              <a:rPr b="0" dirty="0">
-                <a:solidFill>
-                  <a:schemeClr val="accent3"/>
-                </a:solidFill>
-              </a:rPr>
-              <a:t>crate</a:t>
-            </a:r>
-            <a:r>
-              <a:rPr dirty="0"/>
-              <a:t>)</a:t>
-            </a:r>
-          </a:p>
-          <a:p>
-            <a:pPr marL="481292" lvl="1" indent="-240646" defTabSz="316278">
-              <a:lnSpc>
-                <a:spcPct val="50000"/>
-              </a:lnSpc>
-              <a:spcBef>
-                <a:spcPts val="1687"/>
-              </a:spcBef>
-              <a:defRPr sz="2772" b="1"/>
-            </a:pPr>
-            <a:r>
-              <a:rPr dirty="0"/>
-              <a:t>Pre:</a:t>
-            </a:r>
-            <a:r>
-              <a:rPr b="0" dirty="0"/>
-              <a:t> Robot in right room, and hand is free</a:t>
-            </a:r>
-          </a:p>
-          <a:p>
-            <a:pPr marL="481292" lvl="1" indent="-240646" defTabSz="316278">
-              <a:lnSpc>
-                <a:spcPct val="50000"/>
-              </a:lnSpc>
-              <a:spcBef>
-                <a:spcPts val="1687"/>
-              </a:spcBef>
-              <a:defRPr sz="2772" b="1"/>
-            </a:pPr>
-            <a:r>
-              <a:rPr dirty="0"/>
-              <a:t>Eff: </a:t>
-            </a:r>
-            <a:r>
-              <a:rPr b="0" dirty="0"/>
-              <a:t>Crate now being held</a:t>
-            </a:r>
-          </a:p>
-        </p:txBody>
-      </p:sp>
-    </p:spTree>
-  </p:cSld>
-  <p:clrMapOvr>
-    <a:masterClrMapping/>
-  </p:clrMapOvr>
-  <p:transition spd="med"/>
 </p:sld>
 </file>
 

</xml_diff>

<commit_message>
Added the rest of the slides and starter pddl.
</commit_message>
<xml_diff>
--- a/exercises/cisc-813/adl/slides.pptx
+++ b/exercises/cisc-813/adl/slides.pptx
@@ -12,7 +12,18 @@
     <p:sldId id="261" r:id="rId6"/>
     <p:sldId id="1691" r:id="rId7"/>
     <p:sldId id="1693" r:id="rId8"/>
-    <p:sldId id="1684" r:id="rId9"/>
+    <p:sldId id="1699" r:id="rId9"/>
+    <p:sldId id="1694" r:id="rId10"/>
+    <p:sldId id="1700" r:id="rId11"/>
+    <p:sldId id="1695" r:id="rId12"/>
+    <p:sldId id="1701" r:id="rId13"/>
+    <p:sldId id="1696" r:id="rId14"/>
+    <p:sldId id="1702" r:id="rId15"/>
+    <p:sldId id="1697" r:id="rId16"/>
+    <p:sldId id="1703" r:id="rId17"/>
+    <p:sldId id="1698" r:id="rId18"/>
+    <p:sldId id="1704" r:id="rId19"/>
+    <p:sldId id="1684" r:id="rId20"/>
   </p:sldIdLst>
   <p:sldSz cx="12192000" cy="6858000"/>
   <p:notesSz cx="6858000" cy="9144000"/>
@@ -9166,6 +9177,894 @@
 </p:sld>
 </file>
 
+<file path=ppt/slides/slide10.xml><?xml version="1.0" encoding="utf-8"?>
+<p:sld xmlns:a="http://schemas.openxmlformats.org/drawingml/2006/main" xmlns:r="http://schemas.openxmlformats.org/officeDocument/2006/relationships" xmlns:p="http://schemas.openxmlformats.org/presentationml/2006/main" showMasterSp="0">
+  <p:cSld>
+    <p:spTree>
+      <p:nvGrpSpPr>
+        <p:cNvPr id="1" name=""/>
+        <p:cNvGrpSpPr/>
+        <p:nvPr/>
+      </p:nvGrpSpPr>
+      <p:grpSpPr>
+        <a:xfrm>
+          <a:off x="0" y="0"/>
+          <a:ext cx="0" cy="0"/>
+          <a:chOff x="0" y="0"/>
+          <a:chExt cx="0" cy="0"/>
+        </a:xfrm>
+      </p:grpSpPr>
+      <p:sp>
+        <p:nvSpPr>
+          <p:cNvPr id="5" name="Content Placeholder 4">
+            <a:extLst>
+              <a:ext uri="{FF2B5EF4-FFF2-40B4-BE49-F238E27FC236}">
+                <a16:creationId xmlns:a16="http://schemas.microsoft.com/office/drawing/2014/main" id="{916B2140-6178-6477-FAC2-4FC081B9C2C5}"/>
+              </a:ext>
+            </a:extLst>
+          </p:cNvPr>
+          <p:cNvSpPr>
+            <a:spLocks noGrp="1"/>
+          </p:cNvSpPr>
+          <p:nvPr>
+            <p:ph idx="1"/>
+          </p:nvPr>
+        </p:nvSpPr>
+        <p:spPr/>
+        <p:txBody>
+          <a:bodyPr/>
+          <a:lstStyle/>
+          <a:p>
+            <a:pPr marL="0" indent="0">
+              <a:buNone/>
+            </a:pPr>
+            <a:endParaRPr lang="en-CA" dirty="0"/>
+          </a:p>
+          <a:p>
+            <a:endParaRPr lang="en-CA" dirty="0"/>
+          </a:p>
+          <a:p>
+            <a:endParaRPr lang="en-CA" dirty="0"/>
+          </a:p>
+          <a:p>
+            <a:pPr marL="0" indent="0" algn="ctr">
+              <a:buNone/>
+            </a:pPr>
+            <a:r>
+              <a:rPr lang="en-CA" sz="2800" dirty="0"/>
+              <a:t>http://editor.planning.domains/planning-course/adl/moved-mv</a:t>
+            </a:r>
+          </a:p>
+        </p:txBody>
+      </p:sp>
+    </p:spTree>
+    <p:extLst>
+      <p:ext uri="{BB962C8B-B14F-4D97-AF65-F5344CB8AC3E}">
+        <p14:creationId xmlns:p14="http://schemas.microsoft.com/office/powerpoint/2010/main" val="4031490244"/>
+      </p:ext>
+    </p:extLst>
+  </p:cSld>
+  <p:clrMapOvr>
+    <a:masterClrMapping/>
+  </p:clrMapOvr>
+  <mc:AlternateContent xmlns:mc="http://schemas.openxmlformats.org/markup-compatibility/2006">
+    <mc:Choice xmlns:p14="http://schemas.microsoft.com/office/powerpoint/2010/main" Requires="p14">
+      <p:transition spd="med" p14:dur="700">
+        <p:fade/>
+      </p:transition>
+    </mc:Choice>
+    <mc:Fallback>
+      <p:transition spd="med">
+        <p:fade/>
+      </p:transition>
+    </mc:Fallback>
+  </mc:AlternateContent>
+</p:sld>
+</file>
+
+<file path=ppt/slides/slide11.xml><?xml version="1.0" encoding="utf-8"?>
+<p:sld xmlns:a="http://schemas.openxmlformats.org/drawingml/2006/main" xmlns:r="http://schemas.openxmlformats.org/officeDocument/2006/relationships" xmlns:p="http://schemas.openxmlformats.org/presentationml/2006/main" showMasterSp="0">
+  <p:cSld>
+    <p:spTree>
+      <p:nvGrpSpPr>
+        <p:cNvPr id="1" name=""/>
+        <p:cNvGrpSpPr/>
+        <p:nvPr/>
+      </p:nvGrpSpPr>
+      <p:grpSpPr>
+        <a:xfrm>
+          <a:off x="0" y="0"/>
+          <a:ext cx="0" cy="0"/>
+          <a:chOff x="0" y="0"/>
+          <a:chExt cx="0" cy="0"/>
+        </a:xfrm>
+      </p:grpSpPr>
+      <p:sp>
+        <p:nvSpPr>
+          <p:cNvPr id="4" name="Title 3">
+            <a:extLst>
+              <a:ext uri="{FF2B5EF4-FFF2-40B4-BE49-F238E27FC236}">
+                <a16:creationId xmlns:a16="http://schemas.microsoft.com/office/drawing/2014/main" id="{80EAC0C6-7B8A-1444-CF6E-AFD7613F9128}"/>
+              </a:ext>
+            </a:extLst>
+          </p:cNvPr>
+          <p:cNvSpPr>
+            <a:spLocks noGrp="1"/>
+          </p:cNvSpPr>
+          <p:nvPr>
+            <p:ph type="title"/>
+          </p:nvPr>
+        </p:nvSpPr>
+        <p:spPr/>
+        <p:txBody>
+          <a:bodyPr/>
+          <a:lstStyle/>
+          <a:p>
+            <a:r>
+              <a:rPr lang="en-CA" dirty="0"/>
+              <a:t>2. </a:t>
+            </a:r>
+            <a:r>
+              <a:rPr lang="en-US" dirty="0"/>
+              <a:t>Getting everyone to their destination</a:t>
+            </a:r>
+            <a:endParaRPr lang="en-CA" dirty="0"/>
+          </a:p>
+        </p:txBody>
+      </p:sp>
+      <p:sp>
+        <p:nvSpPr>
+          <p:cNvPr id="5" name="Content Placeholder 4">
+            <a:extLst>
+              <a:ext uri="{FF2B5EF4-FFF2-40B4-BE49-F238E27FC236}">
+                <a16:creationId xmlns:a16="http://schemas.microsoft.com/office/drawing/2014/main" id="{916B2140-6178-6477-FAC2-4FC081B9C2C5}"/>
+              </a:ext>
+            </a:extLst>
+          </p:cNvPr>
+          <p:cNvSpPr>
+            <a:spLocks noGrp="1"/>
+          </p:cNvSpPr>
+          <p:nvPr>
+            <p:ph idx="1"/>
+          </p:nvPr>
+        </p:nvSpPr>
+        <p:spPr/>
+        <p:txBody>
+          <a:bodyPr/>
+          <a:lstStyle/>
+          <a:p>
+            <a:r>
+              <a:rPr lang="en-CA" dirty="0"/>
+              <a:t>Load and drive passengers and get them all there</a:t>
+            </a:r>
+          </a:p>
+          <a:p>
+            <a:endParaRPr lang="en-CA" dirty="0"/>
+          </a:p>
+          <a:p>
+            <a:endParaRPr lang="en-CA" dirty="0"/>
+          </a:p>
+          <a:p>
+            <a:pPr marL="0" indent="0" algn="ctr">
+              <a:buNone/>
+            </a:pPr>
+            <a:r>
+              <a:rPr lang="en-CA" sz="2800" dirty="0"/>
+              <a:t>http://editor.planning.domains/planning-course/adl/passengers</a:t>
+            </a:r>
+          </a:p>
+          <a:p>
+            <a:pPr marL="0" indent="0">
+              <a:buNone/>
+            </a:pPr>
+            <a:endParaRPr lang="en-CA" dirty="0"/>
+          </a:p>
+        </p:txBody>
+      </p:sp>
+    </p:spTree>
+    <p:extLst>
+      <p:ext uri="{BB962C8B-B14F-4D97-AF65-F5344CB8AC3E}">
+        <p14:creationId xmlns:p14="http://schemas.microsoft.com/office/powerpoint/2010/main" val="1445019752"/>
+      </p:ext>
+    </p:extLst>
+  </p:cSld>
+  <p:clrMapOvr>
+    <a:masterClrMapping/>
+  </p:clrMapOvr>
+</p:sld>
+</file>
+
+<file path=ppt/slides/slide12.xml><?xml version="1.0" encoding="utf-8"?>
+<p:sld xmlns:a="http://schemas.openxmlformats.org/drawingml/2006/main" xmlns:r="http://schemas.openxmlformats.org/officeDocument/2006/relationships" xmlns:p="http://schemas.openxmlformats.org/presentationml/2006/main" showMasterSp="0">
+  <p:cSld>
+    <p:spTree>
+      <p:nvGrpSpPr>
+        <p:cNvPr id="1" name=""/>
+        <p:cNvGrpSpPr/>
+        <p:nvPr/>
+      </p:nvGrpSpPr>
+      <p:grpSpPr>
+        <a:xfrm>
+          <a:off x="0" y="0"/>
+          <a:ext cx="0" cy="0"/>
+          <a:chOff x="0" y="0"/>
+          <a:chExt cx="0" cy="0"/>
+        </a:xfrm>
+      </p:grpSpPr>
+      <p:sp>
+        <p:nvSpPr>
+          <p:cNvPr id="5" name="Content Placeholder 4">
+            <a:extLst>
+              <a:ext uri="{FF2B5EF4-FFF2-40B4-BE49-F238E27FC236}">
+                <a16:creationId xmlns:a16="http://schemas.microsoft.com/office/drawing/2014/main" id="{916B2140-6178-6477-FAC2-4FC081B9C2C5}"/>
+              </a:ext>
+            </a:extLst>
+          </p:cNvPr>
+          <p:cNvSpPr>
+            <a:spLocks noGrp="1"/>
+          </p:cNvSpPr>
+          <p:nvPr>
+            <p:ph idx="1"/>
+          </p:nvPr>
+        </p:nvSpPr>
+        <p:spPr/>
+        <p:txBody>
+          <a:bodyPr/>
+          <a:lstStyle/>
+          <a:p>
+            <a:pPr marL="0" indent="0">
+              <a:buNone/>
+            </a:pPr>
+            <a:endParaRPr lang="en-CA" dirty="0"/>
+          </a:p>
+          <a:p>
+            <a:endParaRPr lang="en-CA" dirty="0"/>
+          </a:p>
+          <a:p>
+            <a:endParaRPr lang="en-CA" dirty="0"/>
+          </a:p>
+          <a:p>
+            <a:pPr marL="0" indent="0" algn="ctr">
+              <a:buNone/>
+            </a:pPr>
+            <a:r>
+              <a:rPr lang="en-CA" sz="2800" dirty="0"/>
+              <a:t>http://editor.planning.domains/planning-course/adl/passenged</a:t>
+            </a:r>
+          </a:p>
+        </p:txBody>
+      </p:sp>
+    </p:spTree>
+    <p:extLst>
+      <p:ext uri="{BB962C8B-B14F-4D97-AF65-F5344CB8AC3E}">
+        <p14:creationId xmlns:p14="http://schemas.microsoft.com/office/powerpoint/2010/main" val="3108447499"/>
+      </p:ext>
+    </p:extLst>
+  </p:cSld>
+  <p:clrMapOvr>
+    <a:masterClrMapping/>
+  </p:clrMapOvr>
+  <mc:AlternateContent xmlns:mc="http://schemas.openxmlformats.org/markup-compatibility/2006">
+    <mc:Choice xmlns:p14="http://schemas.microsoft.com/office/powerpoint/2010/main" Requires="p14">
+      <p:transition spd="med" p14:dur="700">
+        <p:fade/>
+      </p:transition>
+    </mc:Choice>
+    <mc:Fallback>
+      <p:transition spd="med">
+        <p:fade/>
+      </p:transition>
+    </mc:Fallback>
+  </mc:AlternateContent>
+</p:sld>
+</file>
+
+<file path=ppt/slides/slide13.xml><?xml version="1.0" encoding="utf-8"?>
+<p:sld xmlns:a="http://schemas.openxmlformats.org/drawingml/2006/main" xmlns:r="http://schemas.openxmlformats.org/officeDocument/2006/relationships" xmlns:p="http://schemas.openxmlformats.org/presentationml/2006/main" showMasterSp="0">
+  <p:cSld>
+    <p:spTree>
+      <p:nvGrpSpPr>
+        <p:cNvPr id="1" name=""/>
+        <p:cNvGrpSpPr/>
+        <p:nvPr/>
+      </p:nvGrpSpPr>
+      <p:grpSpPr>
+        <a:xfrm>
+          <a:off x="0" y="0"/>
+          <a:ext cx="0" cy="0"/>
+          <a:chOff x="0" y="0"/>
+          <a:chExt cx="0" cy="0"/>
+        </a:xfrm>
+      </p:grpSpPr>
+      <p:sp>
+        <p:nvSpPr>
+          <p:cNvPr id="4" name="Title 3">
+            <a:extLst>
+              <a:ext uri="{FF2B5EF4-FFF2-40B4-BE49-F238E27FC236}">
+                <a16:creationId xmlns:a16="http://schemas.microsoft.com/office/drawing/2014/main" id="{80EAC0C6-7B8A-1444-CF6E-AFD7613F9128}"/>
+              </a:ext>
+            </a:extLst>
+          </p:cNvPr>
+          <p:cNvSpPr>
+            <a:spLocks noGrp="1"/>
+          </p:cNvSpPr>
+          <p:nvPr>
+            <p:ph type="title"/>
+          </p:nvPr>
+        </p:nvSpPr>
+        <p:spPr/>
+        <p:txBody>
+          <a:bodyPr/>
+          <a:lstStyle/>
+          <a:p>
+            <a:r>
+              <a:rPr lang="en-CA" dirty="0"/>
+              <a:t>3. </a:t>
+            </a:r>
+            <a:r>
+              <a:rPr lang="en-US" dirty="0"/>
+              <a:t>Moving an autonomous car around</a:t>
+            </a:r>
+            <a:endParaRPr lang="en-CA" dirty="0"/>
+          </a:p>
+        </p:txBody>
+      </p:sp>
+      <p:sp>
+        <p:nvSpPr>
+          <p:cNvPr id="5" name="Content Placeholder 4">
+            <a:extLst>
+              <a:ext uri="{FF2B5EF4-FFF2-40B4-BE49-F238E27FC236}">
+                <a16:creationId xmlns:a16="http://schemas.microsoft.com/office/drawing/2014/main" id="{916B2140-6178-6477-FAC2-4FC081B9C2C5}"/>
+              </a:ext>
+            </a:extLst>
+          </p:cNvPr>
+          <p:cNvSpPr>
+            <a:spLocks noGrp="1"/>
+          </p:cNvSpPr>
+          <p:nvPr>
+            <p:ph idx="1"/>
+          </p:nvPr>
+        </p:nvSpPr>
+        <p:spPr/>
+        <p:txBody>
+          <a:bodyPr/>
+          <a:lstStyle/>
+          <a:p>
+            <a:r>
+              <a:rPr lang="en-CA" dirty="0"/>
+              <a:t>Put the shuttles on the circuit!</a:t>
+            </a:r>
+          </a:p>
+          <a:p>
+            <a:endParaRPr lang="en-CA" dirty="0"/>
+          </a:p>
+          <a:p>
+            <a:endParaRPr lang="en-CA" dirty="0"/>
+          </a:p>
+          <a:p>
+            <a:pPr marL="0" indent="0" algn="ctr">
+              <a:buNone/>
+            </a:pPr>
+            <a:r>
+              <a:rPr lang="en-CA" sz="2800" dirty="0"/>
+              <a:t>http://editor.planning.domains/planning-course/adl/circuit</a:t>
+            </a:r>
+            <a:endParaRPr lang="en-CA" dirty="0"/>
+          </a:p>
+        </p:txBody>
+      </p:sp>
+    </p:spTree>
+    <p:extLst>
+      <p:ext uri="{BB962C8B-B14F-4D97-AF65-F5344CB8AC3E}">
+        <p14:creationId xmlns:p14="http://schemas.microsoft.com/office/powerpoint/2010/main" val="2049898440"/>
+      </p:ext>
+    </p:extLst>
+  </p:cSld>
+  <p:clrMapOvr>
+    <a:masterClrMapping/>
+  </p:clrMapOvr>
+</p:sld>
+</file>
+
+<file path=ppt/slides/slide14.xml><?xml version="1.0" encoding="utf-8"?>
+<p:sld xmlns:a="http://schemas.openxmlformats.org/drawingml/2006/main" xmlns:r="http://schemas.openxmlformats.org/officeDocument/2006/relationships" xmlns:p="http://schemas.openxmlformats.org/presentationml/2006/main" showMasterSp="0">
+  <p:cSld>
+    <p:spTree>
+      <p:nvGrpSpPr>
+        <p:cNvPr id="1" name=""/>
+        <p:cNvGrpSpPr/>
+        <p:nvPr/>
+      </p:nvGrpSpPr>
+      <p:grpSpPr>
+        <a:xfrm>
+          <a:off x="0" y="0"/>
+          <a:ext cx="0" cy="0"/>
+          <a:chOff x="0" y="0"/>
+          <a:chExt cx="0" cy="0"/>
+        </a:xfrm>
+      </p:grpSpPr>
+      <p:sp>
+        <p:nvSpPr>
+          <p:cNvPr id="5" name="Content Placeholder 4">
+            <a:extLst>
+              <a:ext uri="{FF2B5EF4-FFF2-40B4-BE49-F238E27FC236}">
+                <a16:creationId xmlns:a16="http://schemas.microsoft.com/office/drawing/2014/main" id="{916B2140-6178-6477-FAC2-4FC081B9C2C5}"/>
+              </a:ext>
+            </a:extLst>
+          </p:cNvPr>
+          <p:cNvSpPr>
+            <a:spLocks noGrp="1"/>
+          </p:cNvSpPr>
+          <p:nvPr>
+            <p:ph idx="1"/>
+          </p:nvPr>
+        </p:nvSpPr>
+        <p:spPr/>
+        <p:txBody>
+          <a:bodyPr/>
+          <a:lstStyle/>
+          <a:p>
+            <a:pPr marL="0" indent="0">
+              <a:buNone/>
+            </a:pPr>
+            <a:endParaRPr lang="en-CA" dirty="0"/>
+          </a:p>
+          <a:p>
+            <a:endParaRPr lang="en-CA" dirty="0"/>
+          </a:p>
+          <a:p>
+            <a:endParaRPr lang="en-CA" dirty="0"/>
+          </a:p>
+          <a:p>
+            <a:pPr marL="0" indent="0" algn="ctr">
+              <a:buNone/>
+            </a:pPr>
+            <a:r>
+              <a:rPr lang="en-CA" sz="2800" dirty="0"/>
+              <a:t>http://editor.planning.domains/planning-course/adl/circed</a:t>
+            </a:r>
+          </a:p>
+        </p:txBody>
+      </p:sp>
+    </p:spTree>
+    <p:extLst>
+      <p:ext uri="{BB962C8B-B14F-4D97-AF65-F5344CB8AC3E}">
+        <p14:creationId xmlns:p14="http://schemas.microsoft.com/office/powerpoint/2010/main" val="2437479166"/>
+      </p:ext>
+    </p:extLst>
+  </p:cSld>
+  <p:clrMapOvr>
+    <a:masterClrMapping/>
+  </p:clrMapOvr>
+  <mc:AlternateContent xmlns:mc="http://schemas.openxmlformats.org/markup-compatibility/2006">
+    <mc:Choice xmlns:p14="http://schemas.microsoft.com/office/powerpoint/2010/main" Requires="p14">
+      <p:transition spd="med" p14:dur="700">
+        <p:fade/>
+      </p:transition>
+    </mc:Choice>
+    <mc:Fallback>
+      <p:transition spd="med">
+        <p:fade/>
+      </p:transition>
+    </mc:Fallback>
+  </mc:AlternateContent>
+</p:sld>
+</file>
+
+<file path=ppt/slides/slide15.xml><?xml version="1.0" encoding="utf-8"?>
+<p:sld xmlns:a="http://schemas.openxmlformats.org/drawingml/2006/main" xmlns:r="http://schemas.openxmlformats.org/officeDocument/2006/relationships" xmlns:p="http://schemas.openxmlformats.org/presentationml/2006/main" showMasterSp="0">
+  <p:cSld>
+    <p:spTree>
+      <p:nvGrpSpPr>
+        <p:cNvPr id="1" name=""/>
+        <p:cNvGrpSpPr/>
+        <p:nvPr/>
+      </p:nvGrpSpPr>
+      <p:grpSpPr>
+        <a:xfrm>
+          <a:off x="0" y="0"/>
+          <a:ext cx="0" cy="0"/>
+          <a:chOff x="0" y="0"/>
+          <a:chExt cx="0" cy="0"/>
+        </a:xfrm>
+      </p:grpSpPr>
+      <p:sp>
+        <p:nvSpPr>
+          <p:cNvPr id="4" name="Title 3">
+            <a:extLst>
+              <a:ext uri="{FF2B5EF4-FFF2-40B4-BE49-F238E27FC236}">
+                <a16:creationId xmlns:a16="http://schemas.microsoft.com/office/drawing/2014/main" id="{80EAC0C6-7B8A-1444-CF6E-AFD7613F9128}"/>
+              </a:ext>
+            </a:extLst>
+          </p:cNvPr>
+          <p:cNvSpPr>
+            <a:spLocks noGrp="1"/>
+          </p:cNvSpPr>
+          <p:nvPr>
+            <p:ph type="title"/>
+          </p:nvPr>
+        </p:nvSpPr>
+        <p:spPr/>
+        <p:txBody>
+          <a:bodyPr/>
+          <a:lstStyle/>
+          <a:p>
+            <a:r>
+              <a:rPr lang="en-CA" dirty="0"/>
+              <a:t>4. </a:t>
+            </a:r>
+            <a:r>
+              <a:rPr lang="en-US" dirty="0"/>
+              <a:t>Picking up / dropping off passengers</a:t>
+            </a:r>
+            <a:endParaRPr lang="en-CA" dirty="0"/>
+          </a:p>
+        </p:txBody>
+      </p:sp>
+      <p:sp>
+        <p:nvSpPr>
+          <p:cNvPr id="5" name="Content Placeholder 4">
+            <a:extLst>
+              <a:ext uri="{FF2B5EF4-FFF2-40B4-BE49-F238E27FC236}">
+                <a16:creationId xmlns:a16="http://schemas.microsoft.com/office/drawing/2014/main" id="{916B2140-6178-6477-FAC2-4FC081B9C2C5}"/>
+              </a:ext>
+            </a:extLst>
+          </p:cNvPr>
+          <p:cNvSpPr>
+            <a:spLocks noGrp="1"/>
+          </p:cNvSpPr>
+          <p:nvPr>
+            <p:ph idx="1"/>
+          </p:nvPr>
+        </p:nvSpPr>
+        <p:spPr/>
+        <p:txBody>
+          <a:bodyPr/>
+          <a:lstStyle/>
+          <a:p>
+            <a:r>
+              <a:rPr lang="en-CA" dirty="0"/>
+              <a:t>Everyone aboard! Either that, or get outa here…</a:t>
+            </a:r>
+          </a:p>
+          <a:p>
+            <a:endParaRPr lang="en-CA" dirty="0"/>
+          </a:p>
+          <a:p>
+            <a:endParaRPr lang="en-CA" dirty="0"/>
+          </a:p>
+          <a:p>
+            <a:pPr marL="0" indent="0" algn="ctr">
+              <a:buNone/>
+            </a:pPr>
+            <a:r>
+              <a:rPr lang="en-CA" sz="2800" dirty="0"/>
+              <a:t>http://editor.planning.domains/planning-course/adl/all-aboard</a:t>
+            </a:r>
+            <a:endParaRPr lang="en-CA" dirty="0"/>
+          </a:p>
+        </p:txBody>
+      </p:sp>
+    </p:spTree>
+    <p:extLst>
+      <p:ext uri="{BB962C8B-B14F-4D97-AF65-F5344CB8AC3E}">
+        <p14:creationId xmlns:p14="http://schemas.microsoft.com/office/powerpoint/2010/main" val="2967719754"/>
+      </p:ext>
+    </p:extLst>
+  </p:cSld>
+  <p:clrMapOvr>
+    <a:masterClrMapping/>
+  </p:clrMapOvr>
+</p:sld>
+</file>
+
+<file path=ppt/slides/slide16.xml><?xml version="1.0" encoding="utf-8"?>
+<p:sld xmlns:a="http://schemas.openxmlformats.org/drawingml/2006/main" xmlns:r="http://schemas.openxmlformats.org/officeDocument/2006/relationships" xmlns:p="http://schemas.openxmlformats.org/presentationml/2006/main" showMasterSp="0">
+  <p:cSld>
+    <p:spTree>
+      <p:nvGrpSpPr>
+        <p:cNvPr id="1" name=""/>
+        <p:cNvGrpSpPr/>
+        <p:nvPr/>
+      </p:nvGrpSpPr>
+      <p:grpSpPr>
+        <a:xfrm>
+          <a:off x="0" y="0"/>
+          <a:ext cx="0" cy="0"/>
+          <a:chOff x="0" y="0"/>
+          <a:chExt cx="0" cy="0"/>
+        </a:xfrm>
+      </p:grpSpPr>
+      <p:sp>
+        <p:nvSpPr>
+          <p:cNvPr id="5" name="Content Placeholder 4">
+            <a:extLst>
+              <a:ext uri="{FF2B5EF4-FFF2-40B4-BE49-F238E27FC236}">
+                <a16:creationId xmlns:a16="http://schemas.microsoft.com/office/drawing/2014/main" id="{916B2140-6178-6477-FAC2-4FC081B9C2C5}"/>
+              </a:ext>
+            </a:extLst>
+          </p:cNvPr>
+          <p:cNvSpPr>
+            <a:spLocks noGrp="1"/>
+          </p:cNvSpPr>
+          <p:nvPr>
+            <p:ph idx="1"/>
+          </p:nvPr>
+        </p:nvSpPr>
+        <p:spPr/>
+        <p:txBody>
+          <a:bodyPr/>
+          <a:lstStyle/>
+          <a:p>
+            <a:pPr marL="0" indent="0">
+              <a:buNone/>
+            </a:pPr>
+            <a:endParaRPr lang="en-CA" dirty="0"/>
+          </a:p>
+          <a:p>
+            <a:endParaRPr lang="en-CA" dirty="0"/>
+          </a:p>
+          <a:p>
+            <a:endParaRPr lang="en-CA" dirty="0"/>
+          </a:p>
+          <a:p>
+            <a:pPr marL="0" indent="0" algn="ctr">
+              <a:buNone/>
+            </a:pPr>
+            <a:r>
+              <a:rPr lang="en-CA" sz="2800" dirty="0"/>
+              <a:t>http://editor.planning.domains/planning-course/adl/boarded</a:t>
+            </a:r>
+          </a:p>
+        </p:txBody>
+      </p:sp>
+    </p:spTree>
+    <p:extLst>
+      <p:ext uri="{BB962C8B-B14F-4D97-AF65-F5344CB8AC3E}">
+        <p14:creationId xmlns:p14="http://schemas.microsoft.com/office/powerpoint/2010/main" val="646542654"/>
+      </p:ext>
+    </p:extLst>
+  </p:cSld>
+  <p:clrMapOvr>
+    <a:masterClrMapping/>
+  </p:clrMapOvr>
+  <mc:AlternateContent xmlns:mc="http://schemas.openxmlformats.org/markup-compatibility/2006">
+    <mc:Choice xmlns:p14="http://schemas.microsoft.com/office/powerpoint/2010/main" Requires="p14">
+      <p:transition spd="med" p14:dur="700">
+        <p:fade/>
+      </p:transition>
+    </mc:Choice>
+    <mc:Fallback>
+      <p:transition spd="med">
+        <p:fade/>
+      </p:transition>
+    </mc:Fallback>
+  </mc:AlternateContent>
+</p:sld>
+</file>
+
+<file path=ppt/slides/slide17.xml><?xml version="1.0" encoding="utf-8"?>
+<p:sld xmlns:a="http://schemas.openxmlformats.org/drawingml/2006/main" xmlns:r="http://schemas.openxmlformats.org/officeDocument/2006/relationships" xmlns:p="http://schemas.openxmlformats.org/presentationml/2006/main" showMasterSp="0">
+  <p:cSld>
+    <p:spTree>
+      <p:nvGrpSpPr>
+        <p:cNvPr id="1" name=""/>
+        <p:cNvGrpSpPr/>
+        <p:nvPr/>
+      </p:nvGrpSpPr>
+      <p:grpSpPr>
+        <a:xfrm>
+          <a:off x="0" y="0"/>
+          <a:ext cx="0" cy="0"/>
+          <a:chOff x="0" y="0"/>
+          <a:chExt cx="0" cy="0"/>
+        </a:xfrm>
+      </p:grpSpPr>
+      <p:sp>
+        <p:nvSpPr>
+          <p:cNvPr id="4" name="Title 3">
+            <a:extLst>
+              <a:ext uri="{FF2B5EF4-FFF2-40B4-BE49-F238E27FC236}">
+                <a16:creationId xmlns:a16="http://schemas.microsoft.com/office/drawing/2014/main" id="{80EAC0C6-7B8A-1444-CF6E-AFD7613F9128}"/>
+              </a:ext>
+            </a:extLst>
+          </p:cNvPr>
+          <p:cNvSpPr>
+            <a:spLocks noGrp="1"/>
+          </p:cNvSpPr>
+          <p:nvPr>
+            <p:ph type="title"/>
+          </p:nvPr>
+        </p:nvSpPr>
+        <p:spPr/>
+        <p:txBody>
+          <a:bodyPr/>
+          <a:lstStyle/>
+          <a:p>
+            <a:r>
+              <a:rPr lang="en-CA" dirty="0"/>
+              <a:t>5. </a:t>
+            </a:r>
+            <a:r>
+              <a:rPr lang="en-US" dirty="0"/>
+              <a:t>Safe manual moves</a:t>
+            </a:r>
+            <a:endParaRPr lang="en-CA" dirty="0"/>
+          </a:p>
+        </p:txBody>
+      </p:sp>
+      <p:sp>
+        <p:nvSpPr>
+          <p:cNvPr id="5" name="Content Placeholder 4">
+            <a:extLst>
+              <a:ext uri="{FF2B5EF4-FFF2-40B4-BE49-F238E27FC236}">
+                <a16:creationId xmlns:a16="http://schemas.microsoft.com/office/drawing/2014/main" id="{916B2140-6178-6477-FAC2-4FC081B9C2C5}"/>
+              </a:ext>
+            </a:extLst>
+          </p:cNvPr>
+          <p:cNvSpPr>
+            <a:spLocks noGrp="1"/>
+          </p:cNvSpPr>
+          <p:nvPr>
+            <p:ph idx="1"/>
+          </p:nvPr>
+        </p:nvSpPr>
+        <p:spPr/>
+        <p:txBody>
+          <a:bodyPr/>
+          <a:lstStyle/>
+          <a:p>
+            <a:r>
+              <a:rPr lang="en-CA" dirty="0"/>
+              <a:t>Let’s just avoid all those Tesla shuttles…</a:t>
+            </a:r>
+          </a:p>
+          <a:p>
+            <a:endParaRPr lang="en-CA" dirty="0"/>
+          </a:p>
+          <a:p>
+            <a:endParaRPr lang="en-CA" dirty="0"/>
+          </a:p>
+          <a:p>
+            <a:pPr marL="0" indent="0" algn="ctr">
+              <a:buNone/>
+            </a:pPr>
+            <a:r>
+              <a:rPr lang="en-CA" sz="2800" dirty="0"/>
+              <a:t>http://editor.planning.domains/planning-course/adl/safe</a:t>
+            </a:r>
+            <a:endParaRPr lang="en-CA" dirty="0"/>
+          </a:p>
+        </p:txBody>
+      </p:sp>
+    </p:spTree>
+    <p:extLst>
+      <p:ext uri="{BB962C8B-B14F-4D97-AF65-F5344CB8AC3E}">
+        <p14:creationId xmlns:p14="http://schemas.microsoft.com/office/powerpoint/2010/main" val="2852421980"/>
+      </p:ext>
+    </p:extLst>
+  </p:cSld>
+  <p:clrMapOvr>
+    <a:masterClrMapping/>
+  </p:clrMapOvr>
+</p:sld>
+</file>
+
+<file path=ppt/slides/slide18.xml><?xml version="1.0" encoding="utf-8"?>
+<p:sld xmlns:a="http://schemas.openxmlformats.org/drawingml/2006/main" xmlns:r="http://schemas.openxmlformats.org/officeDocument/2006/relationships" xmlns:p="http://schemas.openxmlformats.org/presentationml/2006/main" showMasterSp="0">
+  <p:cSld>
+    <p:spTree>
+      <p:nvGrpSpPr>
+        <p:cNvPr id="1" name=""/>
+        <p:cNvGrpSpPr/>
+        <p:nvPr/>
+      </p:nvGrpSpPr>
+      <p:grpSpPr>
+        <a:xfrm>
+          <a:off x="0" y="0"/>
+          <a:ext cx="0" cy="0"/>
+          <a:chOff x="0" y="0"/>
+          <a:chExt cx="0" cy="0"/>
+        </a:xfrm>
+      </p:grpSpPr>
+      <p:sp>
+        <p:nvSpPr>
+          <p:cNvPr id="5" name="Content Placeholder 4">
+            <a:extLst>
+              <a:ext uri="{FF2B5EF4-FFF2-40B4-BE49-F238E27FC236}">
+                <a16:creationId xmlns:a16="http://schemas.microsoft.com/office/drawing/2014/main" id="{916B2140-6178-6477-FAC2-4FC081B9C2C5}"/>
+              </a:ext>
+            </a:extLst>
+          </p:cNvPr>
+          <p:cNvSpPr>
+            <a:spLocks noGrp="1"/>
+          </p:cNvSpPr>
+          <p:nvPr>
+            <p:ph idx="1"/>
+          </p:nvPr>
+        </p:nvSpPr>
+        <p:spPr/>
+        <p:txBody>
+          <a:bodyPr/>
+          <a:lstStyle/>
+          <a:p>
+            <a:pPr marL="0" indent="0">
+              <a:buNone/>
+            </a:pPr>
+            <a:endParaRPr lang="en-CA" dirty="0"/>
+          </a:p>
+          <a:p>
+            <a:endParaRPr lang="en-CA" dirty="0"/>
+          </a:p>
+          <a:p>
+            <a:endParaRPr lang="en-CA" dirty="0"/>
+          </a:p>
+          <a:p>
+            <a:pPr marL="0" indent="0" algn="ctr">
+              <a:buNone/>
+            </a:pPr>
+            <a:r>
+              <a:rPr lang="en-CA" sz="2800" dirty="0"/>
+              <a:t>http://editor.planning.domains/planning-course/adl/safetied</a:t>
+            </a:r>
+          </a:p>
+        </p:txBody>
+      </p:sp>
+    </p:spTree>
+    <p:extLst>
+      <p:ext uri="{BB962C8B-B14F-4D97-AF65-F5344CB8AC3E}">
+        <p14:creationId xmlns:p14="http://schemas.microsoft.com/office/powerpoint/2010/main" val="4258168544"/>
+      </p:ext>
+    </p:extLst>
+  </p:cSld>
+  <p:clrMapOvr>
+    <a:masterClrMapping/>
+  </p:clrMapOvr>
+  <mc:AlternateContent xmlns:mc="http://schemas.openxmlformats.org/markup-compatibility/2006">
+    <mc:Choice xmlns:p14="http://schemas.microsoft.com/office/powerpoint/2010/main" Requires="p14">
+      <p:transition spd="med" p14:dur="700">
+        <p:fade/>
+      </p:transition>
+    </mc:Choice>
+    <mc:Fallback>
+      <p:transition spd="med">
+        <p:fade/>
+      </p:transition>
+    </mc:Fallback>
+  </mc:AlternateContent>
+</p:sld>
+</file>
+
+<file path=ppt/slides/slide19.xml><?xml version="1.0" encoding="utf-8"?>
+<p:sld xmlns:a="http://schemas.openxmlformats.org/drawingml/2006/main" xmlns:r="http://schemas.openxmlformats.org/officeDocument/2006/relationships" xmlns:p="http://schemas.openxmlformats.org/presentationml/2006/main" showMasterSp="0">
+  <p:cSld>
+    <p:spTree>
+      <p:nvGrpSpPr>
+        <p:cNvPr id="1" name=""/>
+        <p:cNvGrpSpPr/>
+        <p:nvPr/>
+      </p:nvGrpSpPr>
+      <p:grpSpPr>
+        <a:xfrm>
+          <a:off x="0" y="0"/>
+          <a:ext cx="0" cy="0"/>
+          <a:chOff x="0" y="0"/>
+          <a:chExt cx="0" cy="0"/>
+        </a:xfrm>
+      </p:grpSpPr>
+    </p:spTree>
+    <p:extLst>
+      <p:ext uri="{BB962C8B-B14F-4D97-AF65-F5344CB8AC3E}">
+        <p14:creationId xmlns:p14="http://schemas.microsoft.com/office/powerpoint/2010/main" val="1299345925"/>
+      </p:ext>
+    </p:extLst>
+  </p:cSld>
+  <p:clrMapOvr>
+    <a:masterClrMapping/>
+  </p:clrMapOvr>
+</p:sld>
+</file>
+
 <file path=ppt/slides/slide2.xml><?xml version="1.0" encoding="utf-8"?>
 <p:sld xmlns:a="http://schemas.openxmlformats.org/drawingml/2006/main" xmlns:r="http://schemas.openxmlformats.org/officeDocument/2006/relationships" xmlns:p="http://schemas.openxmlformats.org/presentationml/2006/main">
   <p:cSld>
@@ -9376,6 +10275,20 @@
             </a:pPr>
             <a:r>
               <a:rPr lang="en-US" dirty="0"/>
+              <a:t>Getting everyone to their destination</a:t>
+            </a:r>
+            <a:br>
+              <a:rPr lang="en-US" dirty="0"/>
+            </a:br>
+            <a:endParaRPr lang="en-US" dirty="0"/>
+          </a:p>
+          <a:p>
+            <a:pPr marL="446469" indent="-446469">
+              <a:buSzPct val="100000"/>
+              <a:buAutoNum type="arabicPeriod"/>
+            </a:pPr>
+            <a:r>
+              <a:rPr lang="en-US" dirty="0"/>
               <a:t>Moving an autonomous car around</a:t>
             </a:r>
             <a:br>
@@ -9391,20 +10304,6 @@
             <a:r>
               <a:rPr lang="en-US" dirty="0"/>
               <a:t>Picking up / dropping off passengers</a:t>
-            </a:r>
-            <a:br>
-              <a:rPr lang="en-US" dirty="0"/>
-            </a:br>
-            <a:endParaRPr lang="en-US" dirty="0"/>
-          </a:p>
-          <a:p>
-            <a:pPr marL="446469" indent="-446469">
-              <a:buSzPct val="100000"/>
-              <a:buAutoNum type="arabicPeriod"/>
-            </a:pPr>
-            <a:r>
-              <a:rPr lang="en-US" dirty="0"/>
-              <a:t>Pausing to stop for drop-off / pickup</a:t>
             </a:r>
             <a:br>
               <a:rPr lang="en-US" dirty="0"/>
@@ -10467,10 +11366,824 @@
           <a:chExt cx="0" cy="0"/>
         </a:xfrm>
       </p:grpSpPr>
+      <p:pic>
+        <p:nvPicPr>
+          <p:cNvPr id="3" name="Picture 2">
+            <a:extLst>
+              <a:ext uri="{FF2B5EF4-FFF2-40B4-BE49-F238E27FC236}">
+                <a16:creationId xmlns:a16="http://schemas.microsoft.com/office/drawing/2014/main" id="{A2ADEC37-4BEA-0596-45CE-0E2C9F1AB969}"/>
+              </a:ext>
+            </a:extLst>
+          </p:cNvPr>
+          <p:cNvPicPr>
+            <a:picLocks noChangeAspect="1"/>
+          </p:cNvPicPr>
+          <p:nvPr/>
+        </p:nvPicPr>
+        <p:blipFill>
+          <a:blip r:embed="rId2"/>
+          <a:stretch>
+            <a:fillRect/>
+          </a:stretch>
+        </p:blipFill>
+        <p:spPr>
+          <a:xfrm>
+            <a:off x="743209" y="661460"/>
+            <a:ext cx="3901778" cy="3566469"/>
+          </a:xfrm>
+          <a:prstGeom prst="rect">
+            <a:avLst/>
+          </a:prstGeom>
+        </p:spPr>
+      </p:pic>
+      <p:pic>
+        <p:nvPicPr>
+          <p:cNvPr id="9" name="Picture 8">
+            <a:extLst>
+              <a:ext uri="{FF2B5EF4-FFF2-40B4-BE49-F238E27FC236}">
+                <a16:creationId xmlns:a16="http://schemas.microsoft.com/office/drawing/2014/main" id="{D2DD10FC-B45D-F3EF-CBA1-2E3B24352145}"/>
+              </a:ext>
+            </a:extLst>
+          </p:cNvPr>
+          <p:cNvPicPr>
+            <a:picLocks noChangeAspect="1"/>
+          </p:cNvPicPr>
+          <p:nvPr/>
+        </p:nvPicPr>
+        <p:blipFill>
+          <a:blip r:embed="rId3"/>
+          <a:stretch>
+            <a:fillRect/>
+          </a:stretch>
+        </p:blipFill>
+        <p:spPr>
+          <a:xfrm>
+            <a:off x="3633204" y="3880781"/>
+            <a:ext cx="7962349" cy="2447101"/>
+          </a:xfrm>
+          <a:prstGeom prst="rect">
+            <a:avLst/>
+          </a:prstGeom>
+        </p:spPr>
+      </p:pic>
+      <p:sp>
+        <p:nvSpPr>
+          <p:cNvPr id="16" name="TextBox 15">
+            <a:extLst>
+              <a:ext uri="{FF2B5EF4-FFF2-40B4-BE49-F238E27FC236}">
+                <a16:creationId xmlns:a16="http://schemas.microsoft.com/office/drawing/2014/main" id="{A9A95851-E3DC-69C2-9C79-DCB81D89DA81}"/>
+              </a:ext>
+            </a:extLst>
+          </p:cNvPr>
+          <p:cNvSpPr txBox="1"/>
+          <p:nvPr/>
+        </p:nvSpPr>
+        <p:spPr>
+          <a:xfrm>
+            <a:off x="8073582" y="1417143"/>
+            <a:ext cx="636713" cy="584775"/>
+          </a:xfrm>
+          <a:prstGeom prst="rect">
+            <a:avLst/>
+          </a:prstGeom>
+          <a:noFill/>
+        </p:spPr>
+        <p:txBody>
+          <a:bodyPr wrap="none" rtlCol="0">
+            <a:spAutoFit/>
+          </a:bodyPr>
+          <a:lstStyle/>
+          <a:p>
+            <a:r>
+              <a:rPr lang="en-US" sz="3200" b="1" dirty="0">
+                <a:latin typeface="Consolas" panose="020B0609020204030204" pitchFamily="49" charset="0"/>
+                <a:cs typeface="Aharoni" panose="020B0604020202020204" pitchFamily="2" charset="-79"/>
+              </a:rPr>
+              <a:t>l1</a:t>
+            </a:r>
+            <a:endParaRPr lang="en-CA" sz="3200" b="1" dirty="0">
+              <a:latin typeface="Consolas" panose="020B0609020204030204" pitchFamily="49" charset="0"/>
+              <a:cs typeface="Aharoni" panose="020B0604020202020204" pitchFamily="2" charset="-79"/>
+            </a:endParaRPr>
+          </a:p>
+        </p:txBody>
+      </p:sp>
+      <p:sp>
+        <p:nvSpPr>
+          <p:cNvPr id="17" name="TextBox 16">
+            <a:extLst>
+              <a:ext uri="{FF2B5EF4-FFF2-40B4-BE49-F238E27FC236}">
+                <a16:creationId xmlns:a16="http://schemas.microsoft.com/office/drawing/2014/main" id="{2309F7EF-93D8-9FF9-3BD4-2342BA742864}"/>
+              </a:ext>
+            </a:extLst>
+          </p:cNvPr>
+          <p:cNvSpPr txBox="1"/>
+          <p:nvPr/>
+        </p:nvSpPr>
+        <p:spPr>
+          <a:xfrm>
+            <a:off x="9628702" y="2465214"/>
+            <a:ext cx="636713" cy="584775"/>
+          </a:xfrm>
+          <a:prstGeom prst="rect">
+            <a:avLst/>
+          </a:prstGeom>
+          <a:noFill/>
+        </p:spPr>
+        <p:txBody>
+          <a:bodyPr wrap="none" rtlCol="0">
+            <a:spAutoFit/>
+          </a:bodyPr>
+          <a:lstStyle/>
+          <a:p>
+            <a:r>
+              <a:rPr lang="en-US" sz="3200" b="1" dirty="0">
+                <a:latin typeface="Consolas" panose="020B0609020204030204" pitchFamily="49" charset="0"/>
+                <a:cs typeface="Aharoni" panose="020B0604020202020204" pitchFamily="2" charset="-79"/>
+              </a:rPr>
+              <a:t>l5</a:t>
+            </a:r>
+            <a:endParaRPr lang="en-CA" sz="3200" b="1" dirty="0">
+              <a:latin typeface="Consolas" panose="020B0609020204030204" pitchFamily="49" charset="0"/>
+              <a:cs typeface="Aharoni" panose="020B0604020202020204" pitchFamily="2" charset="-79"/>
+            </a:endParaRPr>
+          </a:p>
+        </p:txBody>
+      </p:sp>
+      <p:sp>
+        <p:nvSpPr>
+          <p:cNvPr id="18" name="TextBox 17">
+            <a:extLst>
+              <a:ext uri="{FF2B5EF4-FFF2-40B4-BE49-F238E27FC236}">
+                <a16:creationId xmlns:a16="http://schemas.microsoft.com/office/drawing/2014/main" id="{EDD9B844-65B3-081E-C346-A7C01BB31B24}"/>
+              </a:ext>
+            </a:extLst>
+          </p:cNvPr>
+          <p:cNvSpPr txBox="1"/>
+          <p:nvPr/>
+        </p:nvSpPr>
+        <p:spPr>
+          <a:xfrm>
+            <a:off x="9628703" y="369073"/>
+            <a:ext cx="636713" cy="584775"/>
+          </a:xfrm>
+          <a:prstGeom prst="rect">
+            <a:avLst/>
+          </a:prstGeom>
+          <a:noFill/>
+        </p:spPr>
+        <p:txBody>
+          <a:bodyPr wrap="none" rtlCol="0">
+            <a:spAutoFit/>
+          </a:bodyPr>
+          <a:lstStyle/>
+          <a:p>
+            <a:r>
+              <a:rPr lang="en-US" sz="3200" b="1" dirty="0">
+                <a:latin typeface="Consolas" panose="020B0609020204030204" pitchFamily="49" charset="0"/>
+                <a:cs typeface="Aharoni" panose="020B0604020202020204" pitchFamily="2" charset="-79"/>
+              </a:rPr>
+              <a:t>l4</a:t>
+            </a:r>
+            <a:endParaRPr lang="en-CA" sz="3200" b="1" dirty="0">
+              <a:latin typeface="Consolas" panose="020B0609020204030204" pitchFamily="49" charset="0"/>
+              <a:cs typeface="Aharoni" panose="020B0604020202020204" pitchFamily="2" charset="-79"/>
+            </a:endParaRPr>
+          </a:p>
+        </p:txBody>
+      </p:sp>
+      <p:sp>
+        <p:nvSpPr>
+          <p:cNvPr id="19" name="TextBox 18">
+            <a:extLst>
+              <a:ext uri="{FF2B5EF4-FFF2-40B4-BE49-F238E27FC236}">
+                <a16:creationId xmlns:a16="http://schemas.microsoft.com/office/drawing/2014/main" id="{54B703F8-38E8-D6F7-17E0-FA29BE06A330}"/>
+              </a:ext>
+            </a:extLst>
+          </p:cNvPr>
+          <p:cNvSpPr txBox="1"/>
+          <p:nvPr/>
+        </p:nvSpPr>
+        <p:spPr>
+          <a:xfrm>
+            <a:off x="6200107" y="369073"/>
+            <a:ext cx="636713" cy="584775"/>
+          </a:xfrm>
+          <a:prstGeom prst="rect">
+            <a:avLst/>
+          </a:prstGeom>
+          <a:noFill/>
+        </p:spPr>
+        <p:txBody>
+          <a:bodyPr wrap="none" rtlCol="0">
+            <a:spAutoFit/>
+          </a:bodyPr>
+          <a:lstStyle/>
+          <a:p>
+            <a:r>
+              <a:rPr lang="en-US" sz="3200" b="1" dirty="0">
+                <a:latin typeface="Consolas" panose="020B0609020204030204" pitchFamily="49" charset="0"/>
+                <a:cs typeface="Aharoni" panose="020B0604020202020204" pitchFamily="2" charset="-79"/>
+              </a:rPr>
+              <a:t>l2</a:t>
+            </a:r>
+            <a:endParaRPr lang="en-CA" sz="3200" b="1" dirty="0">
+              <a:latin typeface="Consolas" panose="020B0609020204030204" pitchFamily="49" charset="0"/>
+              <a:cs typeface="Aharoni" panose="020B0604020202020204" pitchFamily="2" charset="-79"/>
+            </a:endParaRPr>
+          </a:p>
+        </p:txBody>
+      </p:sp>
+      <p:sp>
+        <p:nvSpPr>
+          <p:cNvPr id="20" name="TextBox 19">
+            <a:extLst>
+              <a:ext uri="{FF2B5EF4-FFF2-40B4-BE49-F238E27FC236}">
+                <a16:creationId xmlns:a16="http://schemas.microsoft.com/office/drawing/2014/main" id="{99959982-186A-A64A-FA5A-FBAA73E47B46}"/>
+              </a:ext>
+            </a:extLst>
+          </p:cNvPr>
+          <p:cNvSpPr txBox="1"/>
+          <p:nvPr/>
+        </p:nvSpPr>
+        <p:spPr>
+          <a:xfrm>
+            <a:off x="6200107" y="2465215"/>
+            <a:ext cx="636713" cy="584775"/>
+          </a:xfrm>
+          <a:prstGeom prst="rect">
+            <a:avLst/>
+          </a:prstGeom>
+          <a:noFill/>
+        </p:spPr>
+        <p:txBody>
+          <a:bodyPr wrap="none" rtlCol="0">
+            <a:spAutoFit/>
+          </a:bodyPr>
+          <a:lstStyle/>
+          <a:p>
+            <a:r>
+              <a:rPr lang="en-US" sz="3200" b="1" dirty="0">
+                <a:latin typeface="Consolas" panose="020B0609020204030204" pitchFamily="49" charset="0"/>
+                <a:cs typeface="Aharoni" panose="020B0604020202020204" pitchFamily="2" charset="-79"/>
+              </a:rPr>
+              <a:t>l3</a:t>
+            </a:r>
+            <a:endParaRPr lang="en-CA" sz="3200" b="1" dirty="0">
+              <a:latin typeface="Consolas" panose="020B0609020204030204" pitchFamily="49" charset="0"/>
+              <a:cs typeface="Aharoni" panose="020B0604020202020204" pitchFamily="2" charset="-79"/>
+            </a:endParaRPr>
+          </a:p>
+        </p:txBody>
+      </p:sp>
+      <p:cxnSp>
+        <p:nvCxnSpPr>
+          <p:cNvPr id="21" name="Connector: Curved 20">
+            <a:extLst>
+              <a:ext uri="{FF2B5EF4-FFF2-40B4-BE49-F238E27FC236}">
+                <a16:creationId xmlns:a16="http://schemas.microsoft.com/office/drawing/2014/main" id="{5912E179-7D66-82EC-8B0E-B6533BB17FAB}"/>
+              </a:ext>
+            </a:extLst>
+          </p:cNvPr>
+          <p:cNvCxnSpPr>
+            <a:cxnSpLocks/>
+            <a:stCxn id="16" idx="0"/>
+            <a:endCxn id="19" idx="3"/>
+          </p:cNvCxnSpPr>
+          <p:nvPr/>
+        </p:nvCxnSpPr>
+        <p:spPr>
+          <a:xfrm rot="16200000" flipV="1">
+            <a:off x="7236539" y="261742"/>
+            <a:ext cx="755682" cy="1555119"/>
+          </a:xfrm>
+          <a:prstGeom prst="curvedConnector2">
+            <a:avLst/>
+          </a:prstGeom>
+          <a:ln w="57150">
+            <a:solidFill>
+              <a:schemeClr val="tx2">
+                <a:lumMod val="90000"/>
+              </a:schemeClr>
+            </a:solidFill>
+            <a:tailEnd type="triangle"/>
+          </a:ln>
+        </p:spPr>
+        <p:style>
+          <a:lnRef idx="1">
+            <a:schemeClr val="accent1"/>
+          </a:lnRef>
+          <a:fillRef idx="0">
+            <a:schemeClr val="accent1"/>
+          </a:fillRef>
+          <a:effectRef idx="0">
+            <a:schemeClr val="accent1"/>
+          </a:effectRef>
+          <a:fontRef idx="minor">
+            <a:schemeClr val="tx1"/>
+          </a:fontRef>
+        </p:style>
+      </p:cxnSp>
+      <p:cxnSp>
+        <p:nvCxnSpPr>
+          <p:cNvPr id="22" name="Connector: Curved 21">
+            <a:extLst>
+              <a:ext uri="{FF2B5EF4-FFF2-40B4-BE49-F238E27FC236}">
+                <a16:creationId xmlns:a16="http://schemas.microsoft.com/office/drawing/2014/main" id="{13C997F2-BE73-F814-A143-34586499EF47}"/>
+              </a:ext>
+            </a:extLst>
+          </p:cNvPr>
+          <p:cNvCxnSpPr>
+            <a:cxnSpLocks/>
+            <a:stCxn id="19" idx="2"/>
+            <a:endCxn id="20" idx="0"/>
+          </p:cNvCxnSpPr>
+          <p:nvPr/>
+        </p:nvCxnSpPr>
+        <p:spPr>
+          <a:xfrm rot="5400000">
+            <a:off x="5762781" y="1709531"/>
+            <a:ext cx="1511367" cy="12700"/>
+          </a:xfrm>
+          <a:prstGeom prst="curvedConnector3">
+            <a:avLst/>
+          </a:prstGeom>
+          <a:ln w="57150">
+            <a:solidFill>
+              <a:schemeClr val="tx2">
+                <a:lumMod val="90000"/>
+              </a:schemeClr>
+            </a:solidFill>
+            <a:tailEnd type="triangle"/>
+          </a:ln>
+        </p:spPr>
+        <p:style>
+          <a:lnRef idx="1">
+            <a:schemeClr val="accent1"/>
+          </a:lnRef>
+          <a:fillRef idx="0">
+            <a:schemeClr val="accent1"/>
+          </a:fillRef>
+          <a:effectRef idx="0">
+            <a:schemeClr val="accent1"/>
+          </a:effectRef>
+          <a:fontRef idx="minor">
+            <a:schemeClr val="tx1"/>
+          </a:fontRef>
+        </p:style>
+      </p:cxnSp>
+      <p:cxnSp>
+        <p:nvCxnSpPr>
+          <p:cNvPr id="23" name="Connector: Curved 22">
+            <a:extLst>
+              <a:ext uri="{FF2B5EF4-FFF2-40B4-BE49-F238E27FC236}">
+                <a16:creationId xmlns:a16="http://schemas.microsoft.com/office/drawing/2014/main" id="{BA595EEC-4F5B-A1D3-B664-14D28FACE5BB}"/>
+              </a:ext>
+            </a:extLst>
+          </p:cNvPr>
+          <p:cNvCxnSpPr>
+            <a:cxnSpLocks/>
+            <a:stCxn id="17" idx="1"/>
+            <a:endCxn id="16" idx="2"/>
+          </p:cNvCxnSpPr>
+          <p:nvPr/>
+        </p:nvCxnSpPr>
+        <p:spPr>
+          <a:xfrm rot="10800000">
+            <a:off x="8391940" y="2001918"/>
+            <a:ext cx="1236763" cy="755684"/>
+          </a:xfrm>
+          <a:prstGeom prst="curvedConnector2">
+            <a:avLst/>
+          </a:prstGeom>
+          <a:ln w="57150">
+            <a:solidFill>
+              <a:schemeClr val="tx2">
+                <a:lumMod val="90000"/>
+              </a:schemeClr>
+            </a:solidFill>
+            <a:tailEnd type="triangle"/>
+          </a:ln>
+        </p:spPr>
+        <p:style>
+          <a:lnRef idx="1">
+            <a:schemeClr val="accent1"/>
+          </a:lnRef>
+          <a:fillRef idx="0">
+            <a:schemeClr val="accent1"/>
+          </a:fillRef>
+          <a:effectRef idx="0">
+            <a:schemeClr val="accent1"/>
+          </a:effectRef>
+          <a:fontRef idx="minor">
+            <a:schemeClr val="tx1"/>
+          </a:fontRef>
+        </p:style>
+      </p:cxnSp>
+      <p:cxnSp>
+        <p:nvCxnSpPr>
+          <p:cNvPr id="24" name="Connector: Curved 23">
+            <a:extLst>
+              <a:ext uri="{FF2B5EF4-FFF2-40B4-BE49-F238E27FC236}">
+                <a16:creationId xmlns:a16="http://schemas.microsoft.com/office/drawing/2014/main" id="{C8ABD545-A558-1693-D488-EF13A42FEC04}"/>
+              </a:ext>
+            </a:extLst>
+          </p:cNvPr>
+          <p:cNvCxnSpPr>
+            <a:cxnSpLocks/>
+            <a:stCxn id="18" idx="2"/>
+            <a:endCxn id="17" idx="0"/>
+          </p:cNvCxnSpPr>
+          <p:nvPr/>
+        </p:nvCxnSpPr>
+        <p:spPr>
+          <a:xfrm rot="5400000">
+            <a:off x="9191377" y="1709531"/>
+            <a:ext cx="1511366" cy="1"/>
+          </a:xfrm>
+          <a:prstGeom prst="curvedConnector3">
+            <a:avLst>
+              <a:gd name="adj1" fmla="val 50000"/>
+            </a:avLst>
+          </a:prstGeom>
+          <a:ln w="57150">
+            <a:solidFill>
+              <a:schemeClr val="tx2">
+                <a:lumMod val="90000"/>
+              </a:schemeClr>
+            </a:solidFill>
+            <a:tailEnd type="triangle"/>
+          </a:ln>
+        </p:spPr>
+        <p:style>
+          <a:lnRef idx="1">
+            <a:schemeClr val="accent1"/>
+          </a:lnRef>
+          <a:fillRef idx="0">
+            <a:schemeClr val="accent1"/>
+          </a:fillRef>
+          <a:effectRef idx="0">
+            <a:schemeClr val="accent1"/>
+          </a:effectRef>
+          <a:fontRef idx="minor">
+            <a:schemeClr val="tx1"/>
+          </a:fontRef>
+        </p:style>
+      </p:cxnSp>
+      <p:cxnSp>
+        <p:nvCxnSpPr>
+          <p:cNvPr id="25" name="Connector: Curved 24">
+            <a:extLst>
+              <a:ext uri="{FF2B5EF4-FFF2-40B4-BE49-F238E27FC236}">
+                <a16:creationId xmlns:a16="http://schemas.microsoft.com/office/drawing/2014/main" id="{73026A59-BA48-4499-0880-3C5F2BB80E2C}"/>
+              </a:ext>
+            </a:extLst>
+          </p:cNvPr>
+          <p:cNvCxnSpPr>
+            <a:cxnSpLocks/>
+            <a:stCxn id="16" idx="0"/>
+            <a:endCxn id="18" idx="1"/>
+          </p:cNvCxnSpPr>
+          <p:nvPr/>
+        </p:nvCxnSpPr>
+        <p:spPr>
+          <a:xfrm rot="5400000" flipH="1" flipV="1">
+            <a:off x="8632480" y="420920"/>
+            <a:ext cx="755682" cy="1236764"/>
+          </a:xfrm>
+          <a:prstGeom prst="curvedConnector2">
+            <a:avLst/>
+          </a:prstGeom>
+          <a:ln w="57150">
+            <a:solidFill>
+              <a:schemeClr val="tx2">
+                <a:lumMod val="90000"/>
+              </a:schemeClr>
+            </a:solidFill>
+            <a:tailEnd type="triangle"/>
+          </a:ln>
+        </p:spPr>
+        <p:style>
+          <a:lnRef idx="1">
+            <a:schemeClr val="accent1"/>
+          </a:lnRef>
+          <a:fillRef idx="0">
+            <a:schemeClr val="accent1"/>
+          </a:fillRef>
+          <a:effectRef idx="0">
+            <a:schemeClr val="accent1"/>
+          </a:effectRef>
+          <a:fontRef idx="minor">
+            <a:schemeClr val="tx1"/>
+          </a:fontRef>
+        </p:style>
+      </p:cxnSp>
+      <p:cxnSp>
+        <p:nvCxnSpPr>
+          <p:cNvPr id="26" name="Connector: Curved 25">
+            <a:extLst>
+              <a:ext uri="{FF2B5EF4-FFF2-40B4-BE49-F238E27FC236}">
+                <a16:creationId xmlns:a16="http://schemas.microsoft.com/office/drawing/2014/main" id="{2D15D6D7-ECDA-05A5-2AC4-05D68DE1DC86}"/>
+              </a:ext>
+            </a:extLst>
+          </p:cNvPr>
+          <p:cNvCxnSpPr>
+            <a:cxnSpLocks/>
+            <a:stCxn id="20" idx="3"/>
+            <a:endCxn id="16" idx="2"/>
+          </p:cNvCxnSpPr>
+          <p:nvPr/>
+        </p:nvCxnSpPr>
+        <p:spPr>
+          <a:xfrm flipV="1">
+            <a:off x="6836820" y="2001918"/>
+            <a:ext cx="1555119" cy="755685"/>
+          </a:xfrm>
+          <a:prstGeom prst="curvedConnector2">
+            <a:avLst/>
+          </a:prstGeom>
+          <a:ln w="57150">
+            <a:solidFill>
+              <a:schemeClr val="tx2">
+                <a:lumMod val="90000"/>
+              </a:schemeClr>
+            </a:solidFill>
+            <a:tailEnd type="triangle"/>
+          </a:ln>
+        </p:spPr>
+        <p:style>
+          <a:lnRef idx="1">
+            <a:schemeClr val="accent1"/>
+          </a:lnRef>
+          <a:fillRef idx="0">
+            <a:schemeClr val="accent1"/>
+          </a:fillRef>
+          <a:effectRef idx="0">
+            <a:schemeClr val="accent1"/>
+          </a:effectRef>
+          <a:fontRef idx="minor">
+            <a:schemeClr val="tx1"/>
+          </a:fontRef>
+        </p:style>
+      </p:cxnSp>
     </p:spTree>
     <p:extLst>
       <p:ext uri="{BB962C8B-B14F-4D97-AF65-F5344CB8AC3E}">
-        <p14:creationId xmlns:p14="http://schemas.microsoft.com/office/powerpoint/2010/main" val="1299345925"/>
+        <p14:creationId xmlns:p14="http://schemas.microsoft.com/office/powerpoint/2010/main" val="3619197414"/>
+      </p:ext>
+    </p:extLst>
+  </p:cSld>
+  <p:clrMapOvr>
+    <a:masterClrMapping/>
+  </p:clrMapOvr>
+  <mc:AlternateContent xmlns:mc="http://schemas.openxmlformats.org/markup-compatibility/2006">
+    <mc:Choice xmlns:p159="http://schemas.microsoft.com/office/powerpoint/2015/09/main" Requires="p159">
+      <p:transition xmlns:p14="http://schemas.microsoft.com/office/powerpoint/2010/main" spd="slow" p14:dur="2000">
+        <p159:morph option="byObject"/>
+      </p:transition>
+    </mc:Choice>
+    <mc:Fallback>
+      <p:transition spd="slow">
+        <p:fade/>
+      </p:transition>
+    </mc:Fallback>
+  </mc:AlternateContent>
+  <p:timing>
+    <p:tnLst>
+      <p:par>
+        <p:cTn id="1" dur="indefinite" restart="never" nodeType="tmRoot">
+          <p:childTnLst>
+            <p:seq concurrent="1" nextAc="seek">
+              <p:cTn id="2" dur="indefinite" nodeType="mainSeq">
+                <p:childTnLst>
+                  <p:par>
+                    <p:cTn id="3" fill="hold">
+                      <p:stCondLst>
+                        <p:cond delay="indefinite"/>
+                      </p:stCondLst>
+                      <p:childTnLst>
+                        <p:par>
+                          <p:cTn id="4" fill="hold">
+                            <p:stCondLst>
+                              <p:cond delay="0"/>
+                            </p:stCondLst>
+                            <p:childTnLst>
+                              <p:par>
+                                <p:cTn id="5" presetID="10" presetClass="entr" presetSubtype="0" fill="hold" nodeType="clickEffect">
+                                  <p:stCondLst>
+                                    <p:cond delay="0"/>
+                                  </p:stCondLst>
+                                  <p:childTnLst>
+                                    <p:set>
+                                      <p:cBhvr>
+                                        <p:cTn id="6" dur="1" fill="hold">
+                                          <p:stCondLst>
+                                            <p:cond delay="0"/>
+                                          </p:stCondLst>
+                                        </p:cTn>
+                                        <p:tgtEl>
+                                          <p:spTgt spid="3"/>
+                                        </p:tgtEl>
+                                        <p:attrNameLst>
+                                          <p:attrName>style.visibility</p:attrName>
+                                        </p:attrNameLst>
+                                      </p:cBhvr>
+                                      <p:to>
+                                        <p:strVal val="visible"/>
+                                      </p:to>
+                                    </p:set>
+                                    <p:animEffect transition="in" filter="fade">
+                                      <p:cBhvr>
+                                        <p:cTn id="7" dur="500"/>
+                                        <p:tgtEl>
+                                          <p:spTgt spid="3"/>
+                                        </p:tgtEl>
+                                      </p:cBhvr>
+                                    </p:animEffect>
+                                  </p:childTnLst>
+                                </p:cTn>
+                              </p:par>
+                            </p:childTnLst>
+                          </p:cTn>
+                        </p:par>
+                      </p:childTnLst>
+                    </p:cTn>
+                  </p:par>
+                  <p:par>
+                    <p:cTn id="8" fill="hold">
+                      <p:stCondLst>
+                        <p:cond delay="indefinite"/>
+                      </p:stCondLst>
+                      <p:childTnLst>
+                        <p:par>
+                          <p:cTn id="9" fill="hold">
+                            <p:stCondLst>
+                              <p:cond delay="0"/>
+                            </p:stCondLst>
+                            <p:childTnLst>
+                              <p:par>
+                                <p:cTn id="10" presetID="10" presetClass="entr" presetSubtype="0" fill="hold" nodeType="clickEffect">
+                                  <p:stCondLst>
+                                    <p:cond delay="0"/>
+                                  </p:stCondLst>
+                                  <p:childTnLst>
+                                    <p:set>
+                                      <p:cBhvr>
+                                        <p:cTn id="11" dur="1" fill="hold">
+                                          <p:stCondLst>
+                                            <p:cond delay="0"/>
+                                          </p:stCondLst>
+                                        </p:cTn>
+                                        <p:tgtEl>
+                                          <p:spTgt spid="9"/>
+                                        </p:tgtEl>
+                                        <p:attrNameLst>
+                                          <p:attrName>style.visibility</p:attrName>
+                                        </p:attrNameLst>
+                                      </p:cBhvr>
+                                      <p:to>
+                                        <p:strVal val="visible"/>
+                                      </p:to>
+                                    </p:set>
+                                    <p:animEffect transition="in" filter="fade">
+                                      <p:cBhvr>
+                                        <p:cTn id="12" dur="500"/>
+                                        <p:tgtEl>
+                                          <p:spTgt spid="9"/>
+                                        </p:tgtEl>
+                                      </p:cBhvr>
+                                    </p:animEffect>
+                                  </p:childTnLst>
+                                </p:cTn>
+                              </p:par>
+                            </p:childTnLst>
+                          </p:cTn>
+                        </p:par>
+                      </p:childTnLst>
+                    </p:cTn>
+                  </p:par>
+                </p:childTnLst>
+              </p:cTn>
+              <p:prevCondLst>
+                <p:cond evt="onPrev" delay="0">
+                  <p:tgtEl>
+                    <p:sldTgt/>
+                  </p:tgtEl>
+                </p:cond>
+              </p:prevCondLst>
+              <p:nextCondLst>
+                <p:cond evt="onNext" delay="0">
+                  <p:tgtEl>
+                    <p:sldTgt/>
+                  </p:tgtEl>
+                </p:cond>
+              </p:nextCondLst>
+            </p:seq>
+          </p:childTnLst>
+        </p:cTn>
+      </p:par>
+    </p:tnLst>
+  </p:timing>
+</p:sld>
+</file>
+
+<file path=ppt/slides/slide9.xml><?xml version="1.0" encoding="utf-8"?>
+<p:sld xmlns:a="http://schemas.openxmlformats.org/drawingml/2006/main" xmlns:r="http://schemas.openxmlformats.org/officeDocument/2006/relationships" xmlns:p="http://schemas.openxmlformats.org/presentationml/2006/main" showMasterSp="0">
+  <p:cSld>
+    <p:spTree>
+      <p:nvGrpSpPr>
+        <p:cNvPr id="1" name=""/>
+        <p:cNvGrpSpPr/>
+        <p:nvPr/>
+      </p:nvGrpSpPr>
+      <p:grpSpPr>
+        <a:xfrm>
+          <a:off x="0" y="0"/>
+          <a:ext cx="0" cy="0"/>
+          <a:chOff x="0" y="0"/>
+          <a:chExt cx="0" cy="0"/>
+        </a:xfrm>
+      </p:grpSpPr>
+      <p:sp>
+        <p:nvSpPr>
+          <p:cNvPr id="4" name="Title 3">
+            <a:extLst>
+              <a:ext uri="{FF2B5EF4-FFF2-40B4-BE49-F238E27FC236}">
+                <a16:creationId xmlns:a16="http://schemas.microsoft.com/office/drawing/2014/main" id="{80EAC0C6-7B8A-1444-CF6E-AFD7613F9128}"/>
+              </a:ext>
+            </a:extLst>
+          </p:cNvPr>
+          <p:cNvSpPr>
+            <a:spLocks noGrp="1"/>
+          </p:cNvSpPr>
+          <p:nvPr>
+            <p:ph type="title"/>
+          </p:nvPr>
+        </p:nvSpPr>
+        <p:spPr/>
+        <p:txBody>
+          <a:bodyPr/>
+          <a:lstStyle/>
+          <a:p>
+            <a:r>
+              <a:rPr lang="en-CA" dirty="0"/>
+              <a:t>1. </a:t>
+            </a:r>
+            <a:r>
+              <a:rPr lang="en-US" dirty="0"/>
+              <a:t>Moving a manual car around</a:t>
+            </a:r>
+            <a:endParaRPr lang="en-CA" dirty="0"/>
+          </a:p>
+        </p:txBody>
+      </p:sp>
+      <p:sp>
+        <p:nvSpPr>
+          <p:cNvPr id="5" name="Content Placeholder 4">
+            <a:extLst>
+              <a:ext uri="{FF2B5EF4-FFF2-40B4-BE49-F238E27FC236}">
+                <a16:creationId xmlns:a16="http://schemas.microsoft.com/office/drawing/2014/main" id="{916B2140-6178-6477-FAC2-4FC081B9C2C5}"/>
+              </a:ext>
+            </a:extLst>
+          </p:cNvPr>
+          <p:cNvSpPr>
+            <a:spLocks noGrp="1"/>
+          </p:cNvSpPr>
+          <p:nvPr>
+            <p:ph idx="1"/>
+          </p:nvPr>
+        </p:nvSpPr>
+        <p:spPr/>
+        <p:txBody>
+          <a:bodyPr/>
+          <a:lstStyle/>
+          <a:p>
+            <a:r>
+              <a:rPr lang="en-CA" dirty="0"/>
+              <a:t>Just a warm-up. Let’s get this car to where it wants to go…</a:t>
+            </a:r>
+          </a:p>
+          <a:p>
+            <a:endParaRPr lang="en-CA" dirty="0"/>
+          </a:p>
+          <a:p>
+            <a:endParaRPr lang="en-CA" dirty="0"/>
+          </a:p>
+          <a:p>
+            <a:pPr marL="0" indent="0" algn="ctr">
+              <a:buNone/>
+            </a:pPr>
+            <a:r>
+              <a:rPr lang="en-CA" sz="2800" dirty="0"/>
+              <a:t>http://editor.planning.domains/planning-course/adl/moving-mv</a:t>
+            </a:r>
+          </a:p>
+        </p:txBody>
+      </p:sp>
+    </p:spTree>
+    <p:extLst>
+      <p:ext uri="{BB962C8B-B14F-4D97-AF65-F5344CB8AC3E}">
+        <p14:creationId xmlns:p14="http://schemas.microsoft.com/office/powerpoint/2010/main" val="1315833981"/>
       </p:ext>
     </p:extLst>
   </p:cSld>

</xml_diff>

<commit_message>
Touchup to the adl slides.
</commit_message>
<xml_diff>
--- a/exercises/cisc-813/adl/slides.pptx
+++ b/exercises/cisc-813/adl/slides.pptx
@@ -696,7 +696,7 @@
           <a:p>
             <a:fld id="{D6D0F569-AC90-44EB-9EF4-4E5C2F5D823C}" type="datetime1">
               <a:rPr lang="en-US" smtClean="0"/>
-              <a:t>1/3/2023</a:t>
+              <a:t>1/4/2023</a:t>
             </a:fld>
             <a:endParaRPr lang="en-US" dirty="0"/>
           </a:p>
@@ -1375,7 +1375,7 @@
           <a:p>
             <a:fld id="{46BA7D41-E8B7-4A0B-B861-3EC4AE88917D}" type="datetime1">
               <a:rPr lang="en-US" smtClean="0"/>
-              <a:t>1/3/2023</a:t>
+              <a:t>1/4/2023</a:t>
             </a:fld>
             <a:endParaRPr lang="en-US" dirty="0"/>
           </a:p>
@@ -2064,7 +2064,7 @@
           <a:p>
             <a:fld id="{A7C34823-0B19-4B4E-A643-7A3B0A3D24D6}" type="datetime1">
               <a:rPr lang="en-US" smtClean="0"/>
-              <a:t>1/3/2023</a:t>
+              <a:t>1/4/2023</a:t>
             </a:fld>
             <a:endParaRPr lang="en-US" dirty="0"/>
           </a:p>
@@ -3187,7 +3187,7 @@
           <a:p>
             <a:fld id="{8C2D79EF-17C8-45D8-9866-DAF5723FC604}" type="datetime1">
               <a:rPr lang="en-US" smtClean="0"/>
-              <a:t>1/3/2023</a:t>
+              <a:t>1/4/2023</a:t>
             </a:fld>
             <a:endParaRPr lang="en-US" dirty="0"/>
           </a:p>
@@ -3942,7 +3942,7 @@
           <a:p>
             <a:fld id="{DFFC2ADC-3680-4013-A757-E4663495DB98}" type="datetime1">
               <a:rPr lang="en-US" smtClean="0"/>
-              <a:t>1/3/2023</a:t>
+              <a:t>1/4/2023</a:t>
             </a:fld>
             <a:endParaRPr lang="en-US" dirty="0"/>
           </a:p>
@@ -4689,7 +4689,7 @@
           <a:p>
             <a:fld id="{4751BA94-5DCA-4F19-960F-0FB2BD5EE85A}" type="datetime1">
               <a:rPr lang="en-US" smtClean="0"/>
-              <a:t>1/3/2023</a:t>
+              <a:t>1/4/2023</a:t>
             </a:fld>
             <a:endParaRPr lang="en-US" dirty="0"/>
           </a:p>
@@ -5583,7 +5583,7 @@
           <a:p>
             <a:fld id="{01BED947-38D9-44AC-8B89-E79758333B77}" type="datetime1">
               <a:rPr lang="en-US" smtClean="0"/>
-              <a:t>1/3/2023</a:t>
+              <a:t>1/4/2023</a:t>
             </a:fld>
             <a:endParaRPr lang="en-US" dirty="0"/>
           </a:p>
@@ -6204,7 +6204,7 @@
           <a:p>
             <a:fld id="{3781E23F-BD3C-4F23-B116-2B758120C8AC}" type="datetime1">
               <a:rPr lang="en-US" smtClean="0"/>
-              <a:t>1/3/2023</a:t>
+              <a:t>1/4/2023</a:t>
             </a:fld>
             <a:endParaRPr lang="en-US" dirty="0"/>
           </a:p>
@@ -6796,7 +6796,7 @@
           <a:p>
             <a:fld id="{473CFAA9-6D59-4D98-869E-ACBDB83B2CA4}" type="datetime1">
               <a:rPr lang="en-US" smtClean="0"/>
-              <a:t>1/3/2023</a:t>
+              <a:t>1/4/2023</a:t>
             </a:fld>
             <a:endParaRPr lang="en-US"/>
           </a:p>
@@ -7588,7 +7588,7 @@
           <a:p>
             <a:fld id="{DC410804-27E3-430A-BB42-B831260DE39A}" type="datetime1">
               <a:rPr lang="en-US" smtClean="0"/>
-              <a:t>1/3/2023</a:t>
+              <a:t>1/4/2023</a:t>
             </a:fld>
             <a:endParaRPr lang="en-US" dirty="0"/>
           </a:p>
@@ -8359,7 +8359,7 @@
           <a:p>
             <a:fld id="{60E22DE3-3D1A-4D53-B9A6-6C7463B8C992}" type="datetime1">
               <a:rPr lang="en-US" smtClean="0"/>
-              <a:t>1/3/2023</a:t>
+              <a:t>1/4/2023</a:t>
             </a:fld>
             <a:endParaRPr lang="en-US" dirty="0"/>
           </a:p>
@@ -8670,7 +8670,7 @@
             <a:fld id="{5ECD8B30-1B71-45A1-8314-D59C86F581E1}" type="datetime1">
               <a:rPr lang="en-US" smtClean="0"/>
               <a:pPr/>
-              <a:t>1/3/2023</a:t>
+              <a:t>1/4/2023</a:t>
             </a:fld>
             <a:endParaRPr lang="en-US" b="1" dirty="0"/>
           </a:p>
@@ -9247,13 +9247,13 @@
   <p:clrMapOvr>
     <a:masterClrMapping/>
   </p:clrMapOvr>
-  <mc:AlternateContent xmlns:mc="http://schemas.openxmlformats.org/markup-compatibility/2006">
-    <mc:Choice xmlns:p14="http://schemas.microsoft.com/office/powerpoint/2010/main" Requires="p14">
+  <mc:AlternateContent xmlns:mc="http://schemas.openxmlformats.org/markup-compatibility/2006" xmlns:p14="http://schemas.microsoft.com/office/powerpoint/2010/main">
+    <mc:Choice Requires="p14">
       <p:transition spd="med" p14:dur="700">
         <p:fade/>
       </p:transition>
     </mc:Choice>
-    <mc:Fallback>
+    <mc:Fallback xmlns="">
       <p:transition spd="med">
         <p:fade/>
       </p:transition>
@@ -9444,13 +9444,13 @@
   <p:clrMapOvr>
     <a:masterClrMapping/>
   </p:clrMapOvr>
-  <mc:AlternateContent xmlns:mc="http://schemas.openxmlformats.org/markup-compatibility/2006">
-    <mc:Choice xmlns:p14="http://schemas.microsoft.com/office/powerpoint/2010/main" Requires="p14">
+  <mc:AlternateContent xmlns:mc="http://schemas.openxmlformats.org/markup-compatibility/2006" xmlns:p14="http://schemas.microsoft.com/office/powerpoint/2010/main">
+    <mc:Choice Requires="p14">
       <p:transition spd="med" p14:dur="700">
         <p:fade/>
       </p:transition>
     </mc:Choice>
-    <mc:Fallback>
+    <mc:Fallback xmlns="">
       <p:transition spd="med">
         <p:fade/>
       </p:transition>
@@ -9636,13 +9636,13 @@
   <p:clrMapOvr>
     <a:masterClrMapping/>
   </p:clrMapOvr>
-  <mc:AlternateContent xmlns:mc="http://schemas.openxmlformats.org/markup-compatibility/2006">
-    <mc:Choice xmlns:p14="http://schemas.microsoft.com/office/powerpoint/2010/main" Requires="p14">
+  <mc:AlternateContent xmlns:mc="http://schemas.openxmlformats.org/markup-compatibility/2006" xmlns:p14="http://schemas.microsoft.com/office/powerpoint/2010/main">
+    <mc:Choice Requires="p14">
       <p:transition spd="med" p14:dur="700">
         <p:fade/>
       </p:transition>
     </mc:Choice>
-    <mc:Fallback>
+    <mc:Fallback xmlns="">
       <p:transition spd="med">
         <p:fade/>
       </p:transition>
@@ -9828,13 +9828,13 @@
   <p:clrMapOvr>
     <a:masterClrMapping/>
   </p:clrMapOvr>
-  <mc:AlternateContent xmlns:mc="http://schemas.openxmlformats.org/markup-compatibility/2006">
-    <mc:Choice xmlns:p14="http://schemas.microsoft.com/office/powerpoint/2010/main" Requires="p14">
+  <mc:AlternateContent xmlns:mc="http://schemas.openxmlformats.org/markup-compatibility/2006" xmlns:p14="http://schemas.microsoft.com/office/powerpoint/2010/main">
+    <mc:Choice Requires="p14">
       <p:transition spd="med" p14:dur="700">
         <p:fade/>
       </p:transition>
     </mc:Choice>
-    <mc:Fallback>
+    <mc:Fallback xmlns="">
       <p:transition spd="med">
         <p:fade/>
       </p:transition>
@@ -10020,13 +10020,13 @@
   <p:clrMapOvr>
     <a:masterClrMapping/>
   </p:clrMapOvr>
-  <mc:AlternateContent xmlns:mc="http://schemas.openxmlformats.org/markup-compatibility/2006">
-    <mc:Choice xmlns:p14="http://schemas.microsoft.com/office/powerpoint/2010/main" Requires="p14">
+  <mc:AlternateContent xmlns:mc="http://schemas.openxmlformats.org/markup-compatibility/2006" xmlns:p14="http://schemas.microsoft.com/office/powerpoint/2010/main">
+    <mc:Choice Requires="p14">
       <p:transition spd="med" p14:dur="700">
         <p:fade/>
       </p:transition>
     </mc:Choice>
-    <mc:Fallback>
+    <mc:Fallback xmlns="">
       <p:transition spd="med">
         <p:fade/>
       </p:transition>
@@ -11335,6 +11335,318 @@
           </a:fontRef>
         </p:style>
       </p:cxnSp>
+      <p:pic>
+        <p:nvPicPr>
+          <p:cNvPr id="9" name="Graphic 8">
+            <a:extLst>
+              <a:ext uri="{FF2B5EF4-FFF2-40B4-BE49-F238E27FC236}">
+                <a16:creationId xmlns:a16="http://schemas.microsoft.com/office/drawing/2014/main" id="{286439E9-D16F-3552-36B4-307E7AF4455A}"/>
+              </a:ext>
+            </a:extLst>
+          </p:cNvPr>
+          <p:cNvPicPr>
+            <a:picLocks noChangeAspect="1"/>
+          </p:cNvPicPr>
+          <p:nvPr/>
+        </p:nvPicPr>
+        <p:blipFill>
+          <a:blip r:embed="rId2">
+            <a:extLst>
+              <a:ext uri="{28A0092B-C50C-407E-A947-70E740481C1C}">
+                <a14:useLocalDpi xmlns:a14="http://schemas.microsoft.com/office/drawing/2010/main" val="0"/>
+              </a:ext>
+              <a:ext uri="{96DAC541-7B7A-43D3-8B79-37D633B846F1}">
+                <asvg:svgBlip xmlns:asvg="http://schemas.microsoft.com/office/drawing/2016/SVG/main" r:embed="rId3"/>
+              </a:ext>
+            </a:extLst>
+          </a:blip>
+          <a:stretch>
+            <a:fillRect/>
+          </a:stretch>
+        </p:blipFill>
+        <p:spPr>
+          <a:xfrm>
+            <a:off x="5206364" y="2921362"/>
+            <a:ext cx="593092" cy="593092"/>
+          </a:xfrm>
+          <a:prstGeom prst="rect">
+            <a:avLst/>
+          </a:prstGeom>
+        </p:spPr>
+      </p:pic>
+      <p:pic>
+        <p:nvPicPr>
+          <p:cNvPr id="16" name="Graphic 15">
+            <a:extLst>
+              <a:ext uri="{FF2B5EF4-FFF2-40B4-BE49-F238E27FC236}">
+                <a16:creationId xmlns:a16="http://schemas.microsoft.com/office/drawing/2014/main" id="{4A5D7947-EDFB-C212-2F80-6D7DC6ED85AC}"/>
+              </a:ext>
+            </a:extLst>
+          </p:cNvPr>
+          <p:cNvPicPr>
+            <a:picLocks noChangeAspect="1"/>
+          </p:cNvPicPr>
+          <p:nvPr/>
+        </p:nvPicPr>
+        <p:blipFill>
+          <a:blip r:embed="rId2">
+            <a:extLst>
+              <a:ext uri="{28A0092B-C50C-407E-A947-70E740481C1C}">
+                <a14:useLocalDpi xmlns:a14="http://schemas.microsoft.com/office/drawing/2010/main" val="0"/>
+              </a:ext>
+              <a:ext uri="{96DAC541-7B7A-43D3-8B79-37D633B846F1}">
+                <asvg:svgBlip xmlns:asvg="http://schemas.microsoft.com/office/drawing/2016/SVG/main" r:embed="rId3"/>
+              </a:ext>
+            </a:extLst>
+          </a:blip>
+          <a:stretch>
+            <a:fillRect/>
+          </a:stretch>
+        </p:blipFill>
+        <p:spPr>
+          <a:xfrm>
+            <a:off x="7856158" y="1625247"/>
+            <a:ext cx="593092" cy="593092"/>
+          </a:xfrm>
+          <a:prstGeom prst="rect">
+            <a:avLst/>
+          </a:prstGeom>
+        </p:spPr>
+      </p:pic>
+      <p:pic>
+        <p:nvPicPr>
+          <p:cNvPr id="18" name="Graphic 17">
+            <a:extLst>
+              <a:ext uri="{FF2B5EF4-FFF2-40B4-BE49-F238E27FC236}">
+                <a16:creationId xmlns:a16="http://schemas.microsoft.com/office/drawing/2014/main" id="{B7FA8230-4EE7-F1D2-3A3B-3724F13E50D2}"/>
+              </a:ext>
+            </a:extLst>
+          </p:cNvPr>
+          <p:cNvPicPr>
+            <a:picLocks noChangeAspect="1"/>
+          </p:cNvPicPr>
+          <p:nvPr/>
+        </p:nvPicPr>
+        <p:blipFill>
+          <a:blip r:embed="rId4">
+            <a:extLst>
+              <a:ext uri="{28A0092B-C50C-407E-A947-70E740481C1C}">
+                <a14:useLocalDpi xmlns:a14="http://schemas.microsoft.com/office/drawing/2010/main" val="0"/>
+              </a:ext>
+              <a:ext uri="{96DAC541-7B7A-43D3-8B79-37D633B846F1}">
+                <asvg:svgBlip xmlns:asvg="http://schemas.microsoft.com/office/drawing/2016/SVG/main" r:embed="rId5"/>
+              </a:ext>
+            </a:extLst>
+          </a:blip>
+          <a:stretch>
+            <a:fillRect/>
+          </a:stretch>
+        </p:blipFill>
+        <p:spPr>
+          <a:xfrm>
+            <a:off x="3671226" y="1732055"/>
+            <a:ext cx="379476" cy="379476"/>
+          </a:xfrm>
+          <a:prstGeom prst="rect">
+            <a:avLst/>
+          </a:prstGeom>
+        </p:spPr>
+      </p:pic>
+      <p:pic>
+        <p:nvPicPr>
+          <p:cNvPr id="19" name="Graphic 18">
+            <a:extLst>
+              <a:ext uri="{FF2B5EF4-FFF2-40B4-BE49-F238E27FC236}">
+                <a16:creationId xmlns:a16="http://schemas.microsoft.com/office/drawing/2014/main" id="{519157AC-7A45-21A6-5C13-7F3A9FA06132}"/>
+              </a:ext>
+            </a:extLst>
+          </p:cNvPr>
+          <p:cNvPicPr>
+            <a:picLocks noChangeAspect="1"/>
+          </p:cNvPicPr>
+          <p:nvPr/>
+        </p:nvPicPr>
+        <p:blipFill>
+          <a:blip r:embed="rId4">
+            <a:extLst>
+              <a:ext uri="{28A0092B-C50C-407E-A947-70E740481C1C}">
+                <a14:useLocalDpi xmlns:a14="http://schemas.microsoft.com/office/drawing/2010/main" val="0"/>
+              </a:ext>
+              <a:ext uri="{96DAC541-7B7A-43D3-8B79-37D633B846F1}">
+                <asvg:svgBlip xmlns:asvg="http://schemas.microsoft.com/office/drawing/2016/SVG/main" r:embed="rId5"/>
+              </a:ext>
+            </a:extLst>
+          </a:blip>
+          <a:stretch>
+            <a:fillRect/>
+          </a:stretch>
+        </p:blipFill>
+        <p:spPr>
+          <a:xfrm>
+            <a:off x="3956367" y="1625247"/>
+            <a:ext cx="379476" cy="379476"/>
+          </a:xfrm>
+          <a:prstGeom prst="rect">
+            <a:avLst/>
+          </a:prstGeom>
+        </p:spPr>
+      </p:pic>
+      <p:pic>
+        <p:nvPicPr>
+          <p:cNvPr id="20" name="Graphic 19">
+            <a:extLst>
+              <a:ext uri="{FF2B5EF4-FFF2-40B4-BE49-F238E27FC236}">
+                <a16:creationId xmlns:a16="http://schemas.microsoft.com/office/drawing/2014/main" id="{1733C52A-0358-20EA-6BA7-40B0F88A2118}"/>
+              </a:ext>
+            </a:extLst>
+          </p:cNvPr>
+          <p:cNvPicPr>
+            <a:picLocks noChangeAspect="1"/>
+          </p:cNvPicPr>
+          <p:nvPr/>
+        </p:nvPicPr>
+        <p:blipFill>
+          <a:blip r:embed="rId4">
+            <a:extLst>
+              <a:ext uri="{28A0092B-C50C-407E-A947-70E740481C1C}">
+                <a14:useLocalDpi xmlns:a14="http://schemas.microsoft.com/office/drawing/2010/main" val="0"/>
+              </a:ext>
+              <a:ext uri="{96DAC541-7B7A-43D3-8B79-37D633B846F1}">
+                <asvg:svgBlip xmlns:asvg="http://schemas.microsoft.com/office/drawing/2016/SVG/main" r:embed="rId5"/>
+              </a:ext>
+            </a:extLst>
+          </a:blip>
+          <a:stretch>
+            <a:fillRect/>
+          </a:stretch>
+        </p:blipFill>
+        <p:spPr>
+          <a:xfrm>
+            <a:off x="7186647" y="1796155"/>
+            <a:ext cx="379476" cy="379476"/>
+          </a:xfrm>
+          <a:prstGeom prst="rect">
+            <a:avLst/>
+          </a:prstGeom>
+        </p:spPr>
+      </p:pic>
+      <p:pic>
+        <p:nvPicPr>
+          <p:cNvPr id="21" name="Graphic 20">
+            <a:extLst>
+              <a:ext uri="{FF2B5EF4-FFF2-40B4-BE49-F238E27FC236}">
+                <a16:creationId xmlns:a16="http://schemas.microsoft.com/office/drawing/2014/main" id="{9F926BF8-F7C0-5DD6-A6CC-CCB4A7318B93}"/>
+              </a:ext>
+            </a:extLst>
+          </p:cNvPr>
+          <p:cNvPicPr>
+            <a:picLocks noChangeAspect="1"/>
+          </p:cNvPicPr>
+          <p:nvPr/>
+        </p:nvPicPr>
+        <p:blipFill>
+          <a:blip r:embed="rId4">
+            <a:extLst>
+              <a:ext uri="{28A0092B-C50C-407E-A947-70E740481C1C}">
+                <a14:useLocalDpi xmlns:a14="http://schemas.microsoft.com/office/drawing/2010/main" val="0"/>
+              </a:ext>
+              <a:ext uri="{96DAC541-7B7A-43D3-8B79-37D633B846F1}">
+                <asvg:svgBlip xmlns:asvg="http://schemas.microsoft.com/office/drawing/2016/SVG/main" r:embed="rId5"/>
+              </a:ext>
+            </a:extLst>
+          </a:blip>
+          <a:stretch>
+            <a:fillRect/>
+          </a:stretch>
+        </p:blipFill>
+        <p:spPr>
+          <a:xfrm>
+            <a:off x="7773228" y="4579721"/>
+            <a:ext cx="379476" cy="379476"/>
+          </a:xfrm>
+          <a:prstGeom prst="rect">
+            <a:avLst/>
+          </a:prstGeom>
+        </p:spPr>
+      </p:pic>
+      <p:pic>
+        <p:nvPicPr>
+          <p:cNvPr id="22" name="Graphic 21">
+            <a:extLst>
+              <a:ext uri="{FF2B5EF4-FFF2-40B4-BE49-F238E27FC236}">
+                <a16:creationId xmlns:a16="http://schemas.microsoft.com/office/drawing/2014/main" id="{AB454400-4A4D-758D-D44E-5C9D00DA144F}"/>
+              </a:ext>
+            </a:extLst>
+          </p:cNvPr>
+          <p:cNvPicPr>
+            <a:picLocks noChangeAspect="1"/>
+          </p:cNvPicPr>
+          <p:nvPr/>
+        </p:nvPicPr>
+        <p:blipFill>
+          <a:blip r:embed="rId4">
+            <a:extLst>
+              <a:ext uri="{28A0092B-C50C-407E-A947-70E740481C1C}">
+                <a14:useLocalDpi xmlns:a14="http://schemas.microsoft.com/office/drawing/2010/main" val="0"/>
+              </a:ext>
+              <a:ext uri="{96DAC541-7B7A-43D3-8B79-37D633B846F1}">
+                <asvg:svgBlip xmlns:asvg="http://schemas.microsoft.com/office/drawing/2016/SVG/main" r:embed="rId5"/>
+              </a:ext>
+            </a:extLst>
+          </a:blip>
+          <a:stretch>
+            <a:fillRect/>
+          </a:stretch>
+        </p:blipFill>
+        <p:spPr>
+          <a:xfrm>
+            <a:off x="3714429" y="4675486"/>
+            <a:ext cx="379476" cy="379476"/>
+          </a:xfrm>
+          <a:prstGeom prst="rect">
+            <a:avLst/>
+          </a:prstGeom>
+        </p:spPr>
+      </p:pic>
+      <p:pic>
+        <p:nvPicPr>
+          <p:cNvPr id="24" name="Graphic 23">
+            <a:extLst>
+              <a:ext uri="{FF2B5EF4-FFF2-40B4-BE49-F238E27FC236}">
+                <a16:creationId xmlns:a16="http://schemas.microsoft.com/office/drawing/2014/main" id="{13F17CE6-1EB0-11AF-578B-F3D20E0D91F5}"/>
+              </a:ext>
+            </a:extLst>
+          </p:cNvPr>
+          <p:cNvPicPr>
+            <a:picLocks noChangeAspect="1"/>
+          </p:cNvPicPr>
+          <p:nvPr/>
+        </p:nvPicPr>
+        <p:blipFill>
+          <a:blip r:embed="rId6">
+            <a:extLst>
+              <a:ext uri="{28A0092B-C50C-407E-A947-70E740481C1C}">
+                <a14:useLocalDpi xmlns:a14="http://schemas.microsoft.com/office/drawing/2010/main" val="0"/>
+              </a:ext>
+              <a:ext uri="{96DAC541-7B7A-43D3-8B79-37D633B846F1}">
+                <asvg:svgBlip xmlns:asvg="http://schemas.microsoft.com/office/drawing/2016/SVG/main" r:embed="rId7"/>
+              </a:ext>
+            </a:extLst>
+          </a:blip>
+          <a:stretch>
+            <a:fillRect/>
+          </a:stretch>
+        </p:blipFill>
+        <p:spPr>
+          <a:xfrm>
+            <a:off x="5262455" y="3445383"/>
+            <a:ext cx="653845" cy="653845"/>
+          </a:xfrm>
+          <a:prstGeom prst="rect">
+            <a:avLst/>
+          </a:prstGeom>
+        </p:spPr>
+      </p:pic>
     </p:spTree>
     <p:extLst>
       <p:ext uri="{BB962C8B-B14F-4D97-AF65-F5344CB8AC3E}">
@@ -11926,6 +12238,318 @@
           </a:fontRef>
         </p:style>
       </p:cxnSp>
+      <p:pic>
+        <p:nvPicPr>
+          <p:cNvPr id="2" name="Graphic 1">
+            <a:extLst>
+              <a:ext uri="{FF2B5EF4-FFF2-40B4-BE49-F238E27FC236}">
+                <a16:creationId xmlns:a16="http://schemas.microsoft.com/office/drawing/2014/main" id="{8BBAC792-9267-69F1-EC90-DADE3971BFF9}"/>
+              </a:ext>
+            </a:extLst>
+          </p:cNvPr>
+          <p:cNvPicPr>
+            <a:picLocks noChangeAspect="1"/>
+          </p:cNvPicPr>
+          <p:nvPr/>
+        </p:nvPicPr>
+        <p:blipFill>
+          <a:blip r:embed="rId4">
+            <a:extLst>
+              <a:ext uri="{28A0092B-C50C-407E-A947-70E740481C1C}">
+                <a14:useLocalDpi xmlns:a14="http://schemas.microsoft.com/office/drawing/2010/main" val="0"/>
+              </a:ext>
+              <a:ext uri="{96DAC541-7B7A-43D3-8B79-37D633B846F1}">
+                <asvg:svgBlip xmlns:asvg="http://schemas.microsoft.com/office/drawing/2016/SVG/main" r:embed="rId5"/>
+              </a:ext>
+            </a:extLst>
+          </a:blip>
+          <a:stretch>
+            <a:fillRect/>
+          </a:stretch>
+        </p:blipFill>
+        <p:spPr>
+          <a:xfrm>
+            <a:off x="7490924" y="1226507"/>
+            <a:ext cx="593092" cy="593092"/>
+          </a:xfrm>
+          <a:prstGeom prst="rect">
+            <a:avLst/>
+          </a:prstGeom>
+        </p:spPr>
+      </p:pic>
+      <p:pic>
+        <p:nvPicPr>
+          <p:cNvPr id="4" name="Graphic 3">
+            <a:extLst>
+              <a:ext uri="{FF2B5EF4-FFF2-40B4-BE49-F238E27FC236}">
+                <a16:creationId xmlns:a16="http://schemas.microsoft.com/office/drawing/2014/main" id="{D9925013-D648-09F9-890F-47E68455784D}"/>
+              </a:ext>
+            </a:extLst>
+          </p:cNvPr>
+          <p:cNvPicPr>
+            <a:picLocks noChangeAspect="1"/>
+          </p:cNvPicPr>
+          <p:nvPr/>
+        </p:nvPicPr>
+        <p:blipFill>
+          <a:blip r:embed="rId4">
+            <a:extLst>
+              <a:ext uri="{28A0092B-C50C-407E-A947-70E740481C1C}">
+                <a14:useLocalDpi xmlns:a14="http://schemas.microsoft.com/office/drawing/2010/main" val="0"/>
+              </a:ext>
+              <a:ext uri="{96DAC541-7B7A-43D3-8B79-37D633B846F1}">
+                <asvg:svgBlip xmlns:asvg="http://schemas.microsoft.com/office/drawing/2016/SVG/main" r:embed="rId5"/>
+              </a:ext>
+            </a:extLst>
+          </a:blip>
+          <a:stretch>
+            <a:fillRect/>
+          </a:stretch>
+        </p:blipFill>
+        <p:spPr>
+          <a:xfrm>
+            <a:off x="10247526" y="314936"/>
+            <a:ext cx="593092" cy="593092"/>
+          </a:xfrm>
+          <a:prstGeom prst="rect">
+            <a:avLst/>
+          </a:prstGeom>
+        </p:spPr>
+      </p:pic>
+      <p:pic>
+        <p:nvPicPr>
+          <p:cNvPr id="5" name="Graphic 4">
+            <a:extLst>
+              <a:ext uri="{FF2B5EF4-FFF2-40B4-BE49-F238E27FC236}">
+                <a16:creationId xmlns:a16="http://schemas.microsoft.com/office/drawing/2014/main" id="{35BA96B7-CE72-495B-18A3-6B48B9C5187F}"/>
+              </a:ext>
+            </a:extLst>
+          </p:cNvPr>
+          <p:cNvPicPr>
+            <a:picLocks noChangeAspect="1"/>
+          </p:cNvPicPr>
+          <p:nvPr/>
+        </p:nvPicPr>
+        <p:blipFill>
+          <a:blip r:embed="rId6">
+            <a:extLst>
+              <a:ext uri="{28A0092B-C50C-407E-A947-70E740481C1C}">
+                <a14:useLocalDpi xmlns:a14="http://schemas.microsoft.com/office/drawing/2010/main" val="0"/>
+              </a:ext>
+              <a:ext uri="{96DAC541-7B7A-43D3-8B79-37D633B846F1}">
+                <asvg:svgBlip xmlns:asvg="http://schemas.microsoft.com/office/drawing/2016/SVG/main" r:embed="rId7"/>
+              </a:ext>
+            </a:extLst>
+          </a:blip>
+          <a:stretch>
+            <a:fillRect/>
+          </a:stretch>
+        </p:blipFill>
+        <p:spPr>
+          <a:xfrm>
+            <a:off x="5931621" y="172986"/>
+            <a:ext cx="379476" cy="379476"/>
+          </a:xfrm>
+          <a:prstGeom prst="rect">
+            <a:avLst/>
+          </a:prstGeom>
+        </p:spPr>
+      </p:pic>
+      <p:pic>
+        <p:nvPicPr>
+          <p:cNvPr id="6" name="Graphic 5">
+            <a:extLst>
+              <a:ext uri="{FF2B5EF4-FFF2-40B4-BE49-F238E27FC236}">
+                <a16:creationId xmlns:a16="http://schemas.microsoft.com/office/drawing/2014/main" id="{DB16FB5E-4351-9532-3079-BA40DC64B7BD}"/>
+              </a:ext>
+            </a:extLst>
+          </p:cNvPr>
+          <p:cNvPicPr>
+            <a:picLocks noChangeAspect="1"/>
+          </p:cNvPicPr>
+          <p:nvPr/>
+        </p:nvPicPr>
+        <p:blipFill>
+          <a:blip r:embed="rId6">
+            <a:extLst>
+              <a:ext uri="{28A0092B-C50C-407E-A947-70E740481C1C}">
+                <a14:useLocalDpi xmlns:a14="http://schemas.microsoft.com/office/drawing/2010/main" val="0"/>
+              </a:ext>
+              <a:ext uri="{96DAC541-7B7A-43D3-8B79-37D633B846F1}">
+                <asvg:svgBlip xmlns:asvg="http://schemas.microsoft.com/office/drawing/2016/SVG/main" r:embed="rId7"/>
+              </a:ext>
+            </a:extLst>
+          </a:blip>
+          <a:stretch>
+            <a:fillRect/>
+          </a:stretch>
+        </p:blipFill>
+        <p:spPr>
+          <a:xfrm>
+            <a:off x="6219728" y="47828"/>
+            <a:ext cx="379476" cy="379476"/>
+          </a:xfrm>
+          <a:prstGeom prst="rect">
+            <a:avLst/>
+          </a:prstGeom>
+        </p:spPr>
+      </p:pic>
+      <p:pic>
+        <p:nvPicPr>
+          <p:cNvPr id="7" name="Graphic 6">
+            <a:extLst>
+              <a:ext uri="{FF2B5EF4-FFF2-40B4-BE49-F238E27FC236}">
+                <a16:creationId xmlns:a16="http://schemas.microsoft.com/office/drawing/2014/main" id="{CA8A7182-EEF6-C218-AB5F-08976F66885B}"/>
+              </a:ext>
+            </a:extLst>
+          </p:cNvPr>
+          <p:cNvPicPr>
+            <a:picLocks noChangeAspect="1"/>
+          </p:cNvPicPr>
+          <p:nvPr/>
+        </p:nvPicPr>
+        <p:blipFill>
+          <a:blip r:embed="rId6">
+            <a:extLst>
+              <a:ext uri="{28A0092B-C50C-407E-A947-70E740481C1C}">
+                <a14:useLocalDpi xmlns:a14="http://schemas.microsoft.com/office/drawing/2010/main" val="0"/>
+              </a:ext>
+              <a:ext uri="{96DAC541-7B7A-43D3-8B79-37D633B846F1}">
+                <asvg:svgBlip xmlns:asvg="http://schemas.microsoft.com/office/drawing/2016/SVG/main" r:embed="rId7"/>
+              </a:ext>
+            </a:extLst>
+          </a:blip>
+          <a:stretch>
+            <a:fillRect/>
+          </a:stretch>
+        </p:blipFill>
+        <p:spPr>
+          <a:xfrm>
+            <a:off x="9471207" y="101300"/>
+            <a:ext cx="379476" cy="379476"/>
+          </a:xfrm>
+          <a:prstGeom prst="rect">
+            <a:avLst/>
+          </a:prstGeom>
+        </p:spPr>
+      </p:pic>
+      <p:pic>
+        <p:nvPicPr>
+          <p:cNvPr id="8" name="Graphic 7">
+            <a:extLst>
+              <a:ext uri="{FF2B5EF4-FFF2-40B4-BE49-F238E27FC236}">
+                <a16:creationId xmlns:a16="http://schemas.microsoft.com/office/drawing/2014/main" id="{847DB214-50A2-33BF-D5FD-2EDE254E6E09}"/>
+              </a:ext>
+            </a:extLst>
+          </p:cNvPr>
+          <p:cNvPicPr>
+            <a:picLocks noChangeAspect="1"/>
+          </p:cNvPicPr>
+          <p:nvPr/>
+        </p:nvPicPr>
+        <p:blipFill>
+          <a:blip r:embed="rId6">
+            <a:extLst>
+              <a:ext uri="{28A0092B-C50C-407E-A947-70E740481C1C}">
+                <a14:useLocalDpi xmlns:a14="http://schemas.microsoft.com/office/drawing/2010/main" val="0"/>
+              </a:ext>
+              <a:ext uri="{96DAC541-7B7A-43D3-8B79-37D633B846F1}">
+                <asvg:svgBlip xmlns:asvg="http://schemas.microsoft.com/office/drawing/2016/SVG/main" r:embed="rId7"/>
+              </a:ext>
+            </a:extLst>
+          </a:blip>
+          <a:stretch>
+            <a:fillRect/>
+          </a:stretch>
+        </p:blipFill>
+        <p:spPr>
+          <a:xfrm>
+            <a:off x="10057788" y="2884866"/>
+            <a:ext cx="379476" cy="379476"/>
+          </a:xfrm>
+          <a:prstGeom prst="rect">
+            <a:avLst/>
+          </a:prstGeom>
+        </p:spPr>
+      </p:pic>
+      <p:pic>
+        <p:nvPicPr>
+          <p:cNvPr id="10" name="Graphic 9">
+            <a:extLst>
+              <a:ext uri="{FF2B5EF4-FFF2-40B4-BE49-F238E27FC236}">
+                <a16:creationId xmlns:a16="http://schemas.microsoft.com/office/drawing/2014/main" id="{05C03865-B1EF-6469-53C1-BFBF80725646}"/>
+              </a:ext>
+            </a:extLst>
+          </p:cNvPr>
+          <p:cNvPicPr>
+            <a:picLocks noChangeAspect="1"/>
+          </p:cNvPicPr>
+          <p:nvPr/>
+        </p:nvPicPr>
+        <p:blipFill>
+          <a:blip r:embed="rId6">
+            <a:extLst>
+              <a:ext uri="{28A0092B-C50C-407E-A947-70E740481C1C}">
+                <a14:useLocalDpi xmlns:a14="http://schemas.microsoft.com/office/drawing/2010/main" val="0"/>
+              </a:ext>
+              <a:ext uri="{96DAC541-7B7A-43D3-8B79-37D633B846F1}">
+                <asvg:svgBlip xmlns:asvg="http://schemas.microsoft.com/office/drawing/2016/SVG/main" r:embed="rId7"/>
+              </a:ext>
+            </a:extLst>
+          </a:blip>
+          <a:stretch>
+            <a:fillRect/>
+          </a:stretch>
+        </p:blipFill>
+        <p:spPr>
+          <a:xfrm>
+            <a:off x="6028258" y="2939716"/>
+            <a:ext cx="379476" cy="379476"/>
+          </a:xfrm>
+          <a:prstGeom prst="rect">
+            <a:avLst/>
+          </a:prstGeom>
+        </p:spPr>
+      </p:pic>
+      <p:pic>
+        <p:nvPicPr>
+          <p:cNvPr id="11" name="Graphic 10">
+            <a:extLst>
+              <a:ext uri="{FF2B5EF4-FFF2-40B4-BE49-F238E27FC236}">
+                <a16:creationId xmlns:a16="http://schemas.microsoft.com/office/drawing/2014/main" id="{EBF02DFA-5526-D5DC-E376-A9B2C86ED3EC}"/>
+              </a:ext>
+            </a:extLst>
+          </p:cNvPr>
+          <p:cNvPicPr>
+            <a:picLocks noChangeAspect="1"/>
+          </p:cNvPicPr>
+          <p:nvPr/>
+        </p:nvPicPr>
+        <p:blipFill>
+          <a:blip r:embed="rId8">
+            <a:extLst>
+              <a:ext uri="{28A0092B-C50C-407E-A947-70E740481C1C}">
+                <a14:useLocalDpi xmlns:a14="http://schemas.microsoft.com/office/drawing/2010/main" val="0"/>
+              </a:ext>
+              <a:ext uri="{96DAC541-7B7A-43D3-8B79-37D633B846F1}">
+                <asvg:svgBlip xmlns:asvg="http://schemas.microsoft.com/office/drawing/2016/SVG/main" r:embed="rId9"/>
+              </a:ext>
+            </a:extLst>
+          </a:blip>
+          <a:stretch>
+            <a:fillRect/>
+          </a:stretch>
+        </p:blipFill>
+        <p:spPr>
+          <a:xfrm>
+            <a:off x="7547015" y="1750528"/>
+            <a:ext cx="653845" cy="653845"/>
+          </a:xfrm>
+          <a:prstGeom prst="rect">
+            <a:avLst/>
+          </a:prstGeom>
+        </p:spPr>
+      </p:pic>
     </p:spTree>
     <p:extLst>
       <p:ext uri="{BB962C8B-B14F-4D97-AF65-F5344CB8AC3E}">
@@ -11936,13 +12560,13 @@
   <p:clrMapOvr>
     <a:masterClrMapping/>
   </p:clrMapOvr>
-  <mc:AlternateContent xmlns:mc="http://schemas.openxmlformats.org/markup-compatibility/2006">
-    <mc:Choice xmlns:p159="http://schemas.microsoft.com/office/powerpoint/2015/09/main" Requires="p159">
+  <mc:AlternateContent xmlns:mc="http://schemas.openxmlformats.org/markup-compatibility/2006" xmlns:p159="http://schemas.microsoft.com/office/powerpoint/2015/09/main">
+    <mc:Choice Requires="p159">
       <p:transition xmlns:p14="http://schemas.microsoft.com/office/powerpoint/2010/main" spd="slow" p14:dur="2000">
         <p159:morph option="byObject"/>
       </p:transition>
     </mc:Choice>
-    <mc:Fallback>
+    <mc:Fallback xmlns="">
       <p:transition spd="slow">
         <p:fade/>
       </p:transition>

</xml_diff>

<commit_message>
Updating the readme and slides for fetch-exercise format.
</commit_message>
<xml_diff>
--- a/exercises/cisc-813/adl/slides.pptx
+++ b/exercises/cisc-813/adl/slides.pptx
@@ -696,7 +696,7 @@
           <a:p>
             <a:fld id="{D6D0F569-AC90-44EB-9EF4-4E5C2F5D823C}" type="datetime1">
               <a:rPr lang="en-US" smtClean="0"/>
-              <a:t>1/4/2023</a:t>
+              <a:t>3/23/2023</a:t>
             </a:fld>
             <a:endParaRPr lang="en-US" dirty="0"/>
           </a:p>
@@ -1375,7 +1375,7 @@
           <a:p>
             <a:fld id="{46BA7D41-E8B7-4A0B-B861-3EC4AE88917D}" type="datetime1">
               <a:rPr lang="en-US" smtClean="0"/>
-              <a:t>1/4/2023</a:t>
+              <a:t>3/23/2023</a:t>
             </a:fld>
             <a:endParaRPr lang="en-US" dirty="0"/>
           </a:p>
@@ -2064,7 +2064,7 @@
           <a:p>
             <a:fld id="{A7C34823-0B19-4B4E-A643-7A3B0A3D24D6}" type="datetime1">
               <a:rPr lang="en-US" smtClean="0"/>
-              <a:t>1/4/2023</a:t>
+              <a:t>3/23/2023</a:t>
             </a:fld>
             <a:endParaRPr lang="en-US" dirty="0"/>
           </a:p>
@@ -3187,7 +3187,7 @@
           <a:p>
             <a:fld id="{8C2D79EF-17C8-45D8-9866-DAF5723FC604}" type="datetime1">
               <a:rPr lang="en-US" smtClean="0"/>
-              <a:t>1/4/2023</a:t>
+              <a:t>3/23/2023</a:t>
             </a:fld>
             <a:endParaRPr lang="en-US" dirty="0"/>
           </a:p>
@@ -3942,7 +3942,7 @@
           <a:p>
             <a:fld id="{DFFC2ADC-3680-4013-A757-E4663495DB98}" type="datetime1">
               <a:rPr lang="en-US" smtClean="0"/>
-              <a:t>1/4/2023</a:t>
+              <a:t>3/23/2023</a:t>
             </a:fld>
             <a:endParaRPr lang="en-US" dirty="0"/>
           </a:p>
@@ -4689,7 +4689,7 @@
           <a:p>
             <a:fld id="{4751BA94-5DCA-4F19-960F-0FB2BD5EE85A}" type="datetime1">
               <a:rPr lang="en-US" smtClean="0"/>
-              <a:t>1/4/2023</a:t>
+              <a:t>3/23/2023</a:t>
             </a:fld>
             <a:endParaRPr lang="en-US" dirty="0"/>
           </a:p>
@@ -5583,7 +5583,7 @@
           <a:p>
             <a:fld id="{01BED947-38D9-44AC-8B89-E79758333B77}" type="datetime1">
               <a:rPr lang="en-US" smtClean="0"/>
-              <a:t>1/4/2023</a:t>
+              <a:t>3/23/2023</a:t>
             </a:fld>
             <a:endParaRPr lang="en-US" dirty="0"/>
           </a:p>
@@ -6204,7 +6204,7 @@
           <a:p>
             <a:fld id="{3781E23F-BD3C-4F23-B116-2B758120C8AC}" type="datetime1">
               <a:rPr lang="en-US" smtClean="0"/>
-              <a:t>1/4/2023</a:t>
+              <a:t>3/23/2023</a:t>
             </a:fld>
             <a:endParaRPr lang="en-US" dirty="0"/>
           </a:p>
@@ -6796,7 +6796,7 @@
           <a:p>
             <a:fld id="{473CFAA9-6D59-4D98-869E-ACBDB83B2CA4}" type="datetime1">
               <a:rPr lang="en-US" smtClean="0"/>
-              <a:t>1/4/2023</a:t>
+              <a:t>3/23/2023</a:t>
             </a:fld>
             <a:endParaRPr lang="en-US"/>
           </a:p>
@@ -7588,7 +7588,7 @@
           <a:p>
             <a:fld id="{DC410804-27E3-430A-BB42-B831260DE39A}" type="datetime1">
               <a:rPr lang="en-US" smtClean="0"/>
-              <a:t>1/4/2023</a:t>
+              <a:t>3/23/2023</a:t>
             </a:fld>
             <a:endParaRPr lang="en-US" dirty="0"/>
           </a:p>
@@ -8359,7 +8359,7 @@
           <a:p>
             <a:fld id="{60E22DE3-3D1A-4D53-B9A6-6C7463B8C992}" type="datetime1">
               <a:rPr lang="en-US" smtClean="0"/>
-              <a:t>1/4/2023</a:t>
+              <a:t>3/23/2023</a:t>
             </a:fld>
             <a:endParaRPr lang="en-US" dirty="0"/>
           </a:p>
@@ -8670,7 +8670,7 @@
             <a:fld id="{5ECD8B30-1B71-45A1-8314-D59C86F581E1}" type="datetime1">
               <a:rPr lang="en-US" smtClean="0"/>
               <a:pPr/>
-              <a:t>1/4/2023</a:t>
+              <a:t>3/23/2023</a:t>
             </a:fld>
             <a:endParaRPr lang="en-US" b="1" dirty="0"/>
           </a:p>
@@ -9231,8 +9231,12 @@
               <a:buNone/>
             </a:pPr>
             <a:r>
+              <a:rPr lang="en-CA" sz="2800" dirty="0" err="1"/>
+              <a:t>adl</a:t>
+            </a:r>
+            <a:r>
               <a:rPr lang="en-CA" sz="2800" dirty="0"/>
-              <a:t>http://editor.planning.domains/planning-course/adl/moved-mv</a:t>
+              <a:t>  /  moved-mv</a:t>
             </a:r>
           </a:p>
         </p:txBody>
@@ -9349,8 +9353,12 @@
               <a:buNone/>
             </a:pPr>
             <a:r>
+              <a:rPr lang="en-CA" sz="2800" dirty="0" err="1"/>
+              <a:t>adl</a:t>
+            </a:r>
+            <a:r>
               <a:rPr lang="en-CA" sz="2800" dirty="0"/>
-              <a:t>http://editor.planning.domains/planning-course/adl/passengers</a:t>
+              <a:t>  /  passengers</a:t>
             </a:r>
           </a:p>
           <a:p>
@@ -9428,9 +9436,18 @@
               <a:buNone/>
             </a:pPr>
             <a:r>
+              <a:rPr lang="en-CA" sz="2800" dirty="0" err="1"/>
+              <a:t>adl</a:t>
+            </a:r>
+            <a:r>
               <a:rPr lang="en-CA" sz="2800" dirty="0"/>
-              <a:t>http://editor.planning.domains/planning-course/adl/passenged</a:t>
-            </a:r>
+              <a:t>  /  </a:t>
+            </a:r>
+            <a:r>
+              <a:rPr lang="en-CA" sz="2800" dirty="0" err="1"/>
+              <a:t>passenged</a:t>
+            </a:r>
+            <a:endParaRPr lang="en-CA" sz="2800" dirty="0"/>
           </a:p>
         </p:txBody>
       </p:sp>
@@ -9546,8 +9563,12 @@
               <a:buNone/>
             </a:pPr>
             <a:r>
+              <a:rPr lang="en-CA" sz="2800" dirty="0" err="1"/>
+              <a:t>adl</a:t>
+            </a:r>
+            <a:r>
               <a:rPr lang="en-CA" sz="2800" dirty="0"/>
-              <a:t>http://editor.planning.domains/planning-course/adl/circuit</a:t>
+              <a:t>  /  circuit</a:t>
             </a:r>
             <a:endParaRPr lang="en-CA" dirty="0"/>
           </a:p>
@@ -9620,9 +9641,18 @@
               <a:buNone/>
             </a:pPr>
             <a:r>
+              <a:rPr lang="en-CA" sz="2800" dirty="0" err="1"/>
+              <a:t>adl</a:t>
+            </a:r>
+            <a:r>
               <a:rPr lang="en-CA" sz="2800" dirty="0"/>
-              <a:t>http://editor.planning.domains/planning-course/adl/circed</a:t>
-            </a:r>
+              <a:t>  /  </a:t>
+            </a:r>
+            <a:r>
+              <a:rPr lang="en-CA" sz="2800" dirty="0" err="1"/>
+              <a:t>circed</a:t>
+            </a:r>
+            <a:endParaRPr lang="en-CA" sz="2800" dirty="0"/>
           </a:p>
         </p:txBody>
       </p:sp>
@@ -9738,8 +9768,12 @@
               <a:buNone/>
             </a:pPr>
             <a:r>
+              <a:rPr lang="en-CA" sz="2800" dirty="0" err="1"/>
+              <a:t>adl</a:t>
+            </a:r>
+            <a:r>
               <a:rPr lang="en-CA" sz="2800" dirty="0"/>
-              <a:t>http://editor.planning.domains/planning-course/adl/all-aboard</a:t>
+              <a:t>  /  all-aboard</a:t>
             </a:r>
             <a:endParaRPr lang="en-CA" dirty="0"/>
           </a:p>
@@ -9812,8 +9846,12 @@
               <a:buNone/>
             </a:pPr>
             <a:r>
+              <a:rPr lang="en-CA" sz="2800" dirty="0" err="1"/>
+              <a:t>adl</a:t>
+            </a:r>
+            <a:r>
               <a:rPr lang="en-CA" sz="2800" dirty="0"/>
-              <a:t>http://editor.planning.domains/planning-course/adl/boarded</a:t>
+              <a:t>  /  boarded</a:t>
             </a:r>
           </a:p>
         </p:txBody>
@@ -9930,8 +9968,12 @@
               <a:buNone/>
             </a:pPr>
             <a:r>
+              <a:rPr lang="en-CA" sz="2800" dirty="0" err="1"/>
+              <a:t>adl</a:t>
+            </a:r>
+            <a:r>
               <a:rPr lang="en-CA" sz="2800" dirty="0"/>
-              <a:t>http://editor.planning.domains/planning-course/adl/safe</a:t>
+              <a:t>  /  safe</a:t>
             </a:r>
             <a:endParaRPr lang="en-CA" dirty="0"/>
           </a:p>
@@ -10004,9 +10046,18 @@
               <a:buNone/>
             </a:pPr>
             <a:r>
+              <a:rPr lang="en-CA" sz="2800" dirty="0" err="1"/>
+              <a:t>adl</a:t>
+            </a:r>
+            <a:r>
               <a:rPr lang="en-CA" sz="2800" dirty="0"/>
-              <a:t>http://editor.planning.domains/planning-course/adl/safetied</a:t>
-            </a:r>
+              <a:t>  /  </a:t>
+            </a:r>
+            <a:r>
+              <a:rPr lang="en-CA" sz="2800" dirty="0" err="1"/>
+              <a:t>safetied</a:t>
+            </a:r>
+            <a:endParaRPr lang="en-CA" sz="2800" dirty="0"/>
           </a:p>
         </p:txBody>
       </p:sp>
@@ -12798,8 +12849,12 @@
               <a:buNone/>
             </a:pPr>
             <a:r>
+              <a:rPr lang="en-CA" sz="2800" dirty="0" err="1"/>
+              <a:t>adl</a:t>
+            </a:r>
+            <a:r>
               <a:rPr lang="en-CA" sz="2800" dirty="0"/>
-              <a:t>http://editor.planning.domains/planning-course/adl/moving-mv</a:t>
+              <a:t>  /  moving-mv</a:t>
             </a:r>
           </a:p>
         </p:txBody>

</xml_diff>